<commit_message>
AT&T basic model terminé
</commit_message>
<xml_diff>
--- a/07_deep_learning/99_Project_ATT/01_att_project.pptx
+++ b/07_deep_learning/99_Project_ATT/01_att_project.pptx
@@ -121,7 +121,7 @@
 <file path=ppt/revisionInfo.xml><?xml version="1.0" encoding="utf-8"?>
 <p1510:revInfo xmlns:a="http://schemas.openxmlformats.org/drawingml/2006/main" xmlns:r="http://schemas.openxmlformats.org/officeDocument/2006/relationships" xmlns:p1510="http://schemas.microsoft.com/office/powerpoint/2015/10/main">
   <p1510:revLst>
-    <p1510:client id="{ABAE05BF-949A-4E93-BC19-2AEAAED3ED81}" v="1" dt="2024-08-24T09:47:25.241"/>
+    <p1510:client id="{ABAE05BF-949A-4E93-BC19-2AEAAED3ED81}" v="5" dt="2024-08-30T06:47:43.276"/>
   </p1510:revLst>
 </p1510:revInfo>
 </file>
@@ -1559,19 +1559,27 @@
   </pc:docChgLst>
   <pc:docChgLst>
     <pc:chgData name="Philippe Baucour" userId="5102170ae7533958" providerId="LiveId" clId="{ABAE05BF-949A-4E93-BC19-2AEAAED3ED81}"/>
-    <pc:docChg chg="custSel modSld">
-      <pc:chgData name="Philippe Baucour" userId="5102170ae7533958" providerId="LiveId" clId="{ABAE05BF-949A-4E93-BC19-2AEAAED3ED81}" dt="2024-08-26T08:48:31.873" v="30" actId="20577"/>
+    <pc:docChg chg="undo custSel modSld">
+      <pc:chgData name="Philippe Baucour" userId="5102170ae7533958" providerId="LiveId" clId="{ABAE05BF-949A-4E93-BC19-2AEAAED3ED81}" dt="2024-08-30T06:47:50.311" v="60" actId="27636"/>
       <pc:docMkLst>
         <pc:docMk/>
       </pc:docMkLst>
       <pc:sldChg chg="modSp mod modNotesTx">
-        <pc:chgData name="Philippe Baucour" userId="5102170ae7533958" providerId="LiveId" clId="{ABAE05BF-949A-4E93-BC19-2AEAAED3ED81}" dt="2024-08-26T08:48:31.873" v="30" actId="20577"/>
+        <pc:chgData name="Philippe Baucour" userId="5102170ae7533958" providerId="LiveId" clId="{ABAE05BF-949A-4E93-BC19-2AEAAED3ED81}" dt="2024-08-30T06:47:50.311" v="60" actId="27636"/>
         <pc:sldMkLst>
           <pc:docMk/>
           <pc:sldMk cId="1392602265" sldId="256"/>
         </pc:sldMkLst>
         <pc:spChg chg="mod">
-          <ac:chgData name="Philippe Baucour" userId="5102170ae7533958" providerId="LiveId" clId="{ABAE05BF-949A-4E93-BC19-2AEAAED3ED81}" dt="2024-08-24T09:47:27.756" v="4" actId="20577"/>
+          <ac:chgData name="Philippe Baucour" userId="5102170ae7533958" providerId="LiveId" clId="{ABAE05BF-949A-4E93-BC19-2AEAAED3ED81}" dt="2024-08-30T06:46:42.849" v="37" actId="6549"/>
+          <ac:spMkLst>
+            <pc:docMk/>
+            <pc:sldMk cId="1392602265" sldId="256"/>
+            <ac:spMk id="2" creationId="{27403E06-B2E3-4008-35B5-576464278A6D}"/>
+          </ac:spMkLst>
+        </pc:spChg>
+        <pc:spChg chg="mod">
+          <ac:chgData name="Philippe Baucour" userId="5102170ae7533958" providerId="LiveId" clId="{ABAE05BF-949A-4E93-BC19-2AEAAED3ED81}" dt="2024-08-30T06:47:50.311" v="60" actId="27636"/>
           <ac:spMkLst>
             <pc:docMk/>
             <pc:sldMk cId="1392602265" sldId="256"/>
@@ -1666,7 +1674,7 @@
           <a:p>
             <a:fld id="{FD1752CD-A7D2-4825-BC26-9DAEFBD0A5FF}" type="datetimeFigureOut">
               <a:rPr lang="fr-FR" smtClean="0"/>
-              <a:t>26/08/2024</a:t>
+              <a:t>30/08/2024</a:t>
             </a:fld>
             <a:endParaRPr lang="fr-FR"/>
           </a:p>
@@ -2380,7 +2388,7 @@
           <a:p>
             <a:fld id="{7ECB9D5A-E5E4-41FE-AF39-634902D6D5D2}" type="datetimeFigureOut">
               <a:rPr lang="fr-FR" smtClean="0"/>
-              <a:t>26/08/2024</a:t>
+              <a:t>30/08/2024</a:t>
             </a:fld>
             <a:endParaRPr lang="fr-FR"/>
           </a:p>
@@ -2578,7 +2586,7 @@
           <a:p>
             <a:fld id="{7ECB9D5A-E5E4-41FE-AF39-634902D6D5D2}" type="datetimeFigureOut">
               <a:rPr lang="fr-FR" smtClean="0"/>
-              <a:t>26/08/2024</a:t>
+              <a:t>30/08/2024</a:t>
             </a:fld>
             <a:endParaRPr lang="fr-FR"/>
           </a:p>
@@ -2786,7 +2794,7 @@
           <a:p>
             <a:fld id="{7ECB9D5A-E5E4-41FE-AF39-634902D6D5D2}" type="datetimeFigureOut">
               <a:rPr lang="fr-FR" smtClean="0"/>
-              <a:t>26/08/2024</a:t>
+              <a:t>30/08/2024</a:t>
             </a:fld>
             <a:endParaRPr lang="fr-FR"/>
           </a:p>
@@ -2984,7 +2992,7 @@
           <a:p>
             <a:fld id="{7ECB9D5A-E5E4-41FE-AF39-634902D6D5D2}" type="datetimeFigureOut">
               <a:rPr lang="fr-FR" smtClean="0"/>
-              <a:t>26/08/2024</a:t>
+              <a:t>30/08/2024</a:t>
             </a:fld>
             <a:endParaRPr lang="fr-FR"/>
           </a:p>
@@ -3259,7 +3267,7 @@
           <a:p>
             <a:fld id="{7ECB9D5A-E5E4-41FE-AF39-634902D6D5D2}" type="datetimeFigureOut">
               <a:rPr lang="fr-FR" smtClean="0"/>
-              <a:t>26/08/2024</a:t>
+              <a:t>30/08/2024</a:t>
             </a:fld>
             <a:endParaRPr lang="fr-FR"/>
           </a:p>
@@ -3524,7 +3532,7 @@
           <a:p>
             <a:fld id="{7ECB9D5A-E5E4-41FE-AF39-634902D6D5D2}" type="datetimeFigureOut">
               <a:rPr lang="fr-FR" smtClean="0"/>
-              <a:t>26/08/2024</a:t>
+              <a:t>30/08/2024</a:t>
             </a:fld>
             <a:endParaRPr lang="fr-FR"/>
           </a:p>
@@ -3936,7 +3944,7 @@
           <a:p>
             <a:fld id="{7ECB9D5A-E5E4-41FE-AF39-634902D6D5D2}" type="datetimeFigureOut">
               <a:rPr lang="fr-FR" smtClean="0"/>
-              <a:t>26/08/2024</a:t>
+              <a:t>30/08/2024</a:t>
             </a:fld>
             <a:endParaRPr lang="fr-FR"/>
           </a:p>
@@ -4077,7 +4085,7 @@
           <a:p>
             <a:fld id="{7ECB9D5A-E5E4-41FE-AF39-634902D6D5D2}" type="datetimeFigureOut">
               <a:rPr lang="fr-FR" smtClean="0"/>
-              <a:t>26/08/2024</a:t>
+              <a:t>30/08/2024</a:t>
             </a:fld>
             <a:endParaRPr lang="fr-FR"/>
           </a:p>
@@ -4190,7 +4198,7 @@
           <a:p>
             <a:fld id="{7ECB9D5A-E5E4-41FE-AF39-634902D6D5D2}" type="datetimeFigureOut">
               <a:rPr lang="fr-FR" smtClean="0"/>
-              <a:t>26/08/2024</a:t>
+              <a:t>30/08/2024</a:t>
             </a:fld>
             <a:endParaRPr lang="fr-FR"/>
           </a:p>
@@ -4501,7 +4509,7 @@
           <a:p>
             <a:fld id="{7ECB9D5A-E5E4-41FE-AF39-634902D6D5D2}" type="datetimeFigureOut">
               <a:rPr lang="fr-FR" smtClean="0"/>
-              <a:t>26/08/2024</a:t>
+              <a:t>30/08/2024</a:t>
             </a:fld>
             <a:endParaRPr lang="fr-FR"/>
           </a:p>
@@ -4792,7 +4800,7 @@
           <a:p>
             <a:fld id="{7ECB9D5A-E5E4-41FE-AF39-634902D6D5D2}" type="datetimeFigureOut">
               <a:rPr lang="fr-FR" smtClean="0"/>
-              <a:t>26/08/2024</a:t>
+              <a:t>30/08/2024</a:t>
             </a:fld>
             <a:endParaRPr lang="fr-FR"/>
           </a:p>
@@ -5033,7 +5041,7 @@
           <a:p>
             <a:fld id="{7ECB9D5A-E5E4-41FE-AF39-634902D6D5D2}" type="datetimeFigureOut">
               <a:rPr lang="fr-FR" smtClean="0"/>
-              <a:t>26/08/2024</a:t>
+              <a:t>30/08/2024</a:t>
             </a:fld>
             <a:endParaRPr lang="fr-FR"/>
           </a:p>
@@ -5472,12 +5480,8 @@
           <a:lstStyle/>
           <a:p>
             <a:r>
-              <a:rPr lang="fr-FR"/>
-              <a:t>XXX </a:t>
-            </a:r>
-            <a:r>
               <a:rPr lang="fr-FR" dirty="0"/>
-              <a:t>Project</a:t>
+              <a:t>AT&amp;T Project</a:t>
             </a:r>
           </a:p>
         </p:txBody>
@@ -5541,7 +5545,7 @@
               <a:rPr lang="fr-FR" sz="1400" dirty="0">
                 <a:hlinkClick r:id="rId4"/>
               </a:rPr>
-              <a:t>https://app.jedha.co/course/project-steam-ft/steam-ft</a:t>
+              <a:t>https://app.jedha.co/course/projects-deep-learning-ft/att-spam-detector-ft</a:t>
             </a:r>
             <a:endParaRPr lang="fr-FR" sz="1400" dirty="0"/>
           </a:p>
@@ -5555,23 +5559,23 @@
               <a:rPr lang="fr-FR" sz="1400" dirty="0">
                 <a:hlinkClick r:id="rId5"/>
               </a:rPr>
-              <a:t>https://github.com/40tude/fullstack_mars_2024_3/tree/main/04_big_data/99_Project_Steam</a:t>
+              <a:t>https://github.com/40tude/fullstack_mars_2024_3/tree/main/07_deep_learning/99_Project_ATT</a:t>
             </a:r>
             <a:endParaRPr lang="fr-FR" sz="1400" dirty="0"/>
           </a:p>
           <a:p>
             <a:pPr algn="l"/>
-            <a:endParaRPr lang="fr-FR" sz="1400" dirty="0"/>
+            <a:endParaRPr lang="en-US" sz="1400"/>
           </a:p>
           <a:p>
             <a:pPr algn="l"/>
             <a:r>
+              <a:rPr lang="en-US" sz="1400"/>
+              <a:t>The </a:t>
+            </a:r>
+            <a:r>
               <a:rPr lang="en-US" sz="1400" dirty="0"/>
-              <a:t>The content of the following slides is mainly a cut-and-paste of what's already available in the project notebook(s). The idea is that the slides can be used to guide and frame the presentation and </a:t>
-            </a:r>
-            <a:r>
-              <a:rPr lang="en-US" sz="1400"/>
-              <a:t>discussion.</a:t>
+              <a:t>content of the following slides is mainly a cut-and-paste of what's already available in the project notebook(s). The idea is that the slides can be used to guide and frame the presentation and discussion.</a:t>
             </a:r>
             <a:endParaRPr lang="fr-FR" sz="1400" dirty="0"/>
           </a:p>

</xml_diff>

<commit_message>
Code Review + Typos
</commit_message>
<xml_diff>
--- a/07_deep_learning/99_Project_ATT/01_att_project.pptx
+++ b/07_deep_learning/99_Project_ATT/01_att_project.pptx
@@ -5,7 +5,7 @@
     <p:sldMasterId id="2147483660" r:id="rId1"/>
   </p:sldMasterIdLst>
   <p:notesMasterIdLst>
-    <p:notesMasterId r:id="rId11"/>
+    <p:notesMasterId r:id="rId12"/>
   </p:notesMasterIdLst>
   <p:sldIdLst>
     <p:sldId id="256" r:id="rId2"/>
@@ -14,9 +14,10 @@
     <p:sldId id="266" r:id="rId5"/>
     <p:sldId id="267" r:id="rId6"/>
     <p:sldId id="268" r:id="rId7"/>
-    <p:sldId id="265" r:id="rId8"/>
-    <p:sldId id="257" r:id="rId9"/>
-    <p:sldId id="263" r:id="rId10"/>
+    <p:sldId id="269" r:id="rId8"/>
+    <p:sldId id="265" r:id="rId9"/>
+    <p:sldId id="257" r:id="rId10"/>
+    <p:sldId id="263" r:id="rId11"/>
   </p:sldIdLst>
   <p:sldSz cx="12192000" cy="6858000"/>
   <p:notesSz cx="6858000" cy="9144000"/>
@@ -126,7 +127,7 @@
 <file path=ppt/revisionInfo.xml><?xml version="1.0" encoding="utf-8"?>
 <p1510:revInfo xmlns:a="http://schemas.openxmlformats.org/drawingml/2006/main" xmlns:r="http://schemas.openxmlformats.org/officeDocument/2006/relationships" xmlns:p1510="http://schemas.microsoft.com/office/powerpoint/2015/10/main">
   <p1510:revLst>
-    <p1510:client id="{ABAE05BF-949A-4E93-BC19-2AEAAED3ED81}" v="17" dt="2024-09-02T18:26:44.143"/>
+    <p1510:client id="{ABAE05BF-949A-4E93-BC19-2AEAAED3ED81}" v="20" dt="2024-09-03T08:48:14.023"/>
   </p1510:revLst>
 </p1510:revInfo>
 </file>
@@ -1565,7 +1566,7 @@
   <pc:docChgLst>
     <pc:chgData name="Philippe Baucour" userId="5102170ae7533958" providerId="LiveId" clId="{ABAE05BF-949A-4E93-BC19-2AEAAED3ED81}"/>
     <pc:docChg chg="undo custSel addSld modSld sldOrd">
-      <pc:chgData name="Philippe Baucour" userId="5102170ae7533958" providerId="LiveId" clId="{ABAE05BF-949A-4E93-BC19-2AEAAED3ED81}" dt="2024-09-02T18:44:49.177" v="1846" actId="6549"/>
+      <pc:chgData name="Philippe Baucour" userId="5102170ae7533958" providerId="LiveId" clId="{ABAE05BF-949A-4E93-BC19-2AEAAED3ED81}" dt="2024-09-03T10:36:57.247" v="2700" actId="1036"/>
       <pc:docMkLst>
         <pc:docMk/>
       </pc:docMkLst>
@@ -1633,13 +1634,13 @@
         </pc:picChg>
       </pc:sldChg>
       <pc:sldChg chg="modSp mod">
-        <pc:chgData name="Philippe Baucour" userId="5102170ae7533958" providerId="LiveId" clId="{ABAE05BF-949A-4E93-BC19-2AEAAED3ED81}" dt="2024-09-02T18:44:49.177" v="1846" actId="6549"/>
+        <pc:chgData name="Philippe Baucour" userId="5102170ae7533958" providerId="LiveId" clId="{ABAE05BF-949A-4E93-BC19-2AEAAED3ED81}" dt="2024-09-03T08:51:35.722" v="2652" actId="20577"/>
         <pc:sldMkLst>
           <pc:docMk/>
           <pc:sldMk cId="3201622378" sldId="257"/>
         </pc:sldMkLst>
         <pc:spChg chg="mod">
-          <ac:chgData name="Philippe Baucour" userId="5102170ae7533958" providerId="LiveId" clId="{ABAE05BF-949A-4E93-BC19-2AEAAED3ED81}" dt="2024-09-02T18:44:49.177" v="1846" actId="6549"/>
+          <ac:chgData name="Philippe Baucour" userId="5102170ae7533958" providerId="LiveId" clId="{ABAE05BF-949A-4E93-BC19-2AEAAED3ED81}" dt="2024-09-03T08:51:35.722" v="2652" actId="20577"/>
           <ac:spMkLst>
             <pc:docMk/>
             <pc:sldMk cId="3201622378" sldId="257"/>
@@ -1725,13 +1726,13 @@
         </pc:picChg>
       </pc:sldChg>
       <pc:sldChg chg="addSp delSp modSp new mod modNotesTx">
-        <pc:chgData name="Philippe Baucour" userId="5102170ae7533958" providerId="LiveId" clId="{ABAE05BF-949A-4E93-BC19-2AEAAED3ED81}" dt="2024-09-02T18:31:24.819" v="1716" actId="20577"/>
+        <pc:chgData name="Philippe Baucour" userId="5102170ae7533958" providerId="LiveId" clId="{ABAE05BF-949A-4E93-BC19-2AEAAED3ED81}" dt="2024-09-03T08:50:39.336" v="2617" actId="20577"/>
         <pc:sldMkLst>
           <pc:docMk/>
           <pc:sldMk cId="52206540" sldId="265"/>
         </pc:sldMkLst>
         <pc:spChg chg="mod">
-          <ac:chgData name="Philippe Baucour" userId="5102170ae7533958" providerId="LiveId" clId="{ABAE05BF-949A-4E93-BC19-2AEAAED3ED81}" dt="2024-09-02T16:03:45.935" v="1323" actId="20577"/>
+          <ac:chgData name="Philippe Baucour" userId="5102170ae7533958" providerId="LiveId" clId="{ABAE05BF-949A-4E93-BC19-2AEAAED3ED81}" dt="2024-09-03T08:50:39.336" v="2617" actId="20577"/>
           <ac:spMkLst>
             <pc:docMk/>
             <pc:sldMk cId="52206540" sldId="265"/>
@@ -1747,7 +1748,7 @@
           </ac:spMkLst>
         </pc:spChg>
         <pc:spChg chg="add mod">
-          <ac:chgData name="Philippe Baucour" userId="5102170ae7533958" providerId="LiveId" clId="{ABAE05BF-949A-4E93-BC19-2AEAAED3ED81}" dt="2024-09-02T18:22:55.713" v="1665" actId="1036"/>
+          <ac:chgData name="Philippe Baucour" userId="5102170ae7533958" providerId="LiveId" clId="{ABAE05BF-949A-4E93-BC19-2AEAAED3ED81}" dt="2024-09-03T08:45:50.735" v="2476" actId="1036"/>
           <ac:spMkLst>
             <pc:docMk/>
             <pc:sldMk cId="52206540" sldId="265"/>
@@ -1755,7 +1756,7 @@
           </ac:spMkLst>
         </pc:spChg>
         <pc:spChg chg="add mod">
-          <ac:chgData name="Philippe Baucour" userId="5102170ae7533958" providerId="LiveId" clId="{ABAE05BF-949A-4E93-BC19-2AEAAED3ED81}" dt="2024-09-02T18:22:55.713" v="1665" actId="1036"/>
+          <ac:chgData name="Philippe Baucour" userId="5102170ae7533958" providerId="LiveId" clId="{ABAE05BF-949A-4E93-BC19-2AEAAED3ED81}" dt="2024-09-03T08:48:34.123" v="2551" actId="1035"/>
           <ac:spMkLst>
             <pc:docMk/>
             <pc:sldMk cId="52206540" sldId="265"/>
@@ -1771,7 +1772,7 @@
           </ac:spMkLst>
         </pc:spChg>
         <pc:spChg chg="add mod">
-          <ac:chgData name="Philippe Baucour" userId="5102170ae7533958" providerId="LiveId" clId="{ABAE05BF-949A-4E93-BC19-2AEAAED3ED81}" dt="2024-09-02T18:31:24.819" v="1716" actId="20577"/>
+          <ac:chgData name="Philippe Baucour" userId="5102170ae7533958" providerId="LiveId" clId="{ABAE05BF-949A-4E93-BC19-2AEAAED3ED81}" dt="2024-09-03T08:48:34.123" v="2551" actId="1035"/>
           <ac:spMkLst>
             <pc:docMk/>
             <pc:sldMk cId="52206540" sldId="265"/>
@@ -1786,8 +1787,16 @@
             <ac:picMk id="4" creationId="{433DF392-025B-7EDD-826C-EBD7A2BE08E4}"/>
           </ac:picMkLst>
         </pc:picChg>
+        <pc:picChg chg="add del mod">
+          <ac:chgData name="Philippe Baucour" userId="5102170ae7533958" providerId="LiveId" clId="{ABAE05BF-949A-4E93-BC19-2AEAAED3ED81}" dt="2024-09-03T08:47:42.210" v="2479" actId="21"/>
+          <ac:picMkLst>
+            <pc:docMk/>
+            <pc:sldMk cId="52206540" sldId="265"/>
+            <ac:picMk id="4" creationId="{A7B46FF0-27BB-E16C-88E4-DADF374F8C37}"/>
+          </ac:picMkLst>
+        </pc:picChg>
         <pc:picChg chg="add mod">
-          <ac:chgData name="Philippe Baucour" userId="5102170ae7533958" providerId="LiveId" clId="{ABAE05BF-949A-4E93-BC19-2AEAAED3ED81}" dt="2024-09-02T18:22:55.713" v="1665" actId="1036"/>
+          <ac:chgData name="Philippe Baucour" userId="5102170ae7533958" providerId="LiveId" clId="{ABAE05BF-949A-4E93-BC19-2AEAAED3ED81}" dt="2024-09-03T08:48:34.123" v="2551" actId="1035"/>
           <ac:picMkLst>
             <pc:docMk/>
             <pc:sldMk cId="52206540" sldId="265"/>
@@ -1795,7 +1804,7 @@
           </ac:picMkLst>
         </pc:picChg>
         <pc:picChg chg="add mod">
-          <ac:chgData name="Philippe Baucour" userId="5102170ae7533958" providerId="LiveId" clId="{ABAE05BF-949A-4E93-BC19-2AEAAED3ED81}" dt="2024-09-02T18:22:55.713" v="1665" actId="1036"/>
+          <ac:chgData name="Philippe Baucour" userId="5102170ae7533958" providerId="LiveId" clId="{ABAE05BF-949A-4E93-BC19-2AEAAED3ED81}" dt="2024-09-03T08:48:34.123" v="2551" actId="1035"/>
           <ac:picMkLst>
             <pc:docMk/>
             <pc:sldMk cId="52206540" sldId="265"/>
@@ -1803,11 +1812,19 @@
           </ac:picMkLst>
         </pc:picChg>
         <pc:picChg chg="add mod">
-          <ac:chgData name="Philippe Baucour" userId="5102170ae7533958" providerId="LiveId" clId="{ABAE05BF-949A-4E93-BC19-2AEAAED3ED81}" dt="2024-09-02T18:22:55.713" v="1665" actId="1036"/>
+          <ac:chgData name="Philippe Baucour" userId="5102170ae7533958" providerId="LiveId" clId="{ABAE05BF-949A-4E93-BC19-2AEAAED3ED81}" dt="2024-09-03T08:48:34.123" v="2551" actId="1035"/>
           <ac:picMkLst>
             <pc:docMk/>
             <pc:sldMk cId="52206540" sldId="265"/>
             <ac:picMk id="11" creationId="{F85D1A3C-8735-E810-1B4E-BEC3C316F7B3}"/>
+          </ac:picMkLst>
+        </pc:picChg>
+        <pc:picChg chg="add mod">
+          <ac:chgData name="Philippe Baucour" userId="5102170ae7533958" providerId="LiveId" clId="{ABAE05BF-949A-4E93-BC19-2AEAAED3ED81}" dt="2024-09-03T08:48:43.522" v="2586" actId="1035"/>
+          <ac:picMkLst>
+            <pc:docMk/>
+            <pc:sldMk cId="52206540" sldId="265"/>
+            <ac:picMk id="12" creationId="{A7B46FF0-27BB-E16C-88E4-DADF374F8C37}"/>
           </ac:picMkLst>
         </pc:picChg>
         <pc:picChg chg="add del mod">
@@ -1818,8 +1835,8 @@
             <ac:picMk id="13" creationId="{AD2A3647-F4DB-A89C-576E-F63CDC76C543}"/>
           </ac:picMkLst>
         </pc:picChg>
-        <pc:picChg chg="add mod">
-          <ac:chgData name="Philippe Baucour" userId="5102170ae7533958" providerId="LiveId" clId="{ABAE05BF-949A-4E93-BC19-2AEAAED3ED81}" dt="2024-09-02T18:23:17.130" v="1677" actId="1036"/>
+        <pc:picChg chg="add del mod">
+          <ac:chgData name="Philippe Baucour" userId="5102170ae7533958" providerId="LiveId" clId="{ABAE05BF-949A-4E93-BC19-2AEAAED3ED81}" dt="2024-09-03T08:44:45.217" v="2423" actId="478"/>
           <ac:picMkLst>
             <pc:docMk/>
             <pc:sldMk cId="52206540" sldId="265"/>
@@ -1883,7 +1900,7 @@
         </pc:picChg>
       </pc:sldChg>
       <pc:sldChg chg="addSp delSp modSp new mod modNotesTx">
-        <pc:chgData name="Philippe Baucour" userId="5102170ae7533958" providerId="LiveId" clId="{ABAE05BF-949A-4E93-BC19-2AEAAED3ED81}" dt="2024-09-02T14:18:41.261" v="899" actId="1076"/>
+        <pc:chgData name="Philippe Baucour" userId="5102170ae7533958" providerId="LiveId" clId="{ABAE05BF-949A-4E93-BC19-2AEAAED3ED81}" dt="2024-09-03T10:36:57.247" v="2700" actId="1036"/>
         <pc:sldMkLst>
           <pc:docMk/>
           <pc:sldMk cId="671232843" sldId="267"/>
@@ -1904,6 +1921,14 @@
             <ac:spMk id="17" creationId="{3053E7A8-B72C-E8FD-CA87-54B853B912FF}"/>
           </ac:spMkLst>
         </pc:spChg>
+        <pc:picChg chg="add mod">
+          <ac:chgData name="Philippe Baucour" userId="5102170ae7533958" providerId="LiveId" clId="{ABAE05BF-949A-4E93-BC19-2AEAAED3ED81}" dt="2024-09-03T10:36:57.247" v="2700" actId="1036"/>
+          <ac:picMkLst>
+            <pc:docMk/>
+            <pc:sldMk cId="671232843" sldId="267"/>
+            <ac:picMk id="4" creationId="{56A0ACCB-7D50-6852-381E-13AB02B4947C}"/>
+          </ac:picMkLst>
+        </pc:picChg>
         <pc:picChg chg="add del">
           <ac:chgData name="Philippe Baucour" userId="5102170ae7533958" providerId="LiveId" clId="{ABAE05BF-949A-4E93-BC19-2AEAAED3ED81}" dt="2024-09-02T12:24:02.679" v="318" actId="22"/>
           <ac:picMkLst>
@@ -1920,8 +1945,8 @@
             <ac:picMk id="6" creationId="{DE215ABA-7CB9-739C-7843-0B94C0596BAA}"/>
           </ac:picMkLst>
         </pc:picChg>
-        <pc:picChg chg="add mod">
-          <ac:chgData name="Philippe Baucour" userId="5102170ae7533958" providerId="LiveId" clId="{ABAE05BF-949A-4E93-BC19-2AEAAED3ED81}" dt="2024-09-02T12:32:36.623" v="466" actId="14861"/>
+        <pc:picChg chg="add del mod">
+          <ac:chgData name="Philippe Baucour" userId="5102170ae7533958" providerId="LiveId" clId="{ABAE05BF-949A-4E93-BC19-2AEAAED3ED81}" dt="2024-09-03T10:36:51.270" v="2659" actId="478"/>
           <ac:picMkLst>
             <pc:docMk/>
             <pc:sldMk cId="671232843" sldId="267"/>
@@ -2053,6 +2078,109 @@
             <pc:docMk/>
             <pc:sldMk cId="3250692139" sldId="268"/>
             <ac:picMk id="6" creationId="{81C31236-3B5B-5A41-4354-0F5DD675816F}"/>
+          </ac:picMkLst>
+        </pc:picChg>
+      </pc:sldChg>
+      <pc:sldChg chg="addSp delSp modSp add mod ord modNotesTx">
+        <pc:chgData name="Philippe Baucour" userId="5102170ae7533958" providerId="LiveId" clId="{ABAE05BF-949A-4E93-BC19-2AEAAED3ED81}" dt="2024-09-03T08:49:41.680" v="2615" actId="14100"/>
+        <pc:sldMkLst>
+          <pc:docMk/>
+          <pc:sldMk cId="2840346932" sldId="269"/>
+        </pc:sldMkLst>
+        <pc:spChg chg="mod">
+          <ac:chgData name="Philippe Baucour" userId="5102170ae7533958" providerId="LiveId" clId="{ABAE05BF-949A-4E93-BC19-2AEAAED3ED81}" dt="2024-09-03T08:41:03.976" v="2257" actId="404"/>
+          <ac:spMkLst>
+            <pc:docMk/>
+            <pc:sldMk cId="2840346932" sldId="269"/>
+            <ac:spMk id="2" creationId="{C9D5C376-48FD-431A-1BC9-093D4CF79FA5}"/>
+          </ac:spMkLst>
+        </pc:spChg>
+        <pc:spChg chg="del">
+          <ac:chgData name="Philippe Baucour" userId="5102170ae7533958" providerId="LiveId" clId="{ABAE05BF-949A-4E93-BC19-2AEAAED3ED81}" dt="2024-09-03T08:41:13.474" v="2259" actId="478"/>
+          <ac:spMkLst>
+            <pc:docMk/>
+            <pc:sldMk cId="2840346932" sldId="269"/>
+            <ac:spMk id="14" creationId="{7C9A728B-9207-9414-6ADE-FB7396970C24}"/>
+          </ac:spMkLst>
+        </pc:spChg>
+        <pc:spChg chg="del">
+          <ac:chgData name="Philippe Baucour" userId="5102170ae7533958" providerId="LiveId" clId="{ABAE05BF-949A-4E93-BC19-2AEAAED3ED81}" dt="2024-09-03T08:41:09.611" v="2258" actId="478"/>
+          <ac:spMkLst>
+            <pc:docMk/>
+            <pc:sldMk cId="2840346932" sldId="269"/>
+            <ac:spMk id="15" creationId="{0412050E-AEF1-9749-C033-E22F44474A48}"/>
+          </ac:spMkLst>
+        </pc:spChg>
+        <pc:spChg chg="add del mod">
+          <ac:chgData name="Philippe Baucour" userId="5102170ae7533958" providerId="LiveId" clId="{ABAE05BF-949A-4E93-BC19-2AEAAED3ED81}" dt="2024-09-03T08:43:57.156" v="2358" actId="1035"/>
+          <ac:spMkLst>
+            <pc:docMk/>
+            <pc:sldMk cId="2840346932" sldId="269"/>
+            <ac:spMk id="20" creationId="{B46825B3-C8F2-FD5A-CD69-073F76F8B11D}"/>
+          </ac:spMkLst>
+        </pc:spChg>
+        <pc:picChg chg="add mod">
+          <ac:chgData name="Philippe Baucour" userId="5102170ae7533958" providerId="LiveId" clId="{ABAE05BF-949A-4E93-BC19-2AEAAED3ED81}" dt="2024-09-03T08:49:41.680" v="2615" actId="14100"/>
+          <ac:picMkLst>
+            <pc:docMk/>
+            <pc:sldMk cId="2840346932" sldId="269"/>
+            <ac:picMk id="4" creationId="{7CA78895-3DB6-76B4-F344-4850294BBC37}"/>
+          </ac:picMkLst>
+        </pc:picChg>
+        <pc:picChg chg="del">
+          <ac:chgData name="Philippe Baucour" userId="5102170ae7533958" providerId="LiveId" clId="{ABAE05BF-949A-4E93-BC19-2AEAAED3ED81}" dt="2024-09-03T08:41:16.987" v="2260" actId="478"/>
+          <ac:picMkLst>
+            <pc:docMk/>
+            <pc:sldMk cId="2840346932" sldId="269"/>
+            <ac:picMk id="6" creationId="{5B89E3E9-73E4-5392-63AB-FD759386D9DF}"/>
+          </ac:picMkLst>
+        </pc:picChg>
+        <pc:picChg chg="add mod ord">
+          <ac:chgData name="Philippe Baucour" userId="5102170ae7533958" providerId="LiveId" clId="{ABAE05BF-949A-4E93-BC19-2AEAAED3ED81}" dt="2024-09-03T08:43:57.156" v="2358" actId="1035"/>
+          <ac:picMkLst>
+            <pc:docMk/>
+            <pc:sldMk cId="2840346932" sldId="269"/>
+            <ac:picMk id="7" creationId="{021C3181-9E15-C029-00E2-42449F39DC16}"/>
+          </ac:picMkLst>
+        </pc:picChg>
+        <pc:picChg chg="del">
+          <ac:chgData name="Philippe Baucour" userId="5102170ae7533958" providerId="LiveId" clId="{ABAE05BF-949A-4E93-BC19-2AEAAED3ED81}" dt="2024-09-03T08:40:11.411" v="2240" actId="478"/>
+          <ac:picMkLst>
+            <pc:docMk/>
+            <pc:sldMk cId="2840346932" sldId="269"/>
+            <ac:picMk id="9" creationId="{414196D8-4384-3AE0-B8AD-06545C570E3C}"/>
+          </ac:picMkLst>
+        </pc:picChg>
+        <pc:picChg chg="add mod">
+          <ac:chgData name="Philippe Baucour" userId="5102170ae7533958" providerId="LiveId" clId="{ABAE05BF-949A-4E93-BC19-2AEAAED3ED81}" dt="2024-09-03T08:43:57.156" v="2358" actId="1035"/>
+          <ac:picMkLst>
+            <pc:docMk/>
+            <pc:sldMk cId="2840346932" sldId="269"/>
+            <ac:picMk id="10" creationId="{24528A4E-7429-5BA0-696A-515DD39FA236}"/>
+          </ac:picMkLst>
+        </pc:picChg>
+        <pc:picChg chg="del">
+          <ac:chgData name="Philippe Baucour" userId="5102170ae7533958" providerId="LiveId" clId="{ABAE05BF-949A-4E93-BC19-2AEAAED3ED81}" dt="2024-09-03T08:41:45.928" v="2261" actId="478"/>
+          <ac:picMkLst>
+            <pc:docMk/>
+            <pc:sldMk cId="2840346932" sldId="269"/>
+            <ac:picMk id="11" creationId="{F85D1A3C-8735-E810-1B4E-BEC3C316F7B3}"/>
+          </ac:picMkLst>
+        </pc:picChg>
+        <pc:picChg chg="add del mod">
+          <ac:chgData name="Philippe Baucour" userId="5102170ae7533958" providerId="LiveId" clId="{ABAE05BF-949A-4E93-BC19-2AEAAED3ED81}" dt="2024-09-03T08:48:10.878" v="2484" actId="21"/>
+          <ac:picMkLst>
+            <pc:docMk/>
+            <pc:sldMk cId="2840346932" sldId="269"/>
+            <ac:picMk id="12" creationId="{A7B46FF0-27BB-E16C-88E4-DADF374F8C37}"/>
+          </ac:picMkLst>
+        </pc:picChg>
+        <pc:picChg chg="mod">
+          <ac:chgData name="Philippe Baucour" userId="5102170ae7533958" providerId="LiveId" clId="{ABAE05BF-949A-4E93-BC19-2AEAAED3ED81}" dt="2024-09-03T08:44:03.923" v="2381" actId="1036"/>
+          <ac:picMkLst>
+            <pc:docMk/>
+            <pc:sldMk cId="2840346932" sldId="269"/>
+            <ac:picMk id="19" creationId="{53B19E68-B5FA-6930-E7D3-25EC7616B0D7}"/>
           </ac:picMkLst>
         </pc:picChg>
       </pc:sldChg>
@@ -2143,7 +2271,7 @@
           <a:p>
             <a:fld id="{FD1752CD-A7D2-4825-BC26-9DAEFBD0A5FF}" type="datetimeFigureOut">
               <a:rPr lang="fr-FR" smtClean="0"/>
-              <a:t>02/09/2024</a:t>
+              <a:t>03/09/2024</a:t>
             </a:fld>
             <a:endParaRPr lang="fr-FR"/>
           </a:p>
@@ -3207,19 +3335,39 @@
           <a:p>
             <a:r>
               <a:rPr lang="fr-FR" dirty="0"/>
-              <a:t>Ici on en a  : </a:t>
-            </a:r>
-            <a:r>
-              <a:rPr lang="fr-FR" b="0" i="0" dirty="0">
-                <a:solidFill>
-                  <a:srgbClr val="CCCCCC"/>
-                </a:solidFill>
-                <a:effectLst/>
-                <a:latin typeface="JetBrains Mono" panose="02000009000000000000" pitchFamily="49" charset="0"/>
-              </a:rPr>
-              <a:t>109 483 009 = 100 millions !!!</a:t>
+              <a:t>On a pris le parti de geler TOUTES les couches de BERT et de juste rajouter une dernière couche dense avec une activation </a:t>
+            </a:r>
+            <a:r>
+              <a:rPr lang="fr-FR" dirty="0" err="1"/>
+              <a:t>sigmoide</a:t>
             </a:r>
             <a:endParaRPr lang="fr-FR" dirty="0"/>
+          </a:p>
+          <a:p>
+            <a:r>
+              <a:rPr lang="fr-FR" dirty="0"/>
+              <a:t>Du coup même si BERT a 110 M de para entrainables, on en a que 769 à entrainer</a:t>
+            </a:r>
+          </a:p>
+          <a:p>
+            <a:r>
+              <a:rPr lang="fr-FR" dirty="0"/>
+              <a:t>Par contre c'est reste très </a:t>
+            </a:r>
+            <a:r>
+              <a:rPr lang="fr-FR" dirty="0" err="1"/>
+              <a:t>très</a:t>
+            </a:r>
+            <a:r>
+              <a:rPr lang="fr-FR" dirty="0"/>
+              <a:t> lent à entrainer</a:t>
+            </a:r>
+          </a:p>
+          <a:p>
+            <a:r>
+              <a:rPr lang="fr-FR" dirty="0"/>
+              <a:t>Les résultats sont pas top</a:t>
+            </a:r>
           </a:p>
         </p:txBody>
       </p:sp>
@@ -3241,6 +3389,124 @@
             <a:fld id="{341AEC00-4977-4C47-A11B-52155DC12F54}" type="slidenum">
               <a:rPr lang="fr-FR" smtClean="0"/>
               <a:t>7</a:t>
+            </a:fld>
+            <a:endParaRPr lang="fr-FR"/>
+          </a:p>
+        </p:txBody>
+      </p:sp>
+    </p:spTree>
+    <p:extLst>
+      <p:ext uri="{BB962C8B-B14F-4D97-AF65-F5344CB8AC3E}">
+        <p14:creationId xmlns:p14="http://schemas.microsoft.com/office/powerpoint/2010/main" val="243988749"/>
+      </p:ext>
+    </p:extLst>
+  </p:cSld>
+  <p:clrMapOvr>
+    <a:masterClrMapping/>
+  </p:clrMapOvr>
+</p:notes>
+</file>
+
+<file path=ppt/notesSlides/notesSlide5.xml><?xml version="1.0" encoding="utf-8"?>
+<p:notes xmlns:a="http://schemas.openxmlformats.org/drawingml/2006/main" xmlns:r="http://schemas.openxmlformats.org/officeDocument/2006/relationships" xmlns:p="http://schemas.openxmlformats.org/presentationml/2006/main">
+  <p:cSld>
+    <p:spTree>
+      <p:nvGrpSpPr>
+        <p:cNvPr id="1" name=""/>
+        <p:cNvGrpSpPr/>
+        <p:nvPr/>
+      </p:nvGrpSpPr>
+      <p:grpSpPr>
+        <a:xfrm>
+          <a:off x="0" y="0"/>
+          <a:ext cx="0" cy="0"/>
+          <a:chOff x="0" y="0"/>
+          <a:chExt cx="0" cy="0"/>
+        </a:xfrm>
+      </p:grpSpPr>
+      <p:sp>
+        <p:nvSpPr>
+          <p:cNvPr id="2" name="Espace réservé de l'image des diapositives 1"/>
+          <p:cNvSpPr>
+            <a:spLocks noGrp="1" noRot="1" noChangeAspect="1"/>
+          </p:cNvSpPr>
+          <p:nvPr>
+            <p:ph type="sldImg"/>
+          </p:nvPr>
+        </p:nvSpPr>
+        <p:spPr/>
+      </p:sp>
+      <p:sp>
+        <p:nvSpPr>
+          <p:cNvPr id="3" name="Espace réservé des notes 2"/>
+          <p:cNvSpPr>
+            <a:spLocks noGrp="1"/>
+          </p:cNvSpPr>
+          <p:nvPr>
+            <p:ph type="body" idx="1"/>
+          </p:nvPr>
+        </p:nvSpPr>
+        <p:spPr/>
+        <p:txBody>
+          <a:bodyPr/>
+          <a:lstStyle/>
+          <a:p>
+            <a:r>
+              <a:rPr lang="fr-FR" dirty="0"/>
+              <a:t>On avait 8 169 paramètres entrainables avec le modèle de base</a:t>
+            </a:r>
+          </a:p>
+          <a:p>
+            <a:r>
+              <a:rPr lang="fr-FR" dirty="0"/>
+              <a:t>On a pris le parti de geler TOUTES les couches de BERT et de juste rajouter une dernière couche dense avec une activation </a:t>
+            </a:r>
+            <a:r>
+              <a:rPr lang="fr-FR" dirty="0" err="1"/>
+              <a:t>sigmoide</a:t>
+            </a:r>
+            <a:endParaRPr lang="fr-FR" dirty="0"/>
+          </a:p>
+          <a:p>
+            <a:r>
+              <a:rPr lang="fr-FR" dirty="0"/>
+              <a:t>Du coup même si BERT a 110 M de para entrainables, on en a que 769 à entrainer</a:t>
+            </a:r>
+          </a:p>
+          <a:p>
+            <a:r>
+              <a:rPr lang="fr-FR" dirty="0"/>
+              <a:t>Par contre c'est reste très </a:t>
+            </a:r>
+            <a:r>
+              <a:rPr lang="fr-FR" dirty="0" err="1"/>
+              <a:t>très</a:t>
+            </a:r>
+            <a:r>
+              <a:rPr lang="fr-FR" dirty="0"/>
+              <a:t> lent à entrainer</a:t>
+            </a:r>
+          </a:p>
+        </p:txBody>
+      </p:sp>
+      <p:sp>
+        <p:nvSpPr>
+          <p:cNvPr id="4" name="Espace réservé du numéro de diapositive 3"/>
+          <p:cNvSpPr>
+            <a:spLocks noGrp="1"/>
+          </p:cNvSpPr>
+          <p:nvPr>
+            <p:ph type="sldNum" sz="quarter" idx="5"/>
+          </p:nvPr>
+        </p:nvSpPr>
+        <p:spPr/>
+        <p:txBody>
+          <a:bodyPr/>
+          <a:lstStyle/>
+          <a:p>
+            <a:fld id="{341AEC00-4977-4C47-A11B-52155DC12F54}" type="slidenum">
+              <a:rPr lang="fr-FR" smtClean="0"/>
+              <a:t>8</a:t>
             </a:fld>
             <a:endParaRPr lang="fr-FR"/>
           </a:p>
@@ -3406,7 +3672,7 @@
           <a:p>
             <a:fld id="{7ECB9D5A-E5E4-41FE-AF39-634902D6D5D2}" type="datetimeFigureOut">
               <a:rPr lang="fr-FR" smtClean="0"/>
-              <a:t>02/09/2024</a:t>
+              <a:t>03/09/2024</a:t>
             </a:fld>
             <a:endParaRPr lang="fr-FR"/>
           </a:p>
@@ -3604,7 +3870,7 @@
           <a:p>
             <a:fld id="{7ECB9D5A-E5E4-41FE-AF39-634902D6D5D2}" type="datetimeFigureOut">
               <a:rPr lang="fr-FR" smtClean="0"/>
-              <a:t>02/09/2024</a:t>
+              <a:t>03/09/2024</a:t>
             </a:fld>
             <a:endParaRPr lang="fr-FR"/>
           </a:p>
@@ -3812,7 +4078,7 @@
           <a:p>
             <a:fld id="{7ECB9D5A-E5E4-41FE-AF39-634902D6D5D2}" type="datetimeFigureOut">
               <a:rPr lang="fr-FR" smtClean="0"/>
-              <a:t>02/09/2024</a:t>
+              <a:t>03/09/2024</a:t>
             </a:fld>
             <a:endParaRPr lang="fr-FR"/>
           </a:p>
@@ -4010,7 +4276,7 @@
           <a:p>
             <a:fld id="{7ECB9D5A-E5E4-41FE-AF39-634902D6D5D2}" type="datetimeFigureOut">
               <a:rPr lang="fr-FR" smtClean="0"/>
-              <a:t>02/09/2024</a:t>
+              <a:t>03/09/2024</a:t>
             </a:fld>
             <a:endParaRPr lang="fr-FR"/>
           </a:p>
@@ -4285,7 +4551,7 @@
           <a:p>
             <a:fld id="{7ECB9D5A-E5E4-41FE-AF39-634902D6D5D2}" type="datetimeFigureOut">
               <a:rPr lang="fr-FR" smtClean="0"/>
-              <a:t>02/09/2024</a:t>
+              <a:t>03/09/2024</a:t>
             </a:fld>
             <a:endParaRPr lang="fr-FR"/>
           </a:p>
@@ -4550,7 +4816,7 @@
           <a:p>
             <a:fld id="{7ECB9D5A-E5E4-41FE-AF39-634902D6D5D2}" type="datetimeFigureOut">
               <a:rPr lang="fr-FR" smtClean="0"/>
-              <a:t>02/09/2024</a:t>
+              <a:t>03/09/2024</a:t>
             </a:fld>
             <a:endParaRPr lang="fr-FR"/>
           </a:p>
@@ -4962,7 +5228,7 @@
           <a:p>
             <a:fld id="{7ECB9D5A-E5E4-41FE-AF39-634902D6D5D2}" type="datetimeFigureOut">
               <a:rPr lang="fr-FR" smtClean="0"/>
-              <a:t>02/09/2024</a:t>
+              <a:t>03/09/2024</a:t>
             </a:fld>
             <a:endParaRPr lang="fr-FR"/>
           </a:p>
@@ -5103,7 +5369,7 @@
           <a:p>
             <a:fld id="{7ECB9D5A-E5E4-41FE-AF39-634902D6D5D2}" type="datetimeFigureOut">
               <a:rPr lang="fr-FR" smtClean="0"/>
-              <a:t>02/09/2024</a:t>
+              <a:t>03/09/2024</a:t>
             </a:fld>
             <a:endParaRPr lang="fr-FR"/>
           </a:p>
@@ -5216,7 +5482,7 @@
           <a:p>
             <a:fld id="{7ECB9D5A-E5E4-41FE-AF39-634902D6D5D2}" type="datetimeFigureOut">
               <a:rPr lang="fr-FR" smtClean="0"/>
-              <a:t>02/09/2024</a:t>
+              <a:t>03/09/2024</a:t>
             </a:fld>
             <a:endParaRPr lang="fr-FR"/>
           </a:p>
@@ -5527,7 +5793,7 @@
           <a:p>
             <a:fld id="{7ECB9D5A-E5E4-41FE-AF39-634902D6D5D2}" type="datetimeFigureOut">
               <a:rPr lang="fr-FR" smtClean="0"/>
-              <a:t>02/09/2024</a:t>
+              <a:t>03/09/2024</a:t>
             </a:fld>
             <a:endParaRPr lang="fr-FR"/>
           </a:p>
@@ -5818,7 +6084,7 @@
           <a:p>
             <a:fld id="{7ECB9D5A-E5E4-41FE-AF39-634902D6D5D2}" type="datetimeFigureOut">
               <a:rPr lang="fr-FR" smtClean="0"/>
-              <a:t>02/09/2024</a:t>
+              <a:t>03/09/2024</a:t>
             </a:fld>
             <a:endParaRPr lang="fr-FR"/>
           </a:p>
@@ -6059,7 +6325,7 @@
           <a:p>
             <a:fld id="{7ECB9D5A-E5E4-41FE-AF39-634902D6D5D2}" type="datetimeFigureOut">
               <a:rPr lang="fr-FR" smtClean="0"/>
-              <a:t>02/09/2024</a:t>
+              <a:t>03/09/2024</a:t>
             </a:fld>
             <a:endParaRPr lang="fr-FR"/>
           </a:p>
@@ -6796,6 +7062,100 @@
 </p:sld>
 </file>
 
+<file path=ppt/slides/slide10.xml><?xml version="1.0" encoding="utf-8"?>
+<p:sld xmlns:a="http://schemas.openxmlformats.org/drawingml/2006/main" xmlns:r="http://schemas.openxmlformats.org/officeDocument/2006/relationships" xmlns:p="http://schemas.openxmlformats.org/presentationml/2006/main">
+  <p:cSld>
+    <p:spTree>
+      <p:nvGrpSpPr>
+        <p:cNvPr id="1" name=""/>
+        <p:cNvGrpSpPr/>
+        <p:nvPr/>
+      </p:nvGrpSpPr>
+      <p:grpSpPr>
+        <a:xfrm>
+          <a:off x="0" y="0"/>
+          <a:ext cx="0" cy="0"/>
+          <a:chOff x="0" y="0"/>
+          <a:chExt cx="0" cy="0"/>
+        </a:xfrm>
+      </p:grpSpPr>
+      <p:sp>
+        <p:nvSpPr>
+          <p:cNvPr id="4" name="Titre 3">
+            <a:extLst>
+              <a:ext uri="{FF2B5EF4-FFF2-40B4-BE49-F238E27FC236}">
+                <a16:creationId xmlns:a16="http://schemas.microsoft.com/office/drawing/2014/main" id="{80E590DF-0A88-7056-85D1-A8E809E2318F}"/>
+              </a:ext>
+            </a:extLst>
+          </p:cNvPr>
+          <p:cNvSpPr>
+            <a:spLocks noGrp="1"/>
+          </p:cNvSpPr>
+          <p:nvPr>
+            <p:ph type="title"/>
+          </p:nvPr>
+        </p:nvSpPr>
+        <p:spPr>
+          <a:xfrm>
+            <a:off x="831850" y="1709738"/>
+            <a:ext cx="10515600" cy="1837859"/>
+          </a:xfrm>
+        </p:spPr>
+        <p:txBody>
+          <a:bodyPr/>
+          <a:lstStyle/>
+          <a:p>
+            <a:pPr algn="ctr"/>
+            <a:r>
+              <a:rPr lang="fr-FR" dirty="0"/>
+              <a:t>Code </a:t>
+            </a:r>
+            <a:r>
+              <a:rPr lang="fr-FR" dirty="0" err="1"/>
+              <a:t>Review</a:t>
+            </a:r>
+            <a:endParaRPr lang="fr-FR" dirty="0"/>
+          </a:p>
+        </p:txBody>
+      </p:sp>
+      <p:sp>
+        <p:nvSpPr>
+          <p:cNvPr id="5" name="Espace réservé du texte 4">
+            <a:extLst>
+              <a:ext uri="{FF2B5EF4-FFF2-40B4-BE49-F238E27FC236}">
+                <a16:creationId xmlns:a16="http://schemas.microsoft.com/office/drawing/2014/main" id="{64E8BF61-007C-0740-1AA1-06B9449B33C7}"/>
+              </a:ext>
+            </a:extLst>
+          </p:cNvPr>
+          <p:cNvSpPr>
+            <a:spLocks noGrp="1"/>
+          </p:cNvSpPr>
+          <p:nvPr>
+            <p:ph type="body" idx="1"/>
+          </p:nvPr>
+        </p:nvSpPr>
+        <p:spPr/>
+        <p:txBody>
+          <a:bodyPr/>
+          <a:lstStyle/>
+          <a:p>
+            <a:endParaRPr lang="fr-FR"/>
+          </a:p>
+        </p:txBody>
+      </p:sp>
+    </p:spTree>
+    <p:extLst>
+      <p:ext uri="{BB962C8B-B14F-4D97-AF65-F5344CB8AC3E}">
+        <p14:creationId xmlns:p14="http://schemas.microsoft.com/office/powerpoint/2010/main" val="312535264"/>
+      </p:ext>
+    </p:extLst>
+  </p:cSld>
+  <p:clrMapOvr>
+    <a:masterClrMapping/>
+  </p:clrMapOvr>
+</p:sld>
+</file>
+
 <file path=ppt/slides/slide2.xml><?xml version="1.0" encoding="utf-8"?>
 <p:sld xmlns:a="http://schemas.openxmlformats.org/drawingml/2006/main" xmlns:r="http://schemas.openxmlformats.org/officeDocument/2006/relationships" xmlns:p="http://schemas.openxmlformats.org/presentationml/2006/main">
   <p:cSld>
@@ -7568,10 +7928,10 @@
       </p:pic>
       <p:pic>
         <p:nvPicPr>
-          <p:cNvPr id="8" name="Image 7">
-            <a:extLst>
-              <a:ext uri="{FF2B5EF4-FFF2-40B4-BE49-F238E27FC236}">
-                <a16:creationId xmlns:a16="http://schemas.microsoft.com/office/drawing/2014/main" id="{98F01870-7F64-E70E-7931-FB963429CC65}"/>
+          <p:cNvPr id="10" name="Image 9">
+            <a:extLst>
+              <a:ext uri="{FF2B5EF4-FFF2-40B4-BE49-F238E27FC236}">
+                <a16:creationId xmlns:a16="http://schemas.microsoft.com/office/drawing/2014/main" id="{B219E183-51F3-8F3E-F7A6-EE74696E2CF6}"/>
               </a:ext>
             </a:extLst>
           </p:cNvPr>
@@ -7582,43 +7942,6 @@
         </p:nvPicPr>
         <p:blipFill>
           <a:blip r:embed="rId4"/>
-          <a:stretch>
-            <a:fillRect/>
-          </a:stretch>
-        </p:blipFill>
-        <p:spPr>
-          <a:xfrm>
-            <a:off x="213359" y="4077423"/>
-            <a:ext cx="3168088" cy="833321"/>
-          </a:xfrm>
-          <a:prstGeom prst="rect">
-            <a:avLst/>
-          </a:prstGeom>
-          <a:effectLst>
-            <a:outerShdw blurRad="50800" dist="38100" dir="2700000" algn="tl" rotWithShape="0">
-              <a:prstClr val="black">
-                <a:alpha val="40000"/>
-              </a:prstClr>
-            </a:outerShdw>
-          </a:effectLst>
-        </p:spPr>
-      </p:pic>
-      <p:pic>
-        <p:nvPicPr>
-          <p:cNvPr id="10" name="Image 9">
-            <a:extLst>
-              <a:ext uri="{FF2B5EF4-FFF2-40B4-BE49-F238E27FC236}">
-                <a16:creationId xmlns:a16="http://schemas.microsoft.com/office/drawing/2014/main" id="{B219E183-51F3-8F3E-F7A6-EE74696E2CF6}"/>
-              </a:ext>
-            </a:extLst>
-          </p:cNvPr>
-          <p:cNvPicPr>
-            <a:picLocks noChangeAspect="1"/>
-          </p:cNvPicPr>
-          <p:nvPr/>
-        </p:nvPicPr>
-        <p:blipFill>
-          <a:blip r:embed="rId5"/>
           <a:stretch>
             <a:fillRect/>
           </a:stretch>
@@ -7655,7 +7978,7 @@
           <p:nvPr/>
         </p:nvPicPr>
         <p:blipFill>
-          <a:blip r:embed="rId6"/>
+          <a:blip r:embed="rId5"/>
           <a:stretch>
             <a:fillRect/>
           </a:stretch>
@@ -7692,7 +8015,7 @@
           <p:nvPr/>
         </p:nvPicPr>
         <p:blipFill>
-          <a:blip r:embed="rId7"/>
+          <a:blip r:embed="rId6"/>
           <a:stretch>
             <a:fillRect/>
           </a:stretch>
@@ -7729,7 +8052,7 @@
           <p:nvPr/>
         </p:nvPicPr>
         <p:blipFill>
-          <a:blip r:embed="rId8"/>
+          <a:blip r:embed="rId7"/>
           <a:stretch>
             <a:fillRect/>
           </a:stretch>
@@ -7833,7 +8156,7 @@
           <p:nvPr/>
         </p:nvPicPr>
         <p:blipFill>
-          <a:blip r:embed="rId9"/>
+          <a:blip r:embed="rId8"/>
           <a:stretch>
             <a:fillRect/>
           </a:stretch>
@@ -7870,10 +8193,10 @@
           <p:nvPr/>
         </p:nvPicPr>
         <p:blipFill>
-          <a:blip r:embed="rId10">
+          <a:blip r:embed="rId9">
             <a:extLst>
               <a:ext uri="{96DAC541-7B7A-43D3-8B79-37D633B846F1}">
-                <asvg:svgBlip xmlns:asvg="http://schemas.microsoft.com/office/drawing/2016/SVG/main" r:embed="rId11"/>
+                <asvg:svgBlip xmlns:asvg="http://schemas.microsoft.com/office/drawing/2016/SVG/main" r:embed="rId10"/>
               </a:ext>
             </a:extLst>
           </a:blip>
@@ -7906,10 +8229,10 @@
           <p:nvPr/>
         </p:nvPicPr>
         <p:blipFill>
-          <a:blip r:embed="rId12">
+          <a:blip r:embed="rId11">
             <a:extLst>
               <a:ext uri="{96DAC541-7B7A-43D3-8B79-37D633B846F1}">
-                <asvg:svgBlip xmlns:asvg="http://schemas.microsoft.com/office/drawing/2016/SVG/main" r:embed="rId13"/>
+                <asvg:svgBlip xmlns:asvg="http://schemas.microsoft.com/office/drawing/2016/SVG/main" r:embed="rId12"/>
               </a:ext>
             </a:extLst>
           </a:blip>
@@ -7942,10 +8265,10 @@
           <p:nvPr/>
         </p:nvPicPr>
         <p:blipFill>
-          <a:blip r:embed="rId14">
+          <a:blip r:embed="rId13">
             <a:extLst>
               <a:ext uri="{96DAC541-7B7A-43D3-8B79-37D633B846F1}">
-                <asvg:svgBlip xmlns:asvg="http://schemas.microsoft.com/office/drawing/2016/SVG/main" r:embed="rId15"/>
+                <asvg:svgBlip xmlns:asvg="http://schemas.microsoft.com/office/drawing/2016/SVG/main" r:embed="rId14"/>
               </a:ext>
             </a:extLst>
           </a:blip>
@@ -7978,10 +8301,10 @@
           <p:nvPr/>
         </p:nvPicPr>
         <p:blipFill>
-          <a:blip r:embed="rId16">
+          <a:blip r:embed="rId15">
             <a:extLst>
               <a:ext uri="{96DAC541-7B7A-43D3-8B79-37D633B846F1}">
-                <asvg:svgBlip xmlns:asvg="http://schemas.microsoft.com/office/drawing/2016/SVG/main" r:embed="rId17"/>
+                <asvg:svgBlip xmlns:asvg="http://schemas.microsoft.com/office/drawing/2016/SVG/main" r:embed="rId16"/>
               </a:ext>
             </a:extLst>
           </a:blip>
@@ -8014,10 +8337,10 @@
           <p:nvPr/>
         </p:nvPicPr>
         <p:blipFill>
-          <a:blip r:embed="rId18">
+          <a:blip r:embed="rId17">
             <a:extLst>
               <a:ext uri="{96DAC541-7B7A-43D3-8B79-37D633B846F1}">
-                <asvg:svgBlip xmlns:asvg="http://schemas.microsoft.com/office/drawing/2016/SVG/main" r:embed="rId19"/>
+                <asvg:svgBlip xmlns:asvg="http://schemas.microsoft.com/office/drawing/2016/SVG/main" r:embed="rId18"/>
               </a:ext>
             </a:extLst>
           </a:blip>
@@ -8029,6 +8352,36 @@
           <a:xfrm>
             <a:off x="2427727" y="2644879"/>
             <a:ext cx="914400" cy="914400"/>
+          </a:xfrm>
+          <a:prstGeom prst="rect">
+            <a:avLst/>
+          </a:prstGeom>
+        </p:spPr>
+      </p:pic>
+      <p:pic>
+        <p:nvPicPr>
+          <p:cNvPr id="4" name="Image 3">
+            <a:extLst>
+              <a:ext uri="{FF2B5EF4-FFF2-40B4-BE49-F238E27FC236}">
+                <a16:creationId xmlns:a16="http://schemas.microsoft.com/office/drawing/2014/main" id="{56A0ACCB-7D50-6852-381E-13AB02B4947C}"/>
+              </a:ext>
+            </a:extLst>
+          </p:cNvPr>
+          <p:cNvPicPr>
+            <a:picLocks noChangeAspect="1"/>
+          </p:cNvPicPr>
+          <p:nvPr/>
+        </p:nvPicPr>
+        <p:blipFill>
+          <a:blip r:embed="rId19"/>
+          <a:stretch>
+            <a:fillRect/>
+          </a:stretch>
+        </p:blipFill>
+        <p:spPr>
+          <a:xfrm>
+            <a:off x="213359" y="4089925"/>
+            <a:ext cx="3168088" cy="678352"/>
           </a:xfrm>
           <a:prstGeom prst="rect">
             <a:avLst/>
@@ -8363,40 +8716,12 @@
           <a:chExt cx="0" cy="0"/>
         </a:xfrm>
       </p:grpSpPr>
-      <p:sp>
-        <p:nvSpPr>
-          <p:cNvPr id="2" name="Titre 1">
-            <a:extLst>
-              <a:ext uri="{FF2B5EF4-FFF2-40B4-BE49-F238E27FC236}">
-                <a16:creationId xmlns:a16="http://schemas.microsoft.com/office/drawing/2014/main" id="{C9D5C376-48FD-431A-1BC9-093D4CF79FA5}"/>
-              </a:ext>
-            </a:extLst>
-          </p:cNvPr>
-          <p:cNvSpPr>
-            <a:spLocks noGrp="1"/>
-          </p:cNvSpPr>
-          <p:nvPr>
-            <p:ph type="title"/>
-          </p:nvPr>
-        </p:nvSpPr>
-        <p:spPr/>
-        <p:txBody>
-          <a:bodyPr/>
-          <a:lstStyle/>
-          <a:p>
-            <a:r>
-              <a:rPr lang="fr-FR" dirty="0"/>
-              <a:t>Transfer learning : BERT</a:t>
-            </a:r>
-          </a:p>
-        </p:txBody>
-      </p:sp>
       <p:pic>
         <p:nvPicPr>
-          <p:cNvPr id="6" name="Image 5">
-            <a:extLst>
-              <a:ext uri="{FF2B5EF4-FFF2-40B4-BE49-F238E27FC236}">
-                <a16:creationId xmlns:a16="http://schemas.microsoft.com/office/drawing/2014/main" id="{5B89E3E9-73E4-5392-63AB-FD759386D9DF}"/>
+          <p:cNvPr id="7" name="Image 6">
+            <a:extLst>
+              <a:ext uri="{FF2B5EF4-FFF2-40B4-BE49-F238E27FC236}">
+                <a16:creationId xmlns:a16="http://schemas.microsoft.com/office/drawing/2014/main" id="{021C3181-9E15-C029-00E2-42449F39DC16}"/>
               </a:ext>
             </a:extLst>
           </p:cNvPr>
@@ -8413,7 +8738,350 @@
         </p:blipFill>
         <p:spPr>
           <a:xfrm>
-            <a:off x="7999120" y="2674620"/>
+            <a:off x="235935" y="3440912"/>
+            <a:ext cx="3717910" cy="2773679"/>
+          </a:xfrm>
+          <a:prstGeom prst="rect">
+            <a:avLst/>
+          </a:prstGeom>
+          <a:effectLst>
+            <a:outerShdw blurRad="50800" dist="38100" dir="2700000" algn="tl" rotWithShape="0">
+              <a:prstClr val="black">
+                <a:alpha val="40000"/>
+              </a:prstClr>
+            </a:outerShdw>
+          </a:effectLst>
+        </p:spPr>
+      </p:pic>
+      <p:sp>
+        <p:nvSpPr>
+          <p:cNvPr id="2" name="Titre 1">
+            <a:extLst>
+              <a:ext uri="{FF2B5EF4-FFF2-40B4-BE49-F238E27FC236}">
+                <a16:creationId xmlns:a16="http://schemas.microsoft.com/office/drawing/2014/main" id="{C9D5C376-48FD-431A-1BC9-093D4CF79FA5}"/>
+              </a:ext>
+            </a:extLst>
+          </p:cNvPr>
+          <p:cNvSpPr>
+            <a:spLocks noGrp="1"/>
+          </p:cNvSpPr>
+          <p:nvPr>
+            <p:ph type="title"/>
+          </p:nvPr>
+        </p:nvSpPr>
+        <p:spPr/>
+        <p:txBody>
+          <a:bodyPr>
+            <a:normAutofit/>
+          </a:bodyPr>
+          <a:lstStyle/>
+          <a:p>
+            <a:r>
+              <a:rPr lang="fr-FR" dirty="0"/>
+              <a:t>Transfer learning : BERT </a:t>
+            </a:r>
+            <a:r>
+              <a:rPr lang="fr-FR" sz="2800" dirty="0"/>
+              <a:t>(</a:t>
+            </a:r>
+            <a:r>
+              <a:rPr lang="fr-FR" sz="2800" dirty="0" err="1"/>
+              <a:t>freezed</a:t>
+            </a:r>
+            <a:r>
+              <a:rPr lang="fr-FR" sz="2800" dirty="0"/>
+              <a:t>, </a:t>
+            </a:r>
+            <a:r>
+              <a:rPr lang="fr-FR" sz="2800" dirty="0" err="1"/>
+              <a:t>uncased</a:t>
+            </a:r>
+            <a:r>
+              <a:rPr lang="fr-FR" sz="2800" dirty="0"/>
+              <a:t>)</a:t>
+            </a:r>
+            <a:endParaRPr lang="fr-FR" dirty="0"/>
+          </a:p>
+        </p:txBody>
+      </p:sp>
+      <p:pic>
+        <p:nvPicPr>
+          <p:cNvPr id="19" name="Image 18">
+            <a:extLst>
+              <a:ext uri="{FF2B5EF4-FFF2-40B4-BE49-F238E27FC236}">
+                <a16:creationId xmlns:a16="http://schemas.microsoft.com/office/drawing/2014/main" id="{53B19E68-B5FA-6930-E7D3-25EC7616B0D7}"/>
+              </a:ext>
+            </a:extLst>
+          </p:cNvPr>
+          <p:cNvPicPr>
+            <a:picLocks noChangeAspect="1"/>
+          </p:cNvPicPr>
+          <p:nvPr/>
+        </p:nvPicPr>
+        <p:blipFill>
+          <a:blip r:embed="rId4"/>
+          <a:stretch>
+            <a:fillRect/>
+          </a:stretch>
+        </p:blipFill>
+        <p:spPr>
+          <a:xfrm>
+            <a:off x="4744350" y="1178091"/>
+            <a:ext cx="7223760" cy="1670832"/>
+          </a:xfrm>
+          <a:prstGeom prst="rect">
+            <a:avLst/>
+          </a:prstGeom>
+          <a:effectLst>
+            <a:outerShdw blurRad="50800" dist="38100" dir="2700000" algn="tl" rotWithShape="0">
+              <a:prstClr val="black">
+                <a:alpha val="40000"/>
+              </a:prstClr>
+            </a:outerShdw>
+          </a:effectLst>
+        </p:spPr>
+      </p:pic>
+      <p:sp>
+        <p:nvSpPr>
+          <p:cNvPr id="20" name="ZoneTexte 19">
+            <a:extLst>
+              <a:ext uri="{FF2B5EF4-FFF2-40B4-BE49-F238E27FC236}">
+                <a16:creationId xmlns:a16="http://schemas.microsoft.com/office/drawing/2014/main" id="{B46825B3-C8F2-FD5A-CD69-073F76F8B11D}"/>
+              </a:ext>
+            </a:extLst>
+          </p:cNvPr>
+          <p:cNvSpPr txBox="1"/>
+          <p:nvPr/>
+        </p:nvSpPr>
+        <p:spPr>
+          <a:xfrm>
+            <a:off x="9126160" y="4195292"/>
+            <a:ext cx="2841950" cy="738664"/>
+          </a:xfrm>
+          <a:prstGeom prst="rect">
+            <a:avLst/>
+          </a:prstGeom>
+          <a:solidFill>
+            <a:schemeClr val="bg1">
+              <a:lumMod val="95000"/>
+            </a:schemeClr>
+          </a:solidFill>
+          <a:effectLst>
+            <a:outerShdw blurRad="50800" dist="38100" dir="2700000" algn="tl" rotWithShape="0">
+              <a:prstClr val="black">
+                <a:alpha val="40000"/>
+              </a:prstClr>
+            </a:outerShdw>
+          </a:effectLst>
+        </p:spPr>
+        <p:txBody>
+          <a:bodyPr wrap="square" rtlCol="0">
+            <a:spAutoFit/>
+          </a:bodyPr>
+          <a:lstStyle/>
+          <a:p>
+            <a:r>
+              <a:rPr lang="fr-FR" sz="1400" dirty="0" err="1">
+                <a:latin typeface="Courier New" panose="02070309020205020404" pitchFamily="49" charset="0"/>
+                <a:cs typeface="Courier New" panose="02070309020205020404" pitchFamily="49" charset="0"/>
+              </a:rPr>
+              <a:t>Precision</a:t>
+            </a:r>
+            <a:r>
+              <a:rPr lang="fr-FR" sz="1400" dirty="0">
+                <a:latin typeface="Courier New" panose="02070309020205020404" pitchFamily="49" charset="0"/>
+                <a:cs typeface="Courier New" panose="02070309020205020404" pitchFamily="49" charset="0"/>
+              </a:rPr>
+              <a:t> : 0.82 vs 0.98</a:t>
+            </a:r>
+          </a:p>
+          <a:p>
+            <a:r>
+              <a:rPr lang="fr-FR" sz="1400" dirty="0">
+                <a:latin typeface="Courier New" panose="02070309020205020404" pitchFamily="49" charset="0"/>
+                <a:cs typeface="Courier New" panose="02070309020205020404" pitchFamily="49" charset="0"/>
+              </a:rPr>
+              <a:t>Recall    : 0.33 vs 0.89</a:t>
+            </a:r>
+          </a:p>
+          <a:p>
+            <a:r>
+              <a:rPr lang="fr-FR" sz="1400" dirty="0">
+                <a:latin typeface="Courier New" panose="02070309020205020404" pitchFamily="49" charset="0"/>
+                <a:cs typeface="Courier New" panose="02070309020205020404" pitchFamily="49" charset="0"/>
+              </a:rPr>
+              <a:t>F1        : 0.47 vs 0.93</a:t>
+            </a:r>
+          </a:p>
+        </p:txBody>
+      </p:sp>
+      <p:pic>
+        <p:nvPicPr>
+          <p:cNvPr id="4" name="Image 3">
+            <a:extLst>
+              <a:ext uri="{FF2B5EF4-FFF2-40B4-BE49-F238E27FC236}">
+                <a16:creationId xmlns:a16="http://schemas.microsoft.com/office/drawing/2014/main" id="{7CA78895-3DB6-76B4-F344-4850294BBC37}"/>
+              </a:ext>
+            </a:extLst>
+          </p:cNvPr>
+          <p:cNvPicPr>
+            <a:picLocks noChangeAspect="1"/>
+          </p:cNvPicPr>
+          <p:nvPr/>
+        </p:nvPicPr>
+        <p:blipFill>
+          <a:blip r:embed="rId5"/>
+          <a:stretch>
+            <a:fillRect/>
+          </a:stretch>
+        </p:blipFill>
+        <p:spPr>
+          <a:xfrm>
+            <a:off x="213360" y="1083865"/>
+            <a:ext cx="4053446" cy="1296000"/>
+          </a:xfrm>
+          <a:prstGeom prst="rect">
+            <a:avLst/>
+          </a:prstGeom>
+        </p:spPr>
+      </p:pic>
+      <p:pic>
+        <p:nvPicPr>
+          <p:cNvPr id="10" name="Image 9">
+            <a:extLst>
+              <a:ext uri="{FF2B5EF4-FFF2-40B4-BE49-F238E27FC236}">
+                <a16:creationId xmlns:a16="http://schemas.microsoft.com/office/drawing/2014/main" id="{24528A4E-7429-5BA0-696A-515DD39FA236}"/>
+              </a:ext>
+            </a:extLst>
+          </p:cNvPr>
+          <p:cNvPicPr>
+            <a:picLocks noChangeAspect="1"/>
+          </p:cNvPicPr>
+          <p:nvPr/>
+        </p:nvPicPr>
+        <p:blipFill>
+          <a:blip r:embed="rId6"/>
+          <a:stretch>
+            <a:fillRect/>
+          </a:stretch>
+        </p:blipFill>
+        <p:spPr>
+          <a:xfrm>
+            <a:off x="4559118" y="3440912"/>
+            <a:ext cx="3673072" cy="2740229"/>
+          </a:xfrm>
+          <a:prstGeom prst="rect">
+            <a:avLst/>
+          </a:prstGeom>
+          <a:effectLst>
+            <a:outerShdw blurRad="50800" dist="38100" dir="2700000" algn="tl" rotWithShape="0">
+              <a:prstClr val="black">
+                <a:alpha val="40000"/>
+              </a:prstClr>
+            </a:outerShdw>
+          </a:effectLst>
+        </p:spPr>
+      </p:pic>
+    </p:spTree>
+    <p:extLst>
+      <p:ext uri="{BB962C8B-B14F-4D97-AF65-F5344CB8AC3E}">
+        <p14:creationId xmlns:p14="http://schemas.microsoft.com/office/powerpoint/2010/main" val="2840346932"/>
+      </p:ext>
+    </p:extLst>
+  </p:cSld>
+  <p:clrMapOvr>
+    <a:masterClrMapping/>
+  </p:clrMapOvr>
+</p:sld>
+</file>
+
+<file path=ppt/slides/slide8.xml><?xml version="1.0" encoding="utf-8"?>
+<p:sld xmlns:a="http://schemas.openxmlformats.org/drawingml/2006/main" xmlns:r="http://schemas.openxmlformats.org/officeDocument/2006/relationships" xmlns:p="http://schemas.openxmlformats.org/presentationml/2006/main">
+  <p:cSld>
+    <p:spTree>
+      <p:nvGrpSpPr>
+        <p:cNvPr id="1" name=""/>
+        <p:cNvGrpSpPr/>
+        <p:nvPr/>
+      </p:nvGrpSpPr>
+      <p:grpSpPr>
+        <a:xfrm>
+          <a:off x="0" y="0"/>
+          <a:ext cx="0" cy="0"/>
+          <a:chOff x="0" y="0"/>
+          <a:chExt cx="0" cy="0"/>
+        </a:xfrm>
+      </p:grpSpPr>
+      <p:sp>
+        <p:nvSpPr>
+          <p:cNvPr id="2" name="Titre 1">
+            <a:extLst>
+              <a:ext uri="{FF2B5EF4-FFF2-40B4-BE49-F238E27FC236}">
+                <a16:creationId xmlns:a16="http://schemas.microsoft.com/office/drawing/2014/main" id="{C9D5C376-48FD-431A-1BC9-093D4CF79FA5}"/>
+              </a:ext>
+            </a:extLst>
+          </p:cNvPr>
+          <p:cNvSpPr>
+            <a:spLocks noGrp="1"/>
+          </p:cNvSpPr>
+          <p:nvPr>
+            <p:ph type="title"/>
+          </p:nvPr>
+        </p:nvSpPr>
+        <p:spPr/>
+        <p:txBody>
+          <a:bodyPr>
+            <a:normAutofit/>
+          </a:bodyPr>
+          <a:lstStyle/>
+          <a:p>
+            <a:r>
+              <a:rPr lang="fr-FR" dirty="0"/>
+              <a:t>Transfer learning : BERT</a:t>
+            </a:r>
+            <a:r>
+              <a:rPr lang="fr-FR" sz="3600" dirty="0"/>
+              <a:t> </a:t>
+            </a:r>
+            <a:r>
+              <a:rPr lang="fr-FR" sz="2800" dirty="0"/>
+              <a:t>(</a:t>
+            </a:r>
+            <a:r>
+              <a:rPr lang="fr-FR" sz="2800" dirty="0" err="1"/>
+              <a:t>unfreezed</a:t>
+            </a:r>
+            <a:r>
+              <a:rPr lang="fr-FR" sz="2800" dirty="0"/>
+              <a:t>)</a:t>
+            </a:r>
+            <a:endParaRPr lang="fr-FR" dirty="0"/>
+          </a:p>
+        </p:txBody>
+      </p:sp>
+      <p:pic>
+        <p:nvPicPr>
+          <p:cNvPr id="6" name="Image 5">
+            <a:extLst>
+              <a:ext uri="{FF2B5EF4-FFF2-40B4-BE49-F238E27FC236}">
+                <a16:creationId xmlns:a16="http://schemas.microsoft.com/office/drawing/2014/main" id="{5B89E3E9-73E4-5392-63AB-FD759386D9DF}"/>
+              </a:ext>
+            </a:extLst>
+          </p:cNvPr>
+          <p:cNvPicPr>
+            <a:picLocks noChangeAspect="1"/>
+          </p:cNvPicPr>
+          <p:nvPr/>
+        </p:nvPicPr>
+        <p:blipFill>
+          <a:blip r:embed="rId3"/>
+          <a:stretch>
+            <a:fillRect/>
+          </a:stretch>
+        </p:blipFill>
+        <p:spPr>
+          <a:xfrm>
+            <a:off x="7999120" y="2520075"/>
             <a:ext cx="3979520" cy="4064822"/>
           </a:xfrm>
           <a:prstGeom prst="rect">
@@ -8450,7 +9118,7 @@
         </p:blipFill>
         <p:spPr>
           <a:xfrm>
-            <a:off x="184672" y="2674620"/>
+            <a:off x="184672" y="2520075"/>
             <a:ext cx="3717912" cy="2773680"/>
           </a:xfrm>
           <a:prstGeom prst="rect">
@@ -8487,7 +9155,7 @@
         </p:blipFill>
         <p:spPr>
           <a:xfrm>
-            <a:off x="4091896" y="2674620"/>
+            <a:off x="4091896" y="2520075"/>
             <a:ext cx="3717912" cy="2773680"/>
           </a:xfrm>
           <a:prstGeom prst="rect">
@@ -8516,7 +9184,7 @@
         </p:nvSpPr>
         <p:spPr>
           <a:xfrm rot="20425850">
-            <a:off x="8328660" y="4583920"/>
+            <a:off x="8328660" y="3469900"/>
             <a:ext cx="958917" cy="246221"/>
           </a:xfrm>
           <a:prstGeom prst="rect">
@@ -8577,7 +9245,7 @@
         </p:nvSpPr>
         <p:spPr>
           <a:xfrm rot="20567996">
-            <a:off x="2396944" y="3784759"/>
+            <a:off x="2396944" y="3630214"/>
             <a:ext cx="830676" cy="246221"/>
           </a:xfrm>
           <a:prstGeom prst="rect">
@@ -8625,58 +9293,21 @@
           </a:p>
         </p:txBody>
       </p:sp>
-      <p:pic>
-        <p:nvPicPr>
-          <p:cNvPr id="19" name="Image 18">
-            <a:extLst>
-              <a:ext uri="{FF2B5EF4-FFF2-40B4-BE49-F238E27FC236}">
-                <a16:creationId xmlns:a16="http://schemas.microsoft.com/office/drawing/2014/main" id="{53B19E68-B5FA-6930-E7D3-25EC7616B0D7}"/>
-              </a:ext>
-            </a:extLst>
-          </p:cNvPr>
-          <p:cNvPicPr>
-            <a:picLocks noChangeAspect="1"/>
-          </p:cNvPicPr>
+      <p:sp>
+        <p:nvSpPr>
+          <p:cNvPr id="20" name="ZoneTexte 19">
+            <a:extLst>
+              <a:ext uri="{FF2B5EF4-FFF2-40B4-BE49-F238E27FC236}">
+                <a16:creationId xmlns:a16="http://schemas.microsoft.com/office/drawing/2014/main" id="{B46825B3-C8F2-FD5A-CD69-073F76F8B11D}"/>
+              </a:ext>
+            </a:extLst>
+          </p:cNvPr>
+          <p:cNvSpPr txBox="1"/>
           <p:nvPr/>
-        </p:nvPicPr>
-        <p:blipFill>
-          <a:blip r:embed="rId6"/>
-          <a:stretch>
-            <a:fillRect/>
-          </a:stretch>
-        </p:blipFill>
+        </p:nvSpPr>
         <p:spPr>
           <a:xfrm>
-            <a:off x="2484120" y="881879"/>
-            <a:ext cx="7223760" cy="1670832"/>
-          </a:xfrm>
-          <a:prstGeom prst="rect">
-            <a:avLst/>
-          </a:prstGeom>
-          <a:effectLst>
-            <a:outerShdw blurRad="50800" dist="38100" dir="2700000" algn="tl" rotWithShape="0">
-              <a:prstClr val="black">
-                <a:alpha val="40000"/>
-              </a:prstClr>
-            </a:outerShdw>
-          </a:effectLst>
-        </p:spPr>
-      </p:pic>
-      <p:sp>
-        <p:nvSpPr>
-          <p:cNvPr id="20" name="ZoneTexte 19">
-            <a:extLst>
-              <a:ext uri="{FF2B5EF4-FFF2-40B4-BE49-F238E27FC236}">
-                <a16:creationId xmlns:a16="http://schemas.microsoft.com/office/drawing/2014/main" id="{B46825B3-C8F2-FD5A-CD69-073F76F8B11D}"/>
-              </a:ext>
-            </a:extLst>
-          </p:cNvPr>
-          <p:cNvSpPr txBox="1"/>
-          <p:nvPr/>
-        </p:nvSpPr>
-        <p:spPr>
-          <a:xfrm>
-            <a:off x="4091896" y="5707051"/>
+            <a:off x="4091896" y="5552506"/>
             <a:ext cx="3631122" cy="923330"/>
           </a:xfrm>
           <a:prstGeom prst="rect">
@@ -8736,284 +9367,40 @@
           </a:p>
         </p:txBody>
       </p:sp>
+      <p:pic>
+        <p:nvPicPr>
+          <p:cNvPr id="12" name="Image 11">
+            <a:extLst>
+              <a:ext uri="{FF2B5EF4-FFF2-40B4-BE49-F238E27FC236}">
+                <a16:creationId xmlns:a16="http://schemas.microsoft.com/office/drawing/2014/main" id="{A7B46FF0-27BB-E16C-88E4-DADF374F8C37}"/>
+              </a:ext>
+            </a:extLst>
+          </p:cNvPr>
+          <p:cNvPicPr>
+            <a:picLocks noChangeAspect="1"/>
+          </p:cNvPicPr>
+          <p:nvPr/>
+        </p:nvPicPr>
+        <p:blipFill>
+          <a:blip r:embed="rId6"/>
+          <a:stretch>
+            <a:fillRect/>
+          </a:stretch>
+        </p:blipFill>
+        <p:spPr>
+          <a:xfrm>
+            <a:off x="213360" y="1006597"/>
+            <a:ext cx="3519020" cy="1322118"/>
+          </a:xfrm>
+          <a:prstGeom prst="rect">
+            <a:avLst/>
+          </a:prstGeom>
+        </p:spPr>
+      </p:pic>
     </p:spTree>
     <p:extLst>
       <p:ext uri="{BB962C8B-B14F-4D97-AF65-F5344CB8AC3E}">
         <p14:creationId xmlns:p14="http://schemas.microsoft.com/office/powerpoint/2010/main" val="52206540"/>
-      </p:ext>
-    </p:extLst>
-  </p:cSld>
-  <p:clrMapOvr>
-    <a:masterClrMapping/>
-  </p:clrMapOvr>
-</p:sld>
-</file>
-
-<file path=ppt/slides/slide8.xml><?xml version="1.0" encoding="utf-8"?>
-<p:sld xmlns:a="http://schemas.openxmlformats.org/drawingml/2006/main" xmlns:r="http://schemas.openxmlformats.org/officeDocument/2006/relationships" xmlns:p="http://schemas.openxmlformats.org/presentationml/2006/main">
-  <p:cSld>
-    <p:spTree>
-      <p:nvGrpSpPr>
-        <p:cNvPr id="1" name=""/>
-        <p:cNvGrpSpPr/>
-        <p:nvPr/>
-      </p:nvGrpSpPr>
-      <p:grpSpPr>
-        <a:xfrm>
-          <a:off x="0" y="0"/>
-          <a:ext cx="0" cy="0"/>
-          <a:chOff x="0" y="0"/>
-          <a:chExt cx="0" cy="0"/>
-        </a:xfrm>
-      </p:grpSpPr>
-      <p:sp>
-        <p:nvSpPr>
-          <p:cNvPr id="2" name="Titre 1">
-            <a:extLst>
-              <a:ext uri="{FF2B5EF4-FFF2-40B4-BE49-F238E27FC236}">
-                <a16:creationId xmlns:a16="http://schemas.microsoft.com/office/drawing/2014/main" id="{F13D07B4-C7D9-46E1-38A0-A6EEF16B48EB}"/>
-              </a:ext>
-            </a:extLst>
-          </p:cNvPr>
-          <p:cNvSpPr>
-            <a:spLocks noGrp="1"/>
-          </p:cNvSpPr>
-          <p:nvPr>
-            <p:ph type="title"/>
-          </p:nvPr>
-        </p:nvSpPr>
-        <p:spPr/>
-        <p:txBody>
-          <a:bodyPr/>
-          <a:lstStyle/>
-          <a:p>
-            <a:r>
-              <a:rPr lang="fr-FR" dirty="0" err="1"/>
-              <a:t>Take</a:t>
-            </a:r>
-            <a:r>
-              <a:rPr lang="fr-FR" dirty="0"/>
-              <a:t> </a:t>
-            </a:r>
-            <a:r>
-              <a:rPr lang="fr-FR" dirty="0" err="1"/>
-              <a:t>away</a:t>
-            </a:r>
-            <a:endParaRPr lang="fr-FR" dirty="0"/>
-          </a:p>
-        </p:txBody>
-      </p:sp>
-      <p:sp>
-        <p:nvSpPr>
-          <p:cNvPr id="3" name="Espace réservé du contenu 2">
-            <a:extLst>
-              <a:ext uri="{FF2B5EF4-FFF2-40B4-BE49-F238E27FC236}">
-                <a16:creationId xmlns:a16="http://schemas.microsoft.com/office/drawing/2014/main" id="{1A803C62-BD0B-D0AC-2B41-C4F420891B06}"/>
-              </a:ext>
-            </a:extLst>
-          </p:cNvPr>
-          <p:cNvSpPr>
-            <a:spLocks noGrp="1"/>
-          </p:cNvSpPr>
-          <p:nvPr>
-            <p:ph idx="1"/>
-          </p:nvPr>
-        </p:nvSpPr>
-        <p:spPr/>
-        <p:txBody>
-          <a:bodyPr/>
-          <a:lstStyle/>
-          <a:p>
-            <a:r>
-              <a:rPr lang="fr-FR" dirty="0"/>
-              <a:t>So far, </a:t>
-            </a:r>
-            <a:r>
-              <a:rPr lang="fr-FR" dirty="0" err="1"/>
-              <a:t>working</a:t>
-            </a:r>
-            <a:r>
-              <a:rPr lang="fr-FR" dirty="0"/>
-              <a:t> on the </a:t>
-            </a:r>
-            <a:r>
-              <a:rPr lang="fr-FR" dirty="0" err="1"/>
-              <a:t>projects</a:t>
-            </a:r>
-            <a:r>
-              <a:rPr lang="fr-FR" dirty="0"/>
-              <a:t> I </a:t>
-            </a:r>
-            <a:r>
-              <a:rPr lang="fr-FR" dirty="0" err="1"/>
-              <a:t>learn</a:t>
-            </a:r>
-            <a:r>
-              <a:rPr lang="fr-FR" dirty="0"/>
-              <a:t> 2 </a:t>
-            </a:r>
-            <a:r>
-              <a:rPr lang="fr-FR" dirty="0" err="1"/>
-              <a:t>things</a:t>
-            </a:r>
-            <a:endParaRPr lang="fr-FR" dirty="0"/>
-          </a:p>
-          <a:p>
-            <a:pPr marL="914400" lvl="1" indent="-457200">
-              <a:buFont typeface="+mj-lt"/>
-              <a:buAutoNum type="arabicPeriod"/>
-            </a:pPr>
-            <a:r>
-              <a:rPr lang="fr-FR" dirty="0"/>
-              <a:t>Don't mess </a:t>
-            </a:r>
-            <a:r>
-              <a:rPr lang="fr-FR" dirty="0" err="1"/>
-              <a:t>with</a:t>
-            </a:r>
-            <a:r>
-              <a:rPr lang="fr-FR" dirty="0"/>
-              <a:t> EDA. Never !</a:t>
-            </a:r>
-          </a:p>
-          <a:p>
-            <a:pPr marL="914400" lvl="1" indent="-457200">
-              <a:buFont typeface="+mj-lt"/>
-              <a:buAutoNum type="arabicPeriod"/>
-            </a:pPr>
-            <a:r>
-              <a:rPr lang="fr-FR" dirty="0"/>
-              <a:t>Get a </a:t>
-            </a:r>
-            <a:r>
-              <a:rPr lang="fr-FR" dirty="0" err="1"/>
-              <a:t>baseline</a:t>
-            </a:r>
-            <a:r>
-              <a:rPr lang="fr-FR" dirty="0"/>
-              <a:t> model. Quick !</a:t>
-            </a:r>
-          </a:p>
-          <a:p>
-            <a:r>
-              <a:rPr lang="fr-FR" dirty="0"/>
-              <a:t>It </a:t>
-            </a:r>
-            <a:r>
-              <a:rPr lang="fr-FR" dirty="0" err="1"/>
-              <a:t>is</a:t>
-            </a:r>
-            <a:r>
-              <a:rPr lang="fr-FR" dirty="0"/>
-              <a:t> true </a:t>
-            </a:r>
-            <a:r>
-              <a:rPr lang="fr-FR" dirty="0" err="1"/>
-              <a:t>here</a:t>
-            </a:r>
-            <a:r>
-              <a:rPr lang="fr-FR" dirty="0"/>
-              <a:t> </a:t>
-            </a:r>
-            <a:r>
-              <a:rPr lang="fr-FR" dirty="0" err="1"/>
-              <a:t>too</a:t>
-            </a:r>
-            <a:endParaRPr lang="fr-FR" dirty="0"/>
-          </a:p>
-          <a:p>
-            <a:endParaRPr lang="fr-FR" dirty="0"/>
-          </a:p>
-          <a:p>
-            <a:r>
-              <a:rPr lang="fr-FR" dirty="0" err="1"/>
-              <a:t>Impressed</a:t>
-            </a:r>
-            <a:r>
-              <a:rPr lang="fr-FR" dirty="0"/>
-              <a:t> by the </a:t>
-            </a:r>
-            <a:r>
-              <a:rPr lang="fr-FR" dirty="0" err="1"/>
-              <a:t>results</a:t>
-            </a:r>
-            <a:r>
-              <a:rPr lang="fr-FR" dirty="0"/>
-              <a:t> of the </a:t>
-            </a:r>
-            <a:r>
-              <a:rPr lang="fr-FR" dirty="0" err="1"/>
-              <a:t>baseline</a:t>
-            </a:r>
-            <a:r>
-              <a:rPr lang="fr-FR" dirty="0"/>
-              <a:t> model</a:t>
-            </a:r>
-          </a:p>
-          <a:p>
-            <a:r>
-              <a:rPr lang="fr-FR"/>
-              <a:t>BERT help to </a:t>
-            </a:r>
-            <a:r>
-              <a:rPr lang="fr-FR" dirty="0" err="1"/>
-              <a:t>keep</a:t>
-            </a:r>
-            <a:r>
-              <a:rPr lang="fr-FR" dirty="0"/>
-              <a:t> the </a:t>
-            </a:r>
-            <a:r>
-              <a:rPr lang="fr-FR" dirty="0" err="1"/>
-              <a:t>Precision</a:t>
-            </a:r>
-            <a:r>
-              <a:rPr lang="fr-FR" dirty="0"/>
-              <a:t> </a:t>
-            </a:r>
-            <a:r>
-              <a:rPr lang="fr-FR" dirty="0" err="1"/>
-              <a:t>while</a:t>
-            </a:r>
-            <a:r>
-              <a:rPr lang="fr-FR" dirty="0"/>
-              <a:t> </a:t>
-            </a:r>
-            <a:r>
-              <a:rPr lang="fr-FR" dirty="0" err="1"/>
-              <a:t>improving</a:t>
-            </a:r>
-            <a:r>
-              <a:rPr lang="fr-FR" dirty="0"/>
-              <a:t> the Accuracy but at the </a:t>
-            </a:r>
-            <a:r>
-              <a:rPr lang="fr-FR" dirty="0" err="1"/>
-              <a:t>cost</a:t>
-            </a:r>
-            <a:r>
-              <a:rPr lang="fr-FR" dirty="0"/>
-              <a:t> of training time</a:t>
-            </a:r>
-          </a:p>
-          <a:p>
-            <a:endParaRPr lang="fr-FR" dirty="0"/>
-          </a:p>
-          <a:p>
-            <a:pPr marL="457200" lvl="1" indent="0">
-              <a:buNone/>
-            </a:pPr>
-            <a:endParaRPr lang="fr-FR" dirty="0"/>
-          </a:p>
-          <a:p>
-            <a:endParaRPr lang="fr-FR" dirty="0"/>
-          </a:p>
-        </p:txBody>
-      </p:sp>
-    </p:spTree>
-    <p:extLst>
-      <p:ext uri="{BB962C8B-B14F-4D97-AF65-F5344CB8AC3E}">
-        <p14:creationId xmlns:p14="http://schemas.microsoft.com/office/powerpoint/2010/main" val="3201622378"/>
       </p:ext>
     </p:extLst>
   </p:cSld>
@@ -9042,10 +9429,10 @@
       </p:grpSpPr>
       <p:sp>
         <p:nvSpPr>
-          <p:cNvPr id="4" name="Titre 3">
-            <a:extLst>
-              <a:ext uri="{FF2B5EF4-FFF2-40B4-BE49-F238E27FC236}">
-                <a16:creationId xmlns:a16="http://schemas.microsoft.com/office/drawing/2014/main" id="{80E590DF-0A88-7056-85D1-A8E809E2318F}"/>
+          <p:cNvPr id="2" name="Titre 1">
+            <a:extLst>
+              <a:ext uri="{FF2B5EF4-FFF2-40B4-BE49-F238E27FC236}">
+                <a16:creationId xmlns:a16="http://schemas.microsoft.com/office/drawing/2014/main" id="{F13D07B4-C7D9-46E1-38A0-A6EEF16B48EB}"/>
               </a:ext>
             </a:extLst>
           </p:cNvPr>
@@ -9056,24 +9443,22 @@
             <p:ph type="title"/>
           </p:nvPr>
         </p:nvSpPr>
-        <p:spPr>
-          <a:xfrm>
-            <a:off x="831850" y="1709738"/>
-            <a:ext cx="10515600" cy="1837859"/>
-          </a:xfrm>
-        </p:spPr>
+        <p:spPr/>
         <p:txBody>
           <a:bodyPr/>
           <a:lstStyle/>
           <a:p>
-            <a:pPr algn="ctr"/>
+            <a:r>
+              <a:rPr lang="fr-FR" dirty="0" err="1"/>
+              <a:t>Take</a:t>
+            </a:r>
             <a:r>
               <a:rPr lang="fr-FR" dirty="0"/>
-              <a:t>Code </a:t>
+              <a:t> </a:t>
             </a:r>
             <a:r>
               <a:rPr lang="fr-FR" dirty="0" err="1"/>
-              <a:t>Review</a:t>
+              <a:t>away</a:t>
             </a:r>
             <a:endParaRPr lang="fr-FR" dirty="0"/>
           </a:p>
@@ -9081,10 +9466,10 @@
       </p:sp>
       <p:sp>
         <p:nvSpPr>
-          <p:cNvPr id="5" name="Espace réservé du texte 4">
-            <a:extLst>
-              <a:ext uri="{FF2B5EF4-FFF2-40B4-BE49-F238E27FC236}">
-                <a16:creationId xmlns:a16="http://schemas.microsoft.com/office/drawing/2014/main" id="{64E8BF61-007C-0740-1AA1-06B9449B33C7}"/>
+          <p:cNvPr id="3" name="Espace réservé du contenu 2">
+            <a:extLst>
+              <a:ext uri="{FF2B5EF4-FFF2-40B4-BE49-F238E27FC236}">
+                <a16:creationId xmlns:a16="http://schemas.microsoft.com/office/drawing/2014/main" id="{1A803C62-BD0B-D0AC-2B41-C4F420891B06}"/>
               </a:ext>
             </a:extLst>
           </p:cNvPr>
@@ -9092,7 +9477,7 @@
             <a:spLocks noGrp="1"/>
           </p:cNvSpPr>
           <p:nvPr>
-            <p:ph type="body" idx="1"/>
+            <p:ph idx="1"/>
           </p:nvPr>
         </p:nvSpPr>
         <p:spPr/>
@@ -9100,14 +9485,204 @@
           <a:bodyPr/>
           <a:lstStyle/>
           <a:p>
-            <a:endParaRPr lang="fr-FR"/>
+            <a:r>
+              <a:rPr lang="fr-FR" dirty="0"/>
+              <a:t>So far, </a:t>
+            </a:r>
+            <a:r>
+              <a:rPr lang="fr-FR" dirty="0" err="1"/>
+              <a:t>working</a:t>
+            </a:r>
+            <a:r>
+              <a:rPr lang="fr-FR" dirty="0"/>
+              <a:t> on the </a:t>
+            </a:r>
+            <a:r>
+              <a:rPr lang="fr-FR" dirty="0" err="1"/>
+              <a:t>projects</a:t>
+            </a:r>
+            <a:r>
+              <a:rPr lang="fr-FR" dirty="0"/>
+              <a:t> I </a:t>
+            </a:r>
+            <a:r>
+              <a:rPr lang="fr-FR" dirty="0" err="1"/>
+              <a:t>learn</a:t>
+            </a:r>
+            <a:r>
+              <a:rPr lang="fr-FR" dirty="0"/>
+              <a:t> 2 </a:t>
+            </a:r>
+            <a:r>
+              <a:rPr lang="fr-FR" dirty="0" err="1"/>
+              <a:t>things</a:t>
+            </a:r>
+            <a:endParaRPr lang="fr-FR" dirty="0"/>
+          </a:p>
+          <a:p>
+            <a:pPr marL="914400" lvl="1" indent="-457200">
+              <a:buFont typeface="+mj-lt"/>
+              <a:buAutoNum type="arabicPeriod"/>
+            </a:pPr>
+            <a:r>
+              <a:rPr lang="fr-FR" dirty="0"/>
+              <a:t>Don't mess </a:t>
+            </a:r>
+            <a:r>
+              <a:rPr lang="fr-FR" dirty="0" err="1"/>
+              <a:t>with</a:t>
+            </a:r>
+            <a:r>
+              <a:rPr lang="fr-FR" dirty="0"/>
+              <a:t> EDA.  Never !</a:t>
+            </a:r>
+          </a:p>
+          <a:p>
+            <a:pPr marL="914400" lvl="1" indent="-457200">
+              <a:buFont typeface="+mj-lt"/>
+              <a:buAutoNum type="arabicPeriod"/>
+            </a:pPr>
+            <a:r>
+              <a:rPr lang="fr-FR" dirty="0"/>
+              <a:t>Get a </a:t>
+            </a:r>
+            <a:r>
+              <a:rPr lang="fr-FR" dirty="0" err="1"/>
+              <a:t>baseline</a:t>
+            </a:r>
+            <a:r>
+              <a:rPr lang="fr-FR" dirty="0"/>
+              <a:t> model. Quick !</a:t>
+            </a:r>
+          </a:p>
+          <a:p>
+            <a:r>
+              <a:rPr lang="fr-FR" dirty="0"/>
+              <a:t>It </a:t>
+            </a:r>
+            <a:r>
+              <a:rPr lang="fr-FR" dirty="0" err="1"/>
+              <a:t>is</a:t>
+            </a:r>
+            <a:r>
+              <a:rPr lang="fr-FR" dirty="0"/>
+              <a:t> true </a:t>
+            </a:r>
+            <a:r>
+              <a:rPr lang="fr-FR" dirty="0" err="1"/>
+              <a:t>here</a:t>
+            </a:r>
+            <a:r>
+              <a:rPr lang="fr-FR" dirty="0"/>
+              <a:t> </a:t>
+            </a:r>
+            <a:r>
+              <a:rPr lang="fr-FR" dirty="0" err="1"/>
+              <a:t>too</a:t>
+            </a:r>
+            <a:endParaRPr lang="fr-FR" dirty="0"/>
+          </a:p>
+          <a:p>
+            <a:endParaRPr lang="fr-FR" dirty="0"/>
+          </a:p>
+          <a:p>
+            <a:r>
+              <a:rPr lang="fr-FR" dirty="0" err="1"/>
+              <a:t>Impressed</a:t>
+            </a:r>
+            <a:r>
+              <a:rPr lang="fr-FR" dirty="0"/>
+              <a:t> by the </a:t>
+            </a:r>
+            <a:r>
+              <a:rPr lang="fr-FR" dirty="0" err="1"/>
+              <a:t>results</a:t>
+            </a:r>
+            <a:r>
+              <a:rPr lang="fr-FR" dirty="0"/>
+              <a:t> of the </a:t>
+            </a:r>
+            <a:r>
+              <a:rPr lang="fr-FR" dirty="0" err="1"/>
+              <a:t>baseline</a:t>
+            </a:r>
+            <a:r>
+              <a:rPr lang="fr-FR" dirty="0"/>
+              <a:t> model</a:t>
+            </a:r>
+          </a:p>
+          <a:p>
+            <a:r>
+              <a:rPr lang="fr-FR" dirty="0"/>
+              <a:t>BERT (</a:t>
+            </a:r>
+            <a:r>
+              <a:rPr lang="fr-FR" dirty="0" err="1"/>
+              <a:t>unfreezed</a:t>
+            </a:r>
+            <a:r>
+              <a:rPr lang="fr-FR" dirty="0"/>
+              <a:t>) help to </a:t>
+            </a:r>
+            <a:r>
+              <a:rPr lang="fr-FR" dirty="0" err="1"/>
+              <a:t>keep</a:t>
+            </a:r>
+            <a:r>
+              <a:rPr lang="fr-FR" dirty="0"/>
+              <a:t> the </a:t>
+            </a:r>
+            <a:r>
+              <a:rPr lang="fr-FR" dirty="0" err="1"/>
+              <a:t>Precision</a:t>
+            </a:r>
+            <a:r>
+              <a:rPr lang="fr-FR" dirty="0"/>
+              <a:t> </a:t>
+            </a:r>
+            <a:r>
+              <a:rPr lang="fr-FR" dirty="0" err="1"/>
+              <a:t>while</a:t>
+            </a:r>
+            <a:r>
+              <a:rPr lang="fr-FR" dirty="0"/>
+              <a:t> </a:t>
+            </a:r>
+            <a:r>
+              <a:rPr lang="fr-FR" dirty="0" err="1"/>
+              <a:t>improving</a:t>
+            </a:r>
+            <a:r>
+              <a:rPr lang="fr-FR" dirty="0"/>
+              <a:t> the Accuracy but at the </a:t>
+            </a:r>
+            <a:r>
+              <a:rPr lang="fr-FR" dirty="0" err="1"/>
+              <a:t>cost</a:t>
+            </a:r>
+            <a:r>
+              <a:rPr lang="fr-FR" dirty="0"/>
+              <a:t> of training time</a:t>
+            </a:r>
+          </a:p>
+          <a:p>
+            <a:endParaRPr lang="fr-FR" dirty="0"/>
+          </a:p>
+          <a:p>
+            <a:pPr marL="457200" lvl="1" indent="0">
+              <a:buNone/>
+            </a:pPr>
+            <a:endParaRPr lang="fr-FR" dirty="0"/>
+          </a:p>
+          <a:p>
+            <a:endParaRPr lang="fr-FR" dirty="0"/>
           </a:p>
         </p:txBody>
       </p:sp>
     </p:spTree>
     <p:extLst>
       <p:ext uri="{BB962C8B-B14F-4D97-AF65-F5344CB8AC3E}">
-        <p14:creationId xmlns:p14="http://schemas.microsoft.com/office/powerpoint/2010/main" val="312535264"/>
+        <p14:creationId xmlns:p14="http://schemas.microsoft.com/office/powerpoint/2010/main" val="3201622378"/>
       </p:ext>
     </p:extLst>
   </p:cSld>

</xml_diff>

<commit_message>
ATT animated conf matrix + getaround model
</commit_message>
<xml_diff>
--- a/07_deep_learning/99_Project_ATT/01_att_project.pptx
+++ b/07_deep_learning/99_Project_ATT/01_att_project.pptx
@@ -5,7 +5,7 @@
     <p:sldMasterId id="2147483660" r:id="rId1"/>
   </p:sldMasterIdLst>
   <p:notesMasterIdLst>
-    <p:notesMasterId r:id="rId12"/>
+    <p:notesMasterId r:id="rId13"/>
   </p:notesMasterIdLst>
   <p:sldIdLst>
     <p:sldId id="256" r:id="rId2"/>
@@ -13,11 +13,12 @@
     <p:sldId id="264" r:id="rId4"/>
     <p:sldId id="266" r:id="rId5"/>
     <p:sldId id="267" r:id="rId6"/>
-    <p:sldId id="268" r:id="rId7"/>
-    <p:sldId id="269" r:id="rId8"/>
-    <p:sldId id="265" r:id="rId9"/>
-    <p:sldId id="257" r:id="rId10"/>
-    <p:sldId id="263" r:id="rId11"/>
+    <p:sldId id="270" r:id="rId7"/>
+    <p:sldId id="268" r:id="rId8"/>
+    <p:sldId id="269" r:id="rId9"/>
+    <p:sldId id="265" r:id="rId10"/>
+    <p:sldId id="257" r:id="rId11"/>
+    <p:sldId id="263" r:id="rId12"/>
   </p:sldIdLst>
   <p:sldSz cx="12192000" cy="6858000"/>
   <p:notesSz cx="6858000" cy="9144000"/>
@@ -127,7 +128,7 @@
 <file path=ppt/revisionInfo.xml><?xml version="1.0" encoding="utf-8"?>
 <p1510:revInfo xmlns:a="http://schemas.openxmlformats.org/drawingml/2006/main" xmlns:r="http://schemas.openxmlformats.org/officeDocument/2006/relationships" xmlns:p1510="http://schemas.microsoft.com/office/powerpoint/2015/10/main">
   <p1510:revLst>
-    <p1510:client id="{ABAE05BF-949A-4E93-BC19-2AEAAED3ED81}" v="25" dt="2024-09-04T13:58:46.902"/>
+    <p1510:client id="{ABAE05BF-949A-4E93-BC19-2AEAAED3ED81}" v="28" dt="2024-09-13T14:55:21.478"/>
   </p1510:revLst>
 </p1510:revInfo>
 </file>
@@ -1566,7 +1567,7 @@
   <pc:docChgLst>
     <pc:chgData name="Philippe Baucour" userId="5102170ae7533958" providerId="LiveId" clId="{ABAE05BF-949A-4E93-BC19-2AEAAED3ED81}"/>
     <pc:docChg chg="undo custSel addSld modSld sldOrd">
-      <pc:chgData name="Philippe Baucour" userId="5102170ae7533958" providerId="LiveId" clId="{ABAE05BF-949A-4E93-BC19-2AEAAED3ED81}" dt="2024-09-05T15:57:35.002" v="2981" actId="729"/>
+      <pc:chgData name="Philippe Baucour" userId="5102170ae7533958" providerId="LiveId" clId="{ABAE05BF-949A-4E93-BC19-2AEAAED3ED81}" dt="2024-09-13T14:56:12.048" v="3089" actId="1076"/>
       <pc:docMkLst>
         <pc:docMk/>
       </pc:docMkLst>
@@ -1916,7 +1917,7 @@
         </pc:picChg>
       </pc:sldChg>
       <pc:sldChg chg="addSp delSp modSp new mod modNotesTx">
-        <pc:chgData name="Philippe Baucour" userId="5102170ae7533958" providerId="LiveId" clId="{ABAE05BF-949A-4E93-BC19-2AEAAED3ED81}" dt="2024-09-03T10:36:57.247" v="2700" actId="1036"/>
+        <pc:chgData name="Philippe Baucour" userId="5102170ae7533958" providerId="LiveId" clId="{ABAE05BF-949A-4E93-BC19-2AEAAED3ED81}" dt="2024-09-13T14:56:12.048" v="3089" actId="1076"/>
         <pc:sldMkLst>
           <pc:docMk/>
           <pc:sldMk cId="671232843" sldId="267"/>
@@ -1929,8 +1930,8 @@
             <ac:spMk id="2" creationId="{5C06DFB4-6CEB-9A90-B9B4-CD5231B0FC34}"/>
           </ac:spMkLst>
         </pc:spChg>
-        <pc:spChg chg="add mod">
-          <ac:chgData name="Philippe Baucour" userId="5102170ae7533958" providerId="LiveId" clId="{ABAE05BF-949A-4E93-BC19-2AEAAED3ED81}" dt="2024-09-02T14:18:34.620" v="898" actId="1076"/>
+        <pc:spChg chg="add del mod">
+          <ac:chgData name="Philippe Baucour" userId="5102170ae7533958" providerId="LiveId" clId="{ABAE05BF-949A-4E93-BC19-2AEAAED3ED81}" dt="2024-09-13T14:55:17.747" v="3006" actId="21"/>
           <ac:spMkLst>
             <pc:docMk/>
             <pc:sldMk cId="671232843" sldId="267"/>
@@ -1938,7 +1939,7 @@
           </ac:spMkLst>
         </pc:spChg>
         <pc:picChg chg="add mod">
-          <ac:chgData name="Philippe Baucour" userId="5102170ae7533958" providerId="LiveId" clId="{ABAE05BF-949A-4E93-BC19-2AEAAED3ED81}" dt="2024-09-03T10:36:57.247" v="2700" actId="1036"/>
+          <ac:chgData name="Philippe Baucour" userId="5102170ae7533958" providerId="LiveId" clId="{ABAE05BF-949A-4E93-BC19-2AEAAED3ED81}" dt="2024-09-13T14:56:09.590" v="3088" actId="1036"/>
           <ac:picMkLst>
             <pc:docMk/>
             <pc:sldMk cId="671232843" sldId="267"/>
@@ -1954,7 +1955,7 @@
           </ac:picMkLst>
         </pc:picChg>
         <pc:picChg chg="add mod">
-          <ac:chgData name="Philippe Baucour" userId="5102170ae7533958" providerId="LiveId" clId="{ABAE05BF-949A-4E93-BC19-2AEAAED3ED81}" dt="2024-09-02T12:31:10.525" v="445" actId="14100"/>
+          <ac:chgData name="Philippe Baucour" userId="5102170ae7533958" providerId="LiveId" clId="{ABAE05BF-949A-4E93-BC19-2AEAAED3ED81}" dt="2024-09-13T14:56:01.962" v="3077" actId="1036"/>
           <ac:picMkLst>
             <pc:docMk/>
             <pc:sldMk cId="671232843" sldId="267"/>
@@ -1970,7 +1971,7 @@
           </ac:picMkLst>
         </pc:picChg>
         <pc:picChg chg="add mod">
-          <ac:chgData name="Philippe Baucour" userId="5102170ae7533958" providerId="LiveId" clId="{ABAE05BF-949A-4E93-BC19-2AEAAED3ED81}" dt="2024-09-02T12:32:29.879" v="465" actId="1038"/>
+          <ac:chgData name="Philippe Baucour" userId="5102170ae7533958" providerId="LiveId" clId="{ABAE05BF-949A-4E93-BC19-2AEAAED3ED81}" dt="2024-09-13T14:56:01.962" v="3077" actId="1036"/>
           <ac:picMkLst>
             <pc:docMk/>
             <pc:sldMk cId="671232843" sldId="267"/>
@@ -1978,7 +1979,7 @@
           </ac:picMkLst>
         </pc:picChg>
         <pc:picChg chg="add mod">
-          <ac:chgData name="Philippe Baucour" userId="5102170ae7533958" providerId="LiveId" clId="{ABAE05BF-949A-4E93-BC19-2AEAAED3ED81}" dt="2024-09-02T12:30:37.861" v="386" actId="14100"/>
+          <ac:chgData name="Philippe Baucour" userId="5102170ae7533958" providerId="LiveId" clId="{ABAE05BF-949A-4E93-BC19-2AEAAED3ED81}" dt="2024-09-13T14:56:01.962" v="3077" actId="1036"/>
           <ac:picMkLst>
             <pc:docMk/>
             <pc:sldMk cId="671232843" sldId="267"/>
@@ -1986,7 +1987,7 @@
           </ac:picMkLst>
         </pc:picChg>
         <pc:picChg chg="add mod">
-          <ac:chgData name="Philippe Baucour" userId="5102170ae7533958" providerId="LiveId" clId="{ABAE05BF-949A-4E93-BC19-2AEAAED3ED81}" dt="2024-09-02T12:32:29.879" v="465" actId="1038"/>
+          <ac:chgData name="Philippe Baucour" userId="5102170ae7533958" providerId="LiveId" clId="{ABAE05BF-949A-4E93-BC19-2AEAAED3ED81}" dt="2024-09-13T14:56:09.590" v="3088" actId="1036"/>
           <ac:picMkLst>
             <pc:docMk/>
             <pc:sldMk cId="671232843" sldId="267"/>
@@ -1994,15 +1995,15 @@
           </ac:picMkLst>
         </pc:picChg>
         <pc:picChg chg="add mod">
-          <ac:chgData name="Philippe Baucour" userId="5102170ae7533958" providerId="LiveId" clId="{ABAE05BF-949A-4E93-BC19-2AEAAED3ED81}" dt="2024-09-02T12:32:16.637" v="450" actId="1076"/>
+          <ac:chgData name="Philippe Baucour" userId="5102170ae7533958" providerId="LiveId" clId="{ABAE05BF-949A-4E93-BC19-2AEAAED3ED81}" dt="2024-09-13T14:56:09.590" v="3088" actId="1036"/>
           <ac:picMkLst>
             <pc:docMk/>
             <pc:sldMk cId="671232843" sldId="267"/>
             <ac:picMk id="16" creationId="{4BBD0288-8849-D410-540F-88973DB583A2}"/>
           </ac:picMkLst>
         </pc:picChg>
-        <pc:picChg chg="add mod">
-          <ac:chgData name="Philippe Baucour" userId="5102170ae7533958" providerId="LiveId" clId="{ABAE05BF-949A-4E93-BC19-2AEAAED3ED81}" dt="2024-09-02T12:37:56.841" v="593" actId="1038"/>
+        <pc:picChg chg="add del mod">
+          <ac:chgData name="Philippe Baucour" userId="5102170ae7533958" providerId="LiveId" clId="{ABAE05BF-949A-4E93-BC19-2AEAAED3ED81}" dt="2024-09-13T14:55:17.747" v="3006" actId="21"/>
           <ac:picMkLst>
             <pc:docMk/>
             <pc:sldMk cId="671232843" sldId="267"/>
@@ -2010,7 +2011,7 @@
           </ac:picMkLst>
         </pc:picChg>
         <pc:picChg chg="add mod">
-          <ac:chgData name="Philippe Baucour" userId="5102170ae7533958" providerId="LiveId" clId="{ABAE05BF-949A-4E93-BC19-2AEAAED3ED81}" dt="2024-09-02T14:18:17.318" v="897" actId="1076"/>
+          <ac:chgData name="Philippe Baucour" userId="5102170ae7533958" providerId="LiveId" clId="{ABAE05BF-949A-4E93-BC19-2AEAAED3ED81}" dt="2024-09-13T14:56:01.962" v="3077" actId="1036"/>
           <ac:picMkLst>
             <pc:docMk/>
             <pc:sldMk cId="671232843" sldId="267"/>
@@ -2018,7 +2019,7 @@
           </ac:picMkLst>
         </pc:picChg>
         <pc:picChg chg="add mod">
-          <ac:chgData name="Philippe Baucour" userId="5102170ae7533958" providerId="LiveId" clId="{ABAE05BF-949A-4E93-BC19-2AEAAED3ED81}" dt="2024-09-02T14:18:13.378" v="896" actId="1076"/>
+          <ac:chgData name="Philippe Baucour" userId="5102170ae7533958" providerId="LiveId" clId="{ABAE05BF-949A-4E93-BC19-2AEAAED3ED81}" dt="2024-09-13T14:56:01.962" v="3077" actId="1036"/>
           <ac:picMkLst>
             <pc:docMk/>
             <pc:sldMk cId="671232843" sldId="267"/>
@@ -2034,7 +2035,7 @@
           </ac:picMkLst>
         </pc:picChg>
         <pc:picChg chg="add mod">
-          <ac:chgData name="Philippe Baucour" userId="5102170ae7533958" providerId="LiveId" clId="{ABAE05BF-949A-4E93-BC19-2AEAAED3ED81}" dt="2024-09-02T14:18:41.261" v="899" actId="1076"/>
+          <ac:chgData name="Philippe Baucour" userId="5102170ae7533958" providerId="LiveId" clId="{ABAE05BF-949A-4E93-BC19-2AEAAED3ED81}" dt="2024-09-13T14:56:12.048" v="3089" actId="1076"/>
           <ac:picMkLst>
             <pc:docMk/>
             <pc:sldMk cId="671232843" sldId="267"/>
@@ -2042,7 +2043,7 @@
           </ac:picMkLst>
         </pc:picChg>
         <pc:picChg chg="add mod">
-          <ac:chgData name="Philippe Baucour" userId="5102170ae7533958" providerId="LiveId" clId="{ABAE05BF-949A-4E93-BC19-2AEAAED3ED81}" dt="2024-09-02T14:18:08.790" v="895" actId="1076"/>
+          <ac:chgData name="Philippe Baucour" userId="5102170ae7533958" providerId="LiveId" clId="{ABAE05BF-949A-4E93-BC19-2AEAAED3ED81}" dt="2024-09-13T14:56:01.962" v="3077" actId="1036"/>
           <ac:picMkLst>
             <pc:docMk/>
             <pc:sldMk cId="671232843" sldId="267"/>
@@ -2197,6 +2198,53 @@
             <pc:docMk/>
             <pc:sldMk cId="2840346932" sldId="269"/>
             <ac:picMk id="19" creationId="{53B19E68-B5FA-6930-E7D3-25EC7616B0D7}"/>
+          </ac:picMkLst>
+        </pc:picChg>
+      </pc:sldChg>
+      <pc:sldChg chg="addSp modSp new mod">
+        <pc:chgData name="Philippe Baucour" userId="5102170ae7533958" providerId="LiveId" clId="{ABAE05BF-949A-4E93-BC19-2AEAAED3ED81}" dt="2024-09-13T14:55:49.683" v="3057" actId="1037"/>
+        <pc:sldMkLst>
+          <pc:docMk/>
+          <pc:sldMk cId="3058765758" sldId="270"/>
+        </pc:sldMkLst>
+        <pc:spChg chg="mod">
+          <ac:chgData name="Philippe Baucour" userId="5102170ae7533958" providerId="LiveId" clId="{ABAE05BF-949A-4E93-BC19-2AEAAED3ED81}" dt="2024-09-13T14:54:59.879" v="3005" actId="20577"/>
+          <ac:spMkLst>
+            <pc:docMk/>
+            <pc:sldMk cId="3058765758" sldId="270"/>
+            <ac:spMk id="2" creationId="{838961C0-2432-63B6-698C-B8CB48BC51A7}"/>
+          </ac:spMkLst>
+        </pc:spChg>
+        <pc:spChg chg="add mod">
+          <ac:chgData name="Philippe Baucour" userId="5102170ae7533958" providerId="LiveId" clId="{ABAE05BF-949A-4E93-BC19-2AEAAED3ED81}" dt="2024-09-13T14:55:49.683" v="3057" actId="1037"/>
+          <ac:spMkLst>
+            <pc:docMk/>
+            <pc:sldMk cId="3058765758" sldId="270"/>
+            <ac:spMk id="17" creationId="{3053E7A8-B72C-E8FD-CA87-54B853B912FF}"/>
+          </ac:spMkLst>
+        </pc:spChg>
+        <pc:picChg chg="add mod">
+          <ac:chgData name="Philippe Baucour" userId="5102170ae7533958" providerId="LiveId" clId="{ABAE05BF-949A-4E93-BC19-2AEAAED3ED81}" dt="2024-09-13T14:55:44.950" v="3052" actId="1038"/>
+          <ac:picMkLst>
+            <pc:docMk/>
+            <pc:sldMk cId="3058765758" sldId="270"/>
+            <ac:picMk id="4" creationId="{39288974-209F-32A6-3D30-6870C498E5D7}"/>
+          </ac:picMkLst>
+        </pc:picChg>
+        <pc:picChg chg="add mod">
+          <ac:chgData name="Philippe Baucour" userId="5102170ae7533958" providerId="LiveId" clId="{ABAE05BF-949A-4E93-BC19-2AEAAED3ED81}" dt="2024-09-13T14:55:44.950" v="3052" actId="1038"/>
+          <ac:picMkLst>
+            <pc:docMk/>
+            <pc:sldMk cId="3058765758" sldId="270"/>
+            <ac:picMk id="6" creationId="{16CA6C83-D939-8456-F725-6E9598F87D90}"/>
+          </ac:picMkLst>
+        </pc:picChg>
+        <pc:picChg chg="add mod">
+          <ac:chgData name="Philippe Baucour" userId="5102170ae7533958" providerId="LiveId" clId="{ABAE05BF-949A-4E93-BC19-2AEAAED3ED81}" dt="2024-09-13T14:55:49.683" v="3057" actId="1037"/>
+          <ac:picMkLst>
+            <pc:docMk/>
+            <pc:sldMk cId="3058765758" sldId="270"/>
+            <ac:picMk id="19" creationId="{10D1E19D-8BF6-E276-0361-5D7954E56B3A}"/>
           </ac:picMkLst>
         </pc:picChg>
       </pc:sldChg>
@@ -2287,7 +2335,7 @@
           <a:p>
             <a:fld id="{FD1752CD-A7D2-4825-BC26-9DAEFBD0A5FF}" type="datetimeFigureOut">
               <a:rPr lang="fr-FR" smtClean="0"/>
-              <a:t>05/09/2024</a:t>
+              <a:t>13/09/2024</a:t>
             </a:fld>
             <a:endParaRPr lang="fr-FR"/>
           </a:p>
@@ -3404,7 +3452,7 @@
           <a:p>
             <a:fld id="{341AEC00-4977-4C47-A11B-52155DC12F54}" type="slidenum">
               <a:rPr lang="fr-FR" smtClean="0"/>
-              <a:t>7</a:t>
+              <a:t>8</a:t>
             </a:fld>
             <a:endParaRPr lang="fr-FR"/>
           </a:p>
@@ -3522,7 +3570,7 @@
           <a:p>
             <a:fld id="{341AEC00-4977-4C47-A11B-52155DC12F54}" type="slidenum">
               <a:rPr lang="fr-FR" smtClean="0"/>
-              <a:t>8</a:t>
+              <a:t>9</a:t>
             </a:fld>
             <a:endParaRPr lang="fr-FR"/>
           </a:p>
@@ -3640,7 +3688,7 @@
           <a:p>
             <a:fld id="{341AEC00-4977-4C47-A11B-52155DC12F54}" type="slidenum">
               <a:rPr lang="fr-FR" smtClean="0"/>
-              <a:t>9</a:t>
+              <a:t>10</a:t>
             </a:fld>
             <a:endParaRPr lang="fr-FR"/>
           </a:p>
@@ -3806,7 +3854,7 @@
           <a:p>
             <a:fld id="{7ECB9D5A-E5E4-41FE-AF39-634902D6D5D2}" type="datetimeFigureOut">
               <a:rPr lang="fr-FR" smtClean="0"/>
-              <a:t>05/09/2024</a:t>
+              <a:t>13/09/2024</a:t>
             </a:fld>
             <a:endParaRPr lang="fr-FR"/>
           </a:p>
@@ -4004,7 +4052,7 @@
           <a:p>
             <a:fld id="{7ECB9D5A-E5E4-41FE-AF39-634902D6D5D2}" type="datetimeFigureOut">
               <a:rPr lang="fr-FR" smtClean="0"/>
-              <a:t>05/09/2024</a:t>
+              <a:t>13/09/2024</a:t>
             </a:fld>
             <a:endParaRPr lang="fr-FR"/>
           </a:p>
@@ -4212,7 +4260,7 @@
           <a:p>
             <a:fld id="{7ECB9D5A-E5E4-41FE-AF39-634902D6D5D2}" type="datetimeFigureOut">
               <a:rPr lang="fr-FR" smtClean="0"/>
-              <a:t>05/09/2024</a:t>
+              <a:t>13/09/2024</a:t>
             </a:fld>
             <a:endParaRPr lang="fr-FR"/>
           </a:p>
@@ -4410,7 +4458,7 @@
           <a:p>
             <a:fld id="{7ECB9D5A-E5E4-41FE-AF39-634902D6D5D2}" type="datetimeFigureOut">
               <a:rPr lang="fr-FR" smtClean="0"/>
-              <a:t>05/09/2024</a:t>
+              <a:t>13/09/2024</a:t>
             </a:fld>
             <a:endParaRPr lang="fr-FR"/>
           </a:p>
@@ -4685,7 +4733,7 @@
           <a:p>
             <a:fld id="{7ECB9D5A-E5E4-41FE-AF39-634902D6D5D2}" type="datetimeFigureOut">
               <a:rPr lang="fr-FR" smtClean="0"/>
-              <a:t>05/09/2024</a:t>
+              <a:t>13/09/2024</a:t>
             </a:fld>
             <a:endParaRPr lang="fr-FR"/>
           </a:p>
@@ -4950,7 +4998,7 @@
           <a:p>
             <a:fld id="{7ECB9D5A-E5E4-41FE-AF39-634902D6D5D2}" type="datetimeFigureOut">
               <a:rPr lang="fr-FR" smtClean="0"/>
-              <a:t>05/09/2024</a:t>
+              <a:t>13/09/2024</a:t>
             </a:fld>
             <a:endParaRPr lang="fr-FR"/>
           </a:p>
@@ -5362,7 +5410,7 @@
           <a:p>
             <a:fld id="{7ECB9D5A-E5E4-41FE-AF39-634902D6D5D2}" type="datetimeFigureOut">
               <a:rPr lang="fr-FR" smtClean="0"/>
-              <a:t>05/09/2024</a:t>
+              <a:t>13/09/2024</a:t>
             </a:fld>
             <a:endParaRPr lang="fr-FR"/>
           </a:p>
@@ -5503,7 +5551,7 @@
           <a:p>
             <a:fld id="{7ECB9D5A-E5E4-41FE-AF39-634902D6D5D2}" type="datetimeFigureOut">
               <a:rPr lang="fr-FR" smtClean="0"/>
-              <a:t>05/09/2024</a:t>
+              <a:t>13/09/2024</a:t>
             </a:fld>
             <a:endParaRPr lang="fr-FR"/>
           </a:p>
@@ -5616,7 +5664,7 @@
           <a:p>
             <a:fld id="{7ECB9D5A-E5E4-41FE-AF39-634902D6D5D2}" type="datetimeFigureOut">
               <a:rPr lang="fr-FR" smtClean="0"/>
-              <a:t>05/09/2024</a:t>
+              <a:t>13/09/2024</a:t>
             </a:fld>
             <a:endParaRPr lang="fr-FR"/>
           </a:p>
@@ -5927,7 +5975,7 @@
           <a:p>
             <a:fld id="{7ECB9D5A-E5E4-41FE-AF39-634902D6D5D2}" type="datetimeFigureOut">
               <a:rPr lang="fr-FR" smtClean="0"/>
-              <a:t>05/09/2024</a:t>
+              <a:t>13/09/2024</a:t>
             </a:fld>
             <a:endParaRPr lang="fr-FR"/>
           </a:p>
@@ -6218,7 +6266,7 @@
           <a:p>
             <a:fld id="{7ECB9D5A-E5E4-41FE-AF39-634902D6D5D2}" type="datetimeFigureOut">
               <a:rPr lang="fr-FR" smtClean="0"/>
-              <a:t>05/09/2024</a:t>
+              <a:t>13/09/2024</a:t>
             </a:fld>
             <a:endParaRPr lang="fr-FR"/>
           </a:p>
@@ -6459,7 +6507,7 @@
           <a:p>
             <a:fld id="{7ECB9D5A-E5E4-41FE-AF39-634902D6D5D2}" type="datetimeFigureOut">
               <a:rPr lang="fr-FR" smtClean="0"/>
-              <a:t>05/09/2024</a:t>
+              <a:t>13/09/2024</a:t>
             </a:fld>
             <a:endParaRPr lang="fr-FR"/>
           </a:p>
@@ -7197,6 +7245,345 @@
 </file>
 
 <file path=ppt/slides/slide10.xml><?xml version="1.0" encoding="utf-8"?>
+<p:sld xmlns:a="http://schemas.openxmlformats.org/drawingml/2006/main" xmlns:r="http://schemas.openxmlformats.org/officeDocument/2006/relationships" xmlns:p="http://schemas.openxmlformats.org/presentationml/2006/main">
+  <p:cSld>
+    <p:spTree>
+      <p:nvGrpSpPr>
+        <p:cNvPr id="1" name=""/>
+        <p:cNvGrpSpPr/>
+        <p:nvPr/>
+      </p:nvGrpSpPr>
+      <p:grpSpPr>
+        <a:xfrm>
+          <a:off x="0" y="0"/>
+          <a:ext cx="0" cy="0"/>
+          <a:chOff x="0" y="0"/>
+          <a:chExt cx="0" cy="0"/>
+        </a:xfrm>
+      </p:grpSpPr>
+      <p:sp>
+        <p:nvSpPr>
+          <p:cNvPr id="2" name="Titre 1">
+            <a:extLst>
+              <a:ext uri="{FF2B5EF4-FFF2-40B4-BE49-F238E27FC236}">
+                <a16:creationId xmlns:a16="http://schemas.microsoft.com/office/drawing/2014/main" id="{F13D07B4-C7D9-46E1-38A0-A6EEF16B48EB}"/>
+              </a:ext>
+            </a:extLst>
+          </p:cNvPr>
+          <p:cNvSpPr>
+            <a:spLocks noGrp="1"/>
+          </p:cNvSpPr>
+          <p:nvPr>
+            <p:ph type="title"/>
+          </p:nvPr>
+        </p:nvSpPr>
+        <p:spPr/>
+        <p:txBody>
+          <a:bodyPr/>
+          <a:lstStyle/>
+          <a:p>
+            <a:r>
+              <a:rPr lang="fr-FR" dirty="0" err="1"/>
+              <a:t>Take</a:t>
+            </a:r>
+            <a:r>
+              <a:rPr lang="fr-FR" dirty="0"/>
+              <a:t> </a:t>
+            </a:r>
+            <a:r>
+              <a:rPr lang="fr-FR" dirty="0" err="1"/>
+              <a:t>away</a:t>
+            </a:r>
+            <a:endParaRPr lang="fr-FR" dirty="0"/>
+          </a:p>
+        </p:txBody>
+      </p:sp>
+      <p:sp>
+        <p:nvSpPr>
+          <p:cNvPr id="3" name="Espace réservé du contenu 2">
+            <a:extLst>
+              <a:ext uri="{FF2B5EF4-FFF2-40B4-BE49-F238E27FC236}">
+                <a16:creationId xmlns:a16="http://schemas.microsoft.com/office/drawing/2014/main" id="{1A803C62-BD0B-D0AC-2B41-C4F420891B06}"/>
+              </a:ext>
+            </a:extLst>
+          </p:cNvPr>
+          <p:cNvSpPr>
+            <a:spLocks noGrp="1"/>
+          </p:cNvSpPr>
+          <p:nvPr>
+            <p:ph idx="1"/>
+          </p:nvPr>
+        </p:nvSpPr>
+        <p:spPr/>
+        <p:txBody>
+          <a:bodyPr>
+            <a:normAutofit lnSpcReduction="10000"/>
+          </a:bodyPr>
+          <a:lstStyle/>
+          <a:p>
+            <a:r>
+              <a:rPr lang="fr-FR" dirty="0"/>
+              <a:t>So far, </a:t>
+            </a:r>
+            <a:r>
+              <a:rPr lang="fr-FR" dirty="0" err="1"/>
+              <a:t>working</a:t>
+            </a:r>
+            <a:r>
+              <a:rPr lang="fr-FR" dirty="0"/>
+              <a:t> on the </a:t>
+            </a:r>
+            <a:r>
+              <a:rPr lang="fr-FR" dirty="0" err="1"/>
+              <a:t>projects</a:t>
+            </a:r>
+            <a:r>
+              <a:rPr lang="fr-FR" dirty="0"/>
+              <a:t> I </a:t>
+            </a:r>
+            <a:r>
+              <a:rPr lang="fr-FR" dirty="0" err="1"/>
+              <a:t>keep</a:t>
+            </a:r>
+            <a:r>
+              <a:rPr lang="fr-FR" dirty="0"/>
+              <a:t> in </a:t>
+            </a:r>
+            <a:r>
+              <a:rPr lang="fr-FR" dirty="0" err="1"/>
+              <a:t>mind</a:t>
+            </a:r>
+            <a:r>
+              <a:rPr lang="fr-FR" dirty="0"/>
+              <a:t> :</a:t>
+            </a:r>
+          </a:p>
+          <a:p>
+            <a:pPr lvl="1">
+              <a:tabLst>
+                <a:tab pos="4572000" algn="l"/>
+              </a:tabLst>
+            </a:pPr>
+            <a:r>
+              <a:rPr lang="en-US" dirty="0"/>
+              <a:t>EDA	: The recipe</a:t>
+            </a:r>
+          </a:p>
+          <a:p>
+            <a:pPr lvl="1">
+              <a:tabLst>
+                <a:tab pos="4572000" algn="l"/>
+              </a:tabLst>
+            </a:pPr>
+            <a:r>
+              <a:rPr lang="en-US" dirty="0"/>
+              <a:t>Features Engineering	: The secret sauce</a:t>
+            </a:r>
+          </a:p>
+          <a:p>
+            <a:pPr lvl="1">
+              <a:tabLst>
+                <a:tab pos="4572000" algn="l"/>
+              </a:tabLst>
+            </a:pPr>
+            <a:r>
+              <a:rPr lang="en-US" dirty="0"/>
+              <a:t>Baseline model	: The first taste</a:t>
+            </a:r>
+          </a:p>
+          <a:p>
+            <a:pPr lvl="1">
+              <a:tabLst>
+                <a:tab pos="4572000" algn="l"/>
+              </a:tabLst>
+            </a:pPr>
+            <a:r>
+              <a:rPr lang="en-US" dirty="0"/>
+              <a:t>Interpreting results	: The tasting notes</a:t>
+            </a:r>
+            <a:endParaRPr lang="fr-FR" dirty="0"/>
+          </a:p>
+          <a:p>
+            <a:pPr marL="914400" lvl="1" indent="-457200">
+              <a:buFont typeface="+mj-lt"/>
+              <a:buAutoNum type="arabicPeriod"/>
+            </a:pPr>
+            <a:endParaRPr lang="fr-FR" dirty="0"/>
+          </a:p>
+          <a:p>
+            <a:r>
+              <a:rPr lang="fr-FR" dirty="0"/>
+              <a:t>It </a:t>
+            </a:r>
+            <a:r>
+              <a:rPr lang="fr-FR" dirty="0" err="1"/>
+              <a:t>is</a:t>
+            </a:r>
+            <a:r>
+              <a:rPr lang="fr-FR" dirty="0"/>
+              <a:t> true </a:t>
+            </a:r>
+            <a:r>
+              <a:rPr lang="fr-FR" dirty="0" err="1"/>
+              <a:t>here</a:t>
+            </a:r>
+            <a:r>
+              <a:rPr lang="fr-FR" dirty="0"/>
+              <a:t> </a:t>
+            </a:r>
+            <a:r>
+              <a:rPr lang="fr-FR" dirty="0" err="1"/>
+              <a:t>too</a:t>
+            </a:r>
+            <a:endParaRPr lang="fr-FR" dirty="0"/>
+          </a:p>
+          <a:p>
+            <a:endParaRPr lang="fr-FR" dirty="0"/>
+          </a:p>
+          <a:p>
+            <a:r>
+              <a:rPr lang="fr-FR" dirty="0" err="1"/>
+              <a:t>Impressed</a:t>
+            </a:r>
+            <a:r>
+              <a:rPr lang="fr-FR" dirty="0"/>
+              <a:t> by the </a:t>
+            </a:r>
+            <a:r>
+              <a:rPr lang="fr-FR" dirty="0" err="1"/>
+              <a:t>results</a:t>
+            </a:r>
+            <a:r>
+              <a:rPr lang="fr-FR" dirty="0"/>
+              <a:t> of the </a:t>
+            </a:r>
+            <a:r>
+              <a:rPr lang="fr-FR" dirty="0" err="1"/>
+              <a:t>baseline</a:t>
+            </a:r>
+            <a:r>
+              <a:rPr lang="fr-FR" dirty="0"/>
+              <a:t> model</a:t>
+            </a:r>
+          </a:p>
+          <a:p>
+            <a:r>
+              <a:rPr lang="fr-FR" dirty="0"/>
+              <a:t>BERT (</a:t>
+            </a:r>
+            <a:r>
+              <a:rPr lang="fr-FR" dirty="0" err="1"/>
+              <a:t>unfreezed</a:t>
+            </a:r>
+            <a:r>
+              <a:rPr lang="fr-FR" dirty="0"/>
+              <a:t>) help to </a:t>
+            </a:r>
+            <a:r>
+              <a:rPr lang="fr-FR" dirty="0" err="1"/>
+              <a:t>keep</a:t>
+            </a:r>
+            <a:r>
+              <a:rPr lang="fr-FR" dirty="0"/>
+              <a:t> the </a:t>
+            </a:r>
+            <a:r>
+              <a:rPr lang="fr-FR" dirty="0" err="1"/>
+              <a:t>Precision</a:t>
+            </a:r>
+            <a:r>
+              <a:rPr lang="fr-FR" dirty="0"/>
+              <a:t> </a:t>
+            </a:r>
+            <a:r>
+              <a:rPr lang="fr-FR" dirty="0" err="1"/>
+              <a:t>while</a:t>
+            </a:r>
+            <a:r>
+              <a:rPr lang="fr-FR" dirty="0"/>
+              <a:t> </a:t>
+            </a:r>
+            <a:r>
+              <a:rPr lang="fr-FR" dirty="0" err="1"/>
+              <a:t>improving</a:t>
+            </a:r>
+            <a:r>
+              <a:rPr lang="fr-FR" dirty="0"/>
+              <a:t> the Accuracy but at the </a:t>
+            </a:r>
+            <a:r>
+              <a:rPr lang="fr-FR" dirty="0" err="1"/>
+              <a:t>cost</a:t>
+            </a:r>
+            <a:r>
+              <a:rPr lang="fr-FR" dirty="0"/>
+              <a:t> of training time</a:t>
+            </a:r>
+          </a:p>
+          <a:p>
+            <a:endParaRPr lang="fr-FR" dirty="0"/>
+          </a:p>
+          <a:p>
+            <a:pPr marL="457200" lvl="1" indent="0">
+              <a:buNone/>
+            </a:pPr>
+            <a:endParaRPr lang="fr-FR" dirty="0"/>
+          </a:p>
+          <a:p>
+            <a:endParaRPr lang="fr-FR" dirty="0"/>
+          </a:p>
+        </p:txBody>
+      </p:sp>
+      <p:pic>
+        <p:nvPicPr>
+          <p:cNvPr id="5" name="Image 4">
+            <a:extLst>
+              <a:ext uri="{FF2B5EF4-FFF2-40B4-BE49-F238E27FC236}">
+                <a16:creationId xmlns:a16="http://schemas.microsoft.com/office/drawing/2014/main" id="{6A3C50B5-69FB-F9D8-70F1-0579A3213984}"/>
+              </a:ext>
+            </a:extLst>
+          </p:cNvPr>
+          <p:cNvPicPr>
+            <a:picLocks noChangeAspect="1"/>
+          </p:cNvPicPr>
+          <p:nvPr/>
+        </p:nvPicPr>
+        <p:blipFill>
+          <a:blip r:embed="rId3"/>
+          <a:srcRect l="25506" t="5814" r="18520"/>
+          <a:stretch/>
+        </p:blipFill>
+        <p:spPr>
+          <a:xfrm>
+            <a:off x="8984610" y="1700089"/>
+            <a:ext cx="1149290" cy="1287306"/>
+          </a:xfrm>
+          <a:prstGeom prst="rect">
+            <a:avLst/>
+          </a:prstGeom>
+          <a:effectLst>
+            <a:outerShdw blurRad="50800" dist="38100" dir="2700000" algn="tl" rotWithShape="0">
+              <a:prstClr val="black">
+                <a:alpha val="40000"/>
+              </a:prstClr>
+            </a:outerShdw>
+          </a:effectLst>
+        </p:spPr>
+      </p:pic>
+    </p:spTree>
+    <p:extLst>
+      <p:ext uri="{BB962C8B-B14F-4D97-AF65-F5344CB8AC3E}">
+        <p14:creationId xmlns:p14="http://schemas.microsoft.com/office/powerpoint/2010/main" val="3201622378"/>
+      </p:ext>
+    </p:extLst>
+  </p:cSld>
+  <p:clrMapOvr>
+    <a:masterClrMapping/>
+  </p:clrMapOvr>
+</p:sld>
+</file>
+
+<file path=ppt/slides/slide11.xml><?xml version="1.0" encoding="utf-8"?>
 <p:sld xmlns:a="http://schemas.openxmlformats.org/drawingml/2006/main" xmlns:r="http://schemas.openxmlformats.org/officeDocument/2006/relationships" xmlns:p="http://schemas.openxmlformats.org/presentationml/2006/main" show="0">
   <p:cSld>
     <p:spTree>
@@ -8045,7 +8432,7 @@
         </p:blipFill>
         <p:spPr>
           <a:xfrm>
-            <a:off x="213359" y="920035"/>
+            <a:off x="213359" y="1515654"/>
             <a:ext cx="2564880" cy="3035500"/>
           </a:xfrm>
           <a:prstGeom prst="rect">
@@ -8082,7 +8469,7 @@
         </p:blipFill>
         <p:spPr>
           <a:xfrm>
-            <a:off x="3591522" y="920035"/>
+            <a:off x="3591522" y="1515654"/>
             <a:ext cx="4068862" cy="3035500"/>
           </a:xfrm>
           <a:prstGeom prst="rect">
@@ -8119,7 +8506,7 @@
         </p:blipFill>
         <p:spPr>
           <a:xfrm>
-            <a:off x="7909779" y="920035"/>
+            <a:off x="7909779" y="1515654"/>
             <a:ext cx="4068862" cy="3035500"/>
           </a:xfrm>
           <a:prstGeom prst="rect">
@@ -8156,7 +8543,7 @@
         </p:blipFill>
         <p:spPr>
           <a:xfrm>
-            <a:off x="3591520" y="4077423"/>
+            <a:off x="3591520" y="4865989"/>
             <a:ext cx="4068863" cy="998855"/>
           </a:xfrm>
           <a:prstGeom prst="rect">
@@ -8193,7 +8580,7 @@
         </p:blipFill>
         <p:spPr>
           <a:xfrm>
-            <a:off x="7909779" y="4077423"/>
+            <a:off x="7909779" y="4865989"/>
             <a:ext cx="4068862" cy="742232"/>
           </a:xfrm>
           <a:prstGeom prst="rect">
@@ -8201,86 +8588,12 @@
           </a:prstGeom>
         </p:spPr>
       </p:pic>
-      <p:sp>
-        <p:nvSpPr>
-          <p:cNvPr id="17" name="ZoneTexte 16">
-            <a:extLst>
-              <a:ext uri="{FF2B5EF4-FFF2-40B4-BE49-F238E27FC236}">
-                <a16:creationId xmlns:a16="http://schemas.microsoft.com/office/drawing/2014/main" id="{3053E7A8-B72C-E8FD-CA87-54B853B912FF}"/>
-              </a:ext>
-            </a:extLst>
-          </p:cNvPr>
-          <p:cNvSpPr txBox="1"/>
-          <p:nvPr/>
-        </p:nvSpPr>
-        <p:spPr>
-          <a:xfrm>
-            <a:off x="2581475" y="5280331"/>
-            <a:ext cx="2390398" cy="923330"/>
-          </a:xfrm>
-          <a:prstGeom prst="rect">
-            <a:avLst/>
-          </a:prstGeom>
-          <a:solidFill>
-            <a:schemeClr val="bg1">
-              <a:lumMod val="95000"/>
-            </a:schemeClr>
-          </a:solidFill>
-          <a:effectLst>
-            <a:outerShdw blurRad="50800" dist="38100" dir="2700000" algn="tl" rotWithShape="0">
-              <a:prstClr val="black">
-                <a:alpha val="40000"/>
-              </a:prstClr>
-            </a:outerShdw>
-          </a:effectLst>
-        </p:spPr>
-        <p:txBody>
-          <a:bodyPr wrap="none" rtlCol="0">
-            <a:spAutoFit/>
-          </a:bodyPr>
-          <a:lstStyle/>
-          <a:p>
-            <a:r>
-              <a:rPr lang="fr-FR" dirty="0" err="1">
-                <a:latin typeface="Courier New" panose="02070309020205020404" pitchFamily="49" charset="0"/>
-                <a:cs typeface="Courier New" panose="02070309020205020404" pitchFamily="49" charset="0"/>
-              </a:rPr>
-              <a:t>Precision</a:t>
-            </a:r>
-            <a:r>
-              <a:rPr lang="fr-FR" dirty="0">
-                <a:latin typeface="Courier New" panose="02070309020205020404" pitchFamily="49" charset="0"/>
-                <a:cs typeface="Courier New" panose="02070309020205020404" pitchFamily="49" charset="0"/>
-              </a:rPr>
-              <a:t> : 0.98</a:t>
-            </a:r>
-          </a:p>
-          <a:p>
-            <a:r>
-              <a:rPr lang="fr-FR" dirty="0">
-                <a:latin typeface="Courier New" panose="02070309020205020404" pitchFamily="49" charset="0"/>
-                <a:cs typeface="Courier New" panose="02070309020205020404" pitchFamily="49" charset="0"/>
-              </a:rPr>
-              <a:t>Recall    : 0.89</a:t>
-            </a:r>
-          </a:p>
-          <a:p>
-            <a:r>
-              <a:rPr lang="fr-FR" dirty="0">
-                <a:latin typeface="Courier New" panose="02070309020205020404" pitchFamily="49" charset="0"/>
-                <a:cs typeface="Courier New" panose="02070309020205020404" pitchFamily="49" charset="0"/>
-              </a:rPr>
-              <a:t>F1        : 0.93</a:t>
-            </a:r>
-          </a:p>
-        </p:txBody>
-      </p:sp>
       <p:pic>
         <p:nvPicPr>
-          <p:cNvPr id="19" name="Image 18">
-            <a:extLst>
-              <a:ext uri="{FF2B5EF4-FFF2-40B4-BE49-F238E27FC236}">
-                <a16:creationId xmlns:a16="http://schemas.microsoft.com/office/drawing/2014/main" id="{10D1E19D-8BF6-E276-0361-5D7954E56B3A}"/>
+          <p:cNvPr id="20" name="Graphique 19" descr="Badge 3 avec un remplissage uni">
+            <a:extLst>
+              <a:ext uri="{FF2B5EF4-FFF2-40B4-BE49-F238E27FC236}">
+                <a16:creationId xmlns:a16="http://schemas.microsoft.com/office/drawing/2014/main" id="{8D66137E-54DB-EAD7-AEA2-D5B91141B969}"/>
               </a:ext>
             </a:extLst>
           </p:cNvPr>
@@ -8290,47 +8603,10 @@
           <p:nvPr/>
         </p:nvPicPr>
         <p:blipFill>
-          <a:blip r:embed="rId8"/>
-          <a:stretch>
-            <a:fillRect/>
-          </a:stretch>
-        </p:blipFill>
-        <p:spPr>
-          <a:xfrm>
-            <a:off x="5192077" y="5260832"/>
-            <a:ext cx="5259364" cy="1460643"/>
-          </a:xfrm>
-          <a:prstGeom prst="rect">
-            <a:avLst/>
-          </a:prstGeom>
-          <a:effectLst>
-            <a:outerShdw blurRad="50800" dist="38100" dir="2700000" algn="tl" rotWithShape="0">
-              <a:prstClr val="black">
-                <a:alpha val="40000"/>
-              </a:prstClr>
-            </a:outerShdw>
-          </a:effectLst>
-        </p:spPr>
-      </p:pic>
-      <p:pic>
-        <p:nvPicPr>
-          <p:cNvPr id="20" name="Graphique 19" descr="Badge 3 avec un remplissage uni">
-            <a:extLst>
-              <a:ext uri="{FF2B5EF4-FFF2-40B4-BE49-F238E27FC236}">
-                <a16:creationId xmlns:a16="http://schemas.microsoft.com/office/drawing/2014/main" id="{8D66137E-54DB-EAD7-AEA2-D5B91141B969}"/>
-              </a:ext>
-            </a:extLst>
-          </p:cNvPr>
-          <p:cNvPicPr>
-            <a:picLocks noChangeAspect="1"/>
-          </p:cNvPicPr>
-          <p:nvPr/>
-        </p:nvPicPr>
-        <p:blipFill>
-          <a:blip r:embed="rId9">
+          <a:blip r:embed="rId8">
             <a:extLst>
               <a:ext uri="{96DAC541-7B7A-43D3-8B79-37D633B846F1}">
-                <asvg:svgBlip xmlns:asvg="http://schemas.microsoft.com/office/drawing/2016/SVG/main" r:embed="rId10"/>
+                <asvg:svgBlip xmlns:asvg="http://schemas.microsoft.com/office/drawing/2016/SVG/main" r:embed="rId9"/>
               </a:ext>
             </a:extLst>
           </a:blip>
@@ -8340,7 +8616,7 @@
         </p:blipFill>
         <p:spPr>
           <a:xfrm>
-            <a:off x="10451441" y="1523385"/>
+            <a:off x="10451441" y="2119004"/>
             <a:ext cx="914400" cy="914400"/>
           </a:xfrm>
           <a:prstGeom prst="rect">
@@ -8363,10 +8639,10 @@
           <p:nvPr/>
         </p:nvPicPr>
         <p:blipFill>
-          <a:blip r:embed="rId11">
+          <a:blip r:embed="rId10">
             <a:extLst>
               <a:ext uri="{96DAC541-7B7A-43D3-8B79-37D633B846F1}">
-                <asvg:svgBlip xmlns:asvg="http://schemas.microsoft.com/office/drawing/2016/SVG/main" r:embed="rId12"/>
+                <asvg:svgBlip xmlns:asvg="http://schemas.microsoft.com/office/drawing/2016/SVG/main" r:embed="rId11"/>
               </a:ext>
             </a:extLst>
           </a:blip>
@@ -8376,7 +8652,7 @@
         </p:blipFill>
         <p:spPr>
           <a:xfrm>
-            <a:off x="5194037" y="1319934"/>
+            <a:off x="5194037" y="1915553"/>
             <a:ext cx="914400" cy="914400"/>
           </a:xfrm>
           <a:prstGeom prst="rect">
@@ -8399,10 +8675,10 @@
           <p:nvPr/>
         </p:nvPicPr>
         <p:blipFill>
-          <a:blip r:embed="rId13">
+          <a:blip r:embed="rId12">
             <a:extLst>
               <a:ext uri="{96DAC541-7B7A-43D3-8B79-37D633B846F1}">
-                <asvg:svgBlip xmlns:asvg="http://schemas.microsoft.com/office/drawing/2016/SVG/main" r:embed="rId14"/>
+                <asvg:svgBlip xmlns:asvg="http://schemas.microsoft.com/office/drawing/2016/SVG/main" r:embed="rId13"/>
               </a:ext>
             </a:extLst>
           </a:blip>
@@ -8435,10 +8711,10 @@
           <p:nvPr/>
         </p:nvPicPr>
         <p:blipFill>
-          <a:blip r:embed="rId15">
+          <a:blip r:embed="rId14">
             <a:extLst>
               <a:ext uri="{96DAC541-7B7A-43D3-8B79-37D633B846F1}">
-                <asvg:svgBlip xmlns:asvg="http://schemas.microsoft.com/office/drawing/2016/SVG/main" r:embed="rId16"/>
+                <asvg:svgBlip xmlns:asvg="http://schemas.microsoft.com/office/drawing/2016/SVG/main" r:embed="rId15"/>
               </a:ext>
             </a:extLst>
           </a:blip>
@@ -8448,7 +8724,7 @@
         </p:blipFill>
         <p:spPr>
           <a:xfrm>
-            <a:off x="3134320" y="5991153"/>
+            <a:off x="-1941019" y="4322705"/>
             <a:ext cx="914400" cy="914400"/>
           </a:xfrm>
           <a:prstGeom prst="rect">
@@ -8471,10 +8747,10 @@
           <p:nvPr/>
         </p:nvPicPr>
         <p:blipFill>
-          <a:blip r:embed="rId17">
+          <a:blip r:embed="rId16">
             <a:extLst>
               <a:ext uri="{96DAC541-7B7A-43D3-8B79-37D633B846F1}">
-                <asvg:svgBlip xmlns:asvg="http://schemas.microsoft.com/office/drawing/2016/SVG/main" r:embed="rId18"/>
+                <asvg:svgBlip xmlns:asvg="http://schemas.microsoft.com/office/drawing/2016/SVG/main" r:embed="rId17"/>
               </a:ext>
             </a:extLst>
           </a:blip>
@@ -8484,7 +8760,7 @@
         </p:blipFill>
         <p:spPr>
           <a:xfrm>
-            <a:off x="2427727" y="2644879"/>
+            <a:off x="2427727" y="3240498"/>
             <a:ext cx="914400" cy="914400"/>
           </a:xfrm>
           <a:prstGeom prst="rect">
@@ -8507,14 +8783,14 @@
           <p:nvPr/>
         </p:nvPicPr>
         <p:blipFill>
-          <a:blip r:embed="rId19"/>
+          <a:blip r:embed="rId18"/>
           <a:stretch>
             <a:fillRect/>
           </a:stretch>
         </p:blipFill>
         <p:spPr>
           <a:xfrm>
-            <a:off x="213359" y="4089925"/>
+            <a:off x="213359" y="4878491"/>
             <a:ext cx="3168088" cy="678352"/>
           </a:xfrm>
           <a:prstGeom prst="rect">
@@ -8557,6 +8833,261 @@
           <p:cNvPr id="2" name="Titre 1">
             <a:extLst>
               <a:ext uri="{FF2B5EF4-FFF2-40B4-BE49-F238E27FC236}">
+                <a16:creationId xmlns:a16="http://schemas.microsoft.com/office/drawing/2014/main" id="{838961C0-2432-63B6-698C-B8CB48BC51A7}"/>
+              </a:ext>
+            </a:extLst>
+          </p:cNvPr>
+          <p:cNvSpPr>
+            <a:spLocks noGrp="1"/>
+          </p:cNvSpPr>
+          <p:nvPr>
+            <p:ph type="title"/>
+          </p:nvPr>
+        </p:nvSpPr>
+        <p:spPr/>
+        <p:txBody>
+          <a:bodyPr/>
+          <a:lstStyle/>
+          <a:p>
+            <a:r>
+              <a:rPr lang="fr-FR" dirty="0"/>
+              <a:t>Basic model</a:t>
+            </a:r>
+          </a:p>
+        </p:txBody>
+      </p:sp>
+      <p:pic>
+        <p:nvPicPr>
+          <p:cNvPr id="4" name="Image 3" descr="Une image contenant texte, capture d’écran, Caractère coloré, Rectangle&#10;&#10;Description générée automatiquement">
+            <a:extLst>
+              <a:ext uri="{FF2B5EF4-FFF2-40B4-BE49-F238E27FC236}">
+                <a16:creationId xmlns:a16="http://schemas.microsoft.com/office/drawing/2014/main" id="{39288974-209F-32A6-3D30-6870C498E5D7}"/>
+              </a:ext>
+            </a:extLst>
+          </p:cNvPr>
+          <p:cNvPicPr>
+            <a:picLocks noChangeAspect="1"/>
+          </p:cNvPicPr>
+          <p:nvPr/>
+        </p:nvPicPr>
+        <p:blipFill>
+          <a:blip r:embed="rId2">
+            <a:extLst>
+              <a:ext uri="{28A0092B-C50C-407E-A947-70E740481C1C}">
+                <a14:useLocalDpi xmlns:a14="http://schemas.microsoft.com/office/drawing/2010/main" val="0"/>
+              </a:ext>
+            </a:extLst>
+          </a:blip>
+          <a:stretch>
+            <a:fillRect/>
+          </a:stretch>
+        </p:blipFill>
+        <p:spPr>
+          <a:xfrm>
+            <a:off x="1451294" y="1135380"/>
+            <a:ext cx="3955409" cy="3955409"/>
+          </a:xfrm>
+          <a:prstGeom prst="rect">
+            <a:avLst/>
+          </a:prstGeom>
+          <a:effectLst>
+            <a:outerShdw blurRad="50800" dist="38100" dir="2700000" algn="tl" rotWithShape="0">
+              <a:prstClr val="black">
+                <a:alpha val="40000"/>
+              </a:prstClr>
+            </a:outerShdw>
+          </a:effectLst>
+        </p:spPr>
+      </p:pic>
+      <p:pic>
+        <p:nvPicPr>
+          <p:cNvPr id="6" name="Image 5" descr="Une image contenant texte, capture d’écran, Caractère coloré, Rectangle&#10;&#10;Description générée automatiquement">
+            <a:extLst>
+              <a:ext uri="{FF2B5EF4-FFF2-40B4-BE49-F238E27FC236}">
+                <a16:creationId xmlns:a16="http://schemas.microsoft.com/office/drawing/2014/main" id="{16CA6C83-D939-8456-F725-6E9598F87D90}"/>
+              </a:ext>
+            </a:extLst>
+          </p:cNvPr>
+          <p:cNvPicPr>
+            <a:picLocks noChangeAspect="1"/>
+          </p:cNvPicPr>
+          <p:nvPr/>
+        </p:nvPicPr>
+        <p:blipFill>
+          <a:blip r:embed="rId3">
+            <a:extLst>
+              <a:ext uri="{28A0092B-C50C-407E-A947-70E740481C1C}">
+                <a14:useLocalDpi xmlns:a14="http://schemas.microsoft.com/office/drawing/2010/main" val="0"/>
+              </a:ext>
+            </a:extLst>
+          </a:blip>
+          <a:stretch>
+            <a:fillRect/>
+          </a:stretch>
+        </p:blipFill>
+        <p:spPr>
+          <a:xfrm>
+            <a:off x="6785294" y="1135380"/>
+            <a:ext cx="3955409" cy="3955409"/>
+          </a:xfrm>
+          <a:prstGeom prst="rect">
+            <a:avLst/>
+          </a:prstGeom>
+          <a:effectLst>
+            <a:outerShdw blurRad="50800" dist="38100" dir="2700000" algn="tl" rotWithShape="0">
+              <a:prstClr val="black">
+                <a:alpha val="40000"/>
+              </a:prstClr>
+            </a:outerShdw>
+          </a:effectLst>
+        </p:spPr>
+      </p:pic>
+      <p:sp>
+        <p:nvSpPr>
+          <p:cNvPr id="17" name="ZoneTexte 16">
+            <a:extLst>
+              <a:ext uri="{FF2B5EF4-FFF2-40B4-BE49-F238E27FC236}">
+                <a16:creationId xmlns:a16="http://schemas.microsoft.com/office/drawing/2014/main" id="{3053E7A8-B72C-E8FD-CA87-54B853B912FF}"/>
+              </a:ext>
+            </a:extLst>
+          </p:cNvPr>
+          <p:cNvSpPr txBox="1"/>
+          <p:nvPr/>
+        </p:nvSpPr>
+        <p:spPr>
+          <a:xfrm>
+            <a:off x="2531141" y="5280331"/>
+            <a:ext cx="2390398" cy="923330"/>
+          </a:xfrm>
+          <a:prstGeom prst="rect">
+            <a:avLst/>
+          </a:prstGeom>
+          <a:solidFill>
+            <a:schemeClr val="bg1">
+              <a:lumMod val="95000"/>
+            </a:schemeClr>
+          </a:solidFill>
+          <a:effectLst>
+            <a:outerShdw blurRad="50800" dist="38100" dir="2700000" algn="tl" rotWithShape="0">
+              <a:prstClr val="black">
+                <a:alpha val="40000"/>
+              </a:prstClr>
+            </a:outerShdw>
+          </a:effectLst>
+        </p:spPr>
+        <p:txBody>
+          <a:bodyPr wrap="none" rtlCol="0">
+            <a:spAutoFit/>
+          </a:bodyPr>
+          <a:lstStyle/>
+          <a:p>
+            <a:r>
+              <a:rPr lang="fr-FR" dirty="0" err="1">
+                <a:latin typeface="Courier New" panose="02070309020205020404" pitchFamily="49" charset="0"/>
+                <a:cs typeface="Courier New" panose="02070309020205020404" pitchFamily="49" charset="0"/>
+              </a:rPr>
+              <a:t>Precision</a:t>
+            </a:r>
+            <a:r>
+              <a:rPr lang="fr-FR" dirty="0">
+                <a:latin typeface="Courier New" panose="02070309020205020404" pitchFamily="49" charset="0"/>
+                <a:cs typeface="Courier New" panose="02070309020205020404" pitchFamily="49" charset="0"/>
+              </a:rPr>
+              <a:t> : 0.98</a:t>
+            </a:r>
+          </a:p>
+          <a:p>
+            <a:r>
+              <a:rPr lang="fr-FR" dirty="0">
+                <a:latin typeface="Courier New" panose="02070309020205020404" pitchFamily="49" charset="0"/>
+                <a:cs typeface="Courier New" panose="02070309020205020404" pitchFamily="49" charset="0"/>
+              </a:rPr>
+              <a:t>Recall    : 0.89</a:t>
+            </a:r>
+          </a:p>
+          <a:p>
+            <a:r>
+              <a:rPr lang="fr-FR" dirty="0">
+                <a:latin typeface="Courier New" panose="02070309020205020404" pitchFamily="49" charset="0"/>
+                <a:cs typeface="Courier New" panose="02070309020205020404" pitchFamily="49" charset="0"/>
+              </a:rPr>
+              <a:t>F1        : 0.93</a:t>
+            </a:r>
+          </a:p>
+        </p:txBody>
+      </p:sp>
+      <p:pic>
+        <p:nvPicPr>
+          <p:cNvPr id="19" name="Image 18">
+            <a:extLst>
+              <a:ext uri="{FF2B5EF4-FFF2-40B4-BE49-F238E27FC236}">
+                <a16:creationId xmlns:a16="http://schemas.microsoft.com/office/drawing/2014/main" id="{10D1E19D-8BF6-E276-0361-5D7954E56B3A}"/>
+              </a:ext>
+            </a:extLst>
+          </p:cNvPr>
+          <p:cNvPicPr>
+            <a:picLocks noChangeAspect="1"/>
+          </p:cNvPicPr>
+          <p:nvPr/>
+        </p:nvPicPr>
+        <p:blipFill>
+          <a:blip r:embed="rId4"/>
+          <a:stretch>
+            <a:fillRect/>
+          </a:stretch>
+        </p:blipFill>
+        <p:spPr>
+          <a:xfrm>
+            <a:off x="5141743" y="5260832"/>
+            <a:ext cx="5259364" cy="1460643"/>
+          </a:xfrm>
+          <a:prstGeom prst="rect">
+            <a:avLst/>
+          </a:prstGeom>
+          <a:effectLst>
+            <a:outerShdw blurRad="50800" dist="38100" dir="2700000" algn="tl" rotWithShape="0">
+              <a:prstClr val="black">
+                <a:alpha val="40000"/>
+              </a:prstClr>
+            </a:outerShdw>
+          </a:effectLst>
+        </p:spPr>
+      </p:pic>
+    </p:spTree>
+    <p:extLst>
+      <p:ext uri="{BB962C8B-B14F-4D97-AF65-F5344CB8AC3E}">
+        <p14:creationId xmlns:p14="http://schemas.microsoft.com/office/powerpoint/2010/main" val="3058765758"/>
+      </p:ext>
+    </p:extLst>
+  </p:cSld>
+  <p:clrMapOvr>
+    <a:masterClrMapping/>
+  </p:clrMapOvr>
+</p:sld>
+</file>
+
+<file path=ppt/slides/slide7.xml><?xml version="1.0" encoding="utf-8"?>
+<p:sld xmlns:a="http://schemas.openxmlformats.org/drawingml/2006/main" xmlns:r="http://schemas.openxmlformats.org/officeDocument/2006/relationships" xmlns:p="http://schemas.openxmlformats.org/presentationml/2006/main">
+  <p:cSld>
+    <p:spTree>
+      <p:nvGrpSpPr>
+        <p:cNvPr id="1" name=""/>
+        <p:cNvGrpSpPr/>
+        <p:nvPr/>
+      </p:nvGrpSpPr>
+      <p:grpSpPr>
+        <a:xfrm>
+          <a:off x="0" y="0"/>
+          <a:ext cx="0" cy="0"/>
+          <a:chOff x="0" y="0"/>
+          <a:chExt cx="0" cy="0"/>
+        </a:xfrm>
+      </p:grpSpPr>
+      <p:sp>
+        <p:nvSpPr>
+          <p:cNvPr id="2" name="Titre 1">
+            <a:extLst>
+              <a:ext uri="{FF2B5EF4-FFF2-40B4-BE49-F238E27FC236}">
                 <a16:creationId xmlns:a16="http://schemas.microsoft.com/office/drawing/2014/main" id="{298D14FB-41AD-08E5-65AA-A5B1CAF68D21}"/>
               </a:ext>
             </a:extLst>
@@ -8833,7 +9364,7 @@
 </p:sld>
 </file>
 
-<file path=ppt/slides/slide7.xml><?xml version="1.0" encoding="utf-8"?>
+<file path=ppt/slides/slide8.xml><?xml version="1.0" encoding="utf-8"?>
 <p:sld xmlns:a="http://schemas.openxmlformats.org/drawingml/2006/main" xmlns:r="http://schemas.openxmlformats.org/officeDocument/2006/relationships" xmlns:p="http://schemas.openxmlformats.org/presentationml/2006/main">
   <p:cSld>
     <p:spTree>
@@ -9129,7 +9660,7 @@
 </p:sld>
 </file>
 
-<file path=ppt/slides/slide8.xml><?xml version="1.0" encoding="utf-8"?>
+<file path=ppt/slides/slide9.xml><?xml version="1.0" encoding="utf-8"?>
 <p:sld xmlns:a="http://schemas.openxmlformats.org/drawingml/2006/main" xmlns:r="http://schemas.openxmlformats.org/officeDocument/2006/relationships" xmlns:p="http://schemas.openxmlformats.org/presentationml/2006/main">
   <p:cSld>
     <p:spTree>
@@ -9535,345 +10066,6 @@
     <p:extLst>
       <p:ext uri="{BB962C8B-B14F-4D97-AF65-F5344CB8AC3E}">
         <p14:creationId xmlns:p14="http://schemas.microsoft.com/office/powerpoint/2010/main" val="52206540"/>
-      </p:ext>
-    </p:extLst>
-  </p:cSld>
-  <p:clrMapOvr>
-    <a:masterClrMapping/>
-  </p:clrMapOvr>
-</p:sld>
-</file>
-
-<file path=ppt/slides/slide9.xml><?xml version="1.0" encoding="utf-8"?>
-<p:sld xmlns:a="http://schemas.openxmlformats.org/drawingml/2006/main" xmlns:r="http://schemas.openxmlformats.org/officeDocument/2006/relationships" xmlns:p="http://schemas.openxmlformats.org/presentationml/2006/main">
-  <p:cSld>
-    <p:spTree>
-      <p:nvGrpSpPr>
-        <p:cNvPr id="1" name=""/>
-        <p:cNvGrpSpPr/>
-        <p:nvPr/>
-      </p:nvGrpSpPr>
-      <p:grpSpPr>
-        <a:xfrm>
-          <a:off x="0" y="0"/>
-          <a:ext cx="0" cy="0"/>
-          <a:chOff x="0" y="0"/>
-          <a:chExt cx="0" cy="0"/>
-        </a:xfrm>
-      </p:grpSpPr>
-      <p:sp>
-        <p:nvSpPr>
-          <p:cNvPr id="2" name="Titre 1">
-            <a:extLst>
-              <a:ext uri="{FF2B5EF4-FFF2-40B4-BE49-F238E27FC236}">
-                <a16:creationId xmlns:a16="http://schemas.microsoft.com/office/drawing/2014/main" id="{F13D07B4-C7D9-46E1-38A0-A6EEF16B48EB}"/>
-              </a:ext>
-            </a:extLst>
-          </p:cNvPr>
-          <p:cNvSpPr>
-            <a:spLocks noGrp="1"/>
-          </p:cNvSpPr>
-          <p:nvPr>
-            <p:ph type="title"/>
-          </p:nvPr>
-        </p:nvSpPr>
-        <p:spPr/>
-        <p:txBody>
-          <a:bodyPr/>
-          <a:lstStyle/>
-          <a:p>
-            <a:r>
-              <a:rPr lang="fr-FR" dirty="0" err="1"/>
-              <a:t>Take</a:t>
-            </a:r>
-            <a:r>
-              <a:rPr lang="fr-FR" dirty="0"/>
-              <a:t> </a:t>
-            </a:r>
-            <a:r>
-              <a:rPr lang="fr-FR" dirty="0" err="1"/>
-              <a:t>away</a:t>
-            </a:r>
-            <a:endParaRPr lang="fr-FR" dirty="0"/>
-          </a:p>
-        </p:txBody>
-      </p:sp>
-      <p:sp>
-        <p:nvSpPr>
-          <p:cNvPr id="3" name="Espace réservé du contenu 2">
-            <a:extLst>
-              <a:ext uri="{FF2B5EF4-FFF2-40B4-BE49-F238E27FC236}">
-                <a16:creationId xmlns:a16="http://schemas.microsoft.com/office/drawing/2014/main" id="{1A803C62-BD0B-D0AC-2B41-C4F420891B06}"/>
-              </a:ext>
-            </a:extLst>
-          </p:cNvPr>
-          <p:cNvSpPr>
-            <a:spLocks noGrp="1"/>
-          </p:cNvSpPr>
-          <p:nvPr>
-            <p:ph idx="1"/>
-          </p:nvPr>
-        </p:nvSpPr>
-        <p:spPr/>
-        <p:txBody>
-          <a:bodyPr>
-            <a:normAutofit lnSpcReduction="10000"/>
-          </a:bodyPr>
-          <a:lstStyle/>
-          <a:p>
-            <a:r>
-              <a:rPr lang="fr-FR" dirty="0"/>
-              <a:t>So far, </a:t>
-            </a:r>
-            <a:r>
-              <a:rPr lang="fr-FR" dirty="0" err="1"/>
-              <a:t>working</a:t>
-            </a:r>
-            <a:r>
-              <a:rPr lang="fr-FR" dirty="0"/>
-              <a:t> on the </a:t>
-            </a:r>
-            <a:r>
-              <a:rPr lang="fr-FR" dirty="0" err="1"/>
-              <a:t>projects</a:t>
-            </a:r>
-            <a:r>
-              <a:rPr lang="fr-FR" dirty="0"/>
-              <a:t> I </a:t>
-            </a:r>
-            <a:r>
-              <a:rPr lang="fr-FR" dirty="0" err="1"/>
-              <a:t>keep</a:t>
-            </a:r>
-            <a:r>
-              <a:rPr lang="fr-FR" dirty="0"/>
-              <a:t> in </a:t>
-            </a:r>
-            <a:r>
-              <a:rPr lang="fr-FR" dirty="0" err="1"/>
-              <a:t>mind</a:t>
-            </a:r>
-            <a:r>
-              <a:rPr lang="fr-FR" dirty="0"/>
-              <a:t> :</a:t>
-            </a:r>
-          </a:p>
-          <a:p>
-            <a:pPr lvl="1">
-              <a:tabLst>
-                <a:tab pos="4572000" algn="l"/>
-              </a:tabLst>
-            </a:pPr>
-            <a:r>
-              <a:rPr lang="en-US" dirty="0"/>
-              <a:t>EDA	: The recipe</a:t>
-            </a:r>
-          </a:p>
-          <a:p>
-            <a:pPr lvl="1">
-              <a:tabLst>
-                <a:tab pos="4572000" algn="l"/>
-              </a:tabLst>
-            </a:pPr>
-            <a:r>
-              <a:rPr lang="en-US" dirty="0"/>
-              <a:t>Features Engineering	: The secret sauce</a:t>
-            </a:r>
-          </a:p>
-          <a:p>
-            <a:pPr lvl="1">
-              <a:tabLst>
-                <a:tab pos="4572000" algn="l"/>
-              </a:tabLst>
-            </a:pPr>
-            <a:r>
-              <a:rPr lang="en-US" dirty="0"/>
-              <a:t>Baseline model	: The first taste</a:t>
-            </a:r>
-          </a:p>
-          <a:p>
-            <a:pPr lvl="1">
-              <a:tabLst>
-                <a:tab pos="4572000" algn="l"/>
-              </a:tabLst>
-            </a:pPr>
-            <a:r>
-              <a:rPr lang="en-US" dirty="0"/>
-              <a:t>Interpreting results	: The tasting notes</a:t>
-            </a:r>
-            <a:endParaRPr lang="fr-FR" dirty="0"/>
-          </a:p>
-          <a:p>
-            <a:pPr marL="914400" lvl="1" indent="-457200">
-              <a:buFont typeface="+mj-lt"/>
-              <a:buAutoNum type="arabicPeriod"/>
-            </a:pPr>
-            <a:endParaRPr lang="fr-FR" dirty="0"/>
-          </a:p>
-          <a:p>
-            <a:r>
-              <a:rPr lang="fr-FR" dirty="0"/>
-              <a:t>It </a:t>
-            </a:r>
-            <a:r>
-              <a:rPr lang="fr-FR" dirty="0" err="1"/>
-              <a:t>is</a:t>
-            </a:r>
-            <a:r>
-              <a:rPr lang="fr-FR" dirty="0"/>
-              <a:t> true </a:t>
-            </a:r>
-            <a:r>
-              <a:rPr lang="fr-FR" dirty="0" err="1"/>
-              <a:t>here</a:t>
-            </a:r>
-            <a:r>
-              <a:rPr lang="fr-FR" dirty="0"/>
-              <a:t> </a:t>
-            </a:r>
-            <a:r>
-              <a:rPr lang="fr-FR" dirty="0" err="1"/>
-              <a:t>too</a:t>
-            </a:r>
-            <a:endParaRPr lang="fr-FR" dirty="0"/>
-          </a:p>
-          <a:p>
-            <a:endParaRPr lang="fr-FR" dirty="0"/>
-          </a:p>
-          <a:p>
-            <a:r>
-              <a:rPr lang="fr-FR" dirty="0" err="1"/>
-              <a:t>Impressed</a:t>
-            </a:r>
-            <a:r>
-              <a:rPr lang="fr-FR" dirty="0"/>
-              <a:t> by the </a:t>
-            </a:r>
-            <a:r>
-              <a:rPr lang="fr-FR" dirty="0" err="1"/>
-              <a:t>results</a:t>
-            </a:r>
-            <a:r>
-              <a:rPr lang="fr-FR" dirty="0"/>
-              <a:t> of the </a:t>
-            </a:r>
-            <a:r>
-              <a:rPr lang="fr-FR" dirty="0" err="1"/>
-              <a:t>baseline</a:t>
-            </a:r>
-            <a:r>
-              <a:rPr lang="fr-FR" dirty="0"/>
-              <a:t> model</a:t>
-            </a:r>
-          </a:p>
-          <a:p>
-            <a:r>
-              <a:rPr lang="fr-FR" dirty="0"/>
-              <a:t>BERT (</a:t>
-            </a:r>
-            <a:r>
-              <a:rPr lang="fr-FR" dirty="0" err="1"/>
-              <a:t>unfreezed</a:t>
-            </a:r>
-            <a:r>
-              <a:rPr lang="fr-FR" dirty="0"/>
-              <a:t>) help to </a:t>
-            </a:r>
-            <a:r>
-              <a:rPr lang="fr-FR" dirty="0" err="1"/>
-              <a:t>keep</a:t>
-            </a:r>
-            <a:r>
-              <a:rPr lang="fr-FR" dirty="0"/>
-              <a:t> the </a:t>
-            </a:r>
-            <a:r>
-              <a:rPr lang="fr-FR" dirty="0" err="1"/>
-              <a:t>Precision</a:t>
-            </a:r>
-            <a:r>
-              <a:rPr lang="fr-FR" dirty="0"/>
-              <a:t> </a:t>
-            </a:r>
-            <a:r>
-              <a:rPr lang="fr-FR" dirty="0" err="1"/>
-              <a:t>while</a:t>
-            </a:r>
-            <a:r>
-              <a:rPr lang="fr-FR" dirty="0"/>
-              <a:t> </a:t>
-            </a:r>
-            <a:r>
-              <a:rPr lang="fr-FR" dirty="0" err="1"/>
-              <a:t>improving</a:t>
-            </a:r>
-            <a:r>
-              <a:rPr lang="fr-FR" dirty="0"/>
-              <a:t> the Accuracy but at the </a:t>
-            </a:r>
-            <a:r>
-              <a:rPr lang="fr-FR" dirty="0" err="1"/>
-              <a:t>cost</a:t>
-            </a:r>
-            <a:r>
-              <a:rPr lang="fr-FR" dirty="0"/>
-              <a:t> of training time</a:t>
-            </a:r>
-          </a:p>
-          <a:p>
-            <a:endParaRPr lang="fr-FR" dirty="0"/>
-          </a:p>
-          <a:p>
-            <a:pPr marL="457200" lvl="1" indent="0">
-              <a:buNone/>
-            </a:pPr>
-            <a:endParaRPr lang="fr-FR" dirty="0"/>
-          </a:p>
-          <a:p>
-            <a:endParaRPr lang="fr-FR" dirty="0"/>
-          </a:p>
-        </p:txBody>
-      </p:sp>
-      <p:pic>
-        <p:nvPicPr>
-          <p:cNvPr id="5" name="Image 4">
-            <a:extLst>
-              <a:ext uri="{FF2B5EF4-FFF2-40B4-BE49-F238E27FC236}">
-                <a16:creationId xmlns:a16="http://schemas.microsoft.com/office/drawing/2014/main" id="{6A3C50B5-69FB-F9D8-70F1-0579A3213984}"/>
-              </a:ext>
-            </a:extLst>
-          </p:cNvPr>
-          <p:cNvPicPr>
-            <a:picLocks noChangeAspect="1"/>
-          </p:cNvPicPr>
-          <p:nvPr/>
-        </p:nvPicPr>
-        <p:blipFill>
-          <a:blip r:embed="rId3"/>
-          <a:srcRect l="25506" t="5814" r="18520"/>
-          <a:stretch/>
-        </p:blipFill>
-        <p:spPr>
-          <a:xfrm>
-            <a:off x="8984610" y="1700089"/>
-            <a:ext cx="1149290" cy="1287306"/>
-          </a:xfrm>
-          <a:prstGeom prst="rect">
-            <a:avLst/>
-          </a:prstGeom>
-          <a:effectLst>
-            <a:outerShdw blurRad="50800" dist="38100" dir="2700000" algn="tl" rotWithShape="0">
-              <a:prstClr val="black">
-                <a:alpha val="40000"/>
-              </a:prstClr>
-            </a:outerShdw>
-          </a:effectLst>
-        </p:spPr>
-      </p:pic>
-    </p:spTree>
-    <p:extLst>
-      <p:ext uri="{BB962C8B-B14F-4D97-AF65-F5344CB8AC3E}">
-        <p14:creationId xmlns:p14="http://schemas.microsoft.com/office/powerpoint/2010/main" val="3201622378"/>
       </p:ext>
     </p:extLst>
   </p:cSld>

</xml_diff>

<commit_message>
Fix bug & Improve animated conf matrix
</commit_message>
<xml_diff>
--- a/07_deep_learning/99_Project_ATT/01_att_project.pptx
+++ b/07_deep_learning/99_Project_ATT/01_att_project.pptx
@@ -128,7 +128,7 @@
 <file path=ppt/revisionInfo.xml><?xml version="1.0" encoding="utf-8"?>
 <p1510:revInfo xmlns:a="http://schemas.openxmlformats.org/drawingml/2006/main" xmlns:r="http://schemas.openxmlformats.org/officeDocument/2006/relationships" xmlns:p1510="http://schemas.microsoft.com/office/powerpoint/2015/10/main">
   <p1510:revLst>
-    <p1510:client id="{ABAE05BF-949A-4E93-BC19-2AEAAED3ED81}" v="28" dt="2024-09-13T14:55:21.478"/>
+    <p1510:client id="{ABAE05BF-949A-4E93-BC19-2AEAAED3ED81}" v="30" dt="2024-09-16T21:21:35.376"/>
   </p1510:revLst>
 </p1510:revInfo>
 </file>
@@ -1567,7 +1567,7 @@
   <pc:docChgLst>
     <pc:chgData name="Philippe Baucour" userId="5102170ae7533958" providerId="LiveId" clId="{ABAE05BF-949A-4E93-BC19-2AEAAED3ED81}"/>
     <pc:docChg chg="undo custSel addSld modSld sldOrd">
-      <pc:chgData name="Philippe Baucour" userId="5102170ae7533958" providerId="LiveId" clId="{ABAE05BF-949A-4E93-BC19-2AEAAED3ED81}" dt="2024-09-13T14:56:12.048" v="3089" actId="1076"/>
+      <pc:chgData name="Philippe Baucour" userId="5102170ae7533958" providerId="LiveId" clId="{ABAE05BF-949A-4E93-BC19-2AEAAED3ED81}" dt="2024-09-16T21:25:48.527" v="3343" actId="1037"/>
       <pc:docMkLst>
         <pc:docMk/>
       </pc:docMkLst>
@@ -2201,8 +2201,8 @@
           </ac:picMkLst>
         </pc:picChg>
       </pc:sldChg>
-      <pc:sldChg chg="addSp modSp new mod">
-        <pc:chgData name="Philippe Baucour" userId="5102170ae7533958" providerId="LiveId" clId="{ABAE05BF-949A-4E93-BC19-2AEAAED3ED81}" dt="2024-09-13T14:55:49.683" v="3057" actId="1037"/>
+      <pc:sldChg chg="addSp delSp modSp new mod">
+        <pc:chgData name="Philippe Baucour" userId="5102170ae7533958" providerId="LiveId" clId="{ABAE05BF-949A-4E93-BC19-2AEAAED3ED81}" dt="2024-09-16T21:25:48.527" v="3343" actId="1037"/>
         <pc:sldMkLst>
           <pc:docMk/>
           <pc:sldMk cId="3058765758" sldId="270"/>
@@ -2216,15 +2216,15 @@
           </ac:spMkLst>
         </pc:spChg>
         <pc:spChg chg="add mod">
-          <ac:chgData name="Philippe Baucour" userId="5102170ae7533958" providerId="LiveId" clId="{ABAE05BF-949A-4E93-BC19-2AEAAED3ED81}" dt="2024-09-13T14:55:49.683" v="3057" actId="1037"/>
+          <ac:chgData name="Philippe Baucour" userId="5102170ae7533958" providerId="LiveId" clId="{ABAE05BF-949A-4E93-BC19-2AEAAED3ED81}" dt="2024-09-16T21:25:00.115" v="3286" actId="1035"/>
           <ac:spMkLst>
             <pc:docMk/>
             <pc:sldMk cId="3058765758" sldId="270"/>
             <ac:spMk id="17" creationId="{3053E7A8-B72C-E8FD-CA87-54B853B912FF}"/>
           </ac:spMkLst>
         </pc:spChg>
-        <pc:picChg chg="add mod">
-          <ac:chgData name="Philippe Baucour" userId="5102170ae7533958" providerId="LiveId" clId="{ABAE05BF-949A-4E93-BC19-2AEAAED3ED81}" dt="2024-09-13T14:55:44.950" v="3052" actId="1038"/>
+        <pc:picChg chg="add del mod">
+          <ac:chgData name="Philippe Baucour" userId="5102170ae7533958" providerId="LiveId" clId="{ABAE05BF-949A-4E93-BC19-2AEAAED3ED81}" dt="2024-09-16T21:19:53.732" v="3090" actId="478"/>
           <ac:picMkLst>
             <pc:docMk/>
             <pc:sldMk cId="3058765758" sldId="270"/>
@@ -2232,7 +2232,15 @@
           </ac:picMkLst>
         </pc:picChg>
         <pc:picChg chg="add mod">
-          <ac:chgData name="Philippe Baucour" userId="5102170ae7533958" providerId="LiveId" clId="{ABAE05BF-949A-4E93-BC19-2AEAAED3ED81}" dt="2024-09-13T14:55:44.950" v="3052" actId="1038"/>
+          <ac:chgData name="Philippe Baucour" userId="5102170ae7533958" providerId="LiveId" clId="{ABAE05BF-949A-4E93-BC19-2AEAAED3ED81}" dt="2024-09-16T21:25:44.557" v="3334" actId="1037"/>
+          <ac:picMkLst>
+            <pc:docMk/>
+            <pc:sldMk cId="3058765758" sldId="270"/>
+            <ac:picMk id="5" creationId="{FD2E9C7F-2FA1-E98A-E665-71910E0F0742}"/>
+          </ac:picMkLst>
+        </pc:picChg>
+        <pc:picChg chg="add del mod">
+          <ac:chgData name="Philippe Baucour" userId="5102170ae7533958" providerId="LiveId" clId="{ABAE05BF-949A-4E93-BC19-2AEAAED3ED81}" dt="2024-09-16T21:22:38.365" v="3151" actId="478"/>
           <ac:picMkLst>
             <pc:docMk/>
             <pc:sldMk cId="3058765758" sldId="270"/>
@@ -2240,7 +2248,15 @@
           </ac:picMkLst>
         </pc:picChg>
         <pc:picChg chg="add mod">
-          <ac:chgData name="Philippe Baucour" userId="5102170ae7533958" providerId="LiveId" clId="{ABAE05BF-949A-4E93-BC19-2AEAAED3ED81}" dt="2024-09-13T14:55:49.683" v="3057" actId="1037"/>
+          <ac:chgData name="Philippe Baucour" userId="5102170ae7533958" providerId="LiveId" clId="{ABAE05BF-949A-4E93-BC19-2AEAAED3ED81}" dt="2024-09-16T21:25:48.527" v="3343" actId="1037"/>
+          <ac:picMkLst>
+            <pc:docMk/>
+            <pc:sldMk cId="3058765758" sldId="270"/>
+            <ac:picMk id="8" creationId="{0BE888AE-4D34-5A6A-D08B-C5957BDAC0BE}"/>
+          </ac:picMkLst>
+        </pc:picChg>
+        <pc:picChg chg="add mod">
+          <ac:chgData name="Philippe Baucour" userId="5102170ae7533958" providerId="LiveId" clId="{ABAE05BF-949A-4E93-BC19-2AEAAED3ED81}" dt="2024-09-16T21:25:00.115" v="3286" actId="1035"/>
           <ac:picMkLst>
             <pc:docMk/>
             <pc:sldMk cId="3058765758" sldId="270"/>
@@ -2335,7 +2351,7 @@
           <a:p>
             <a:fld id="{FD1752CD-A7D2-4825-BC26-9DAEFBD0A5FF}" type="datetimeFigureOut">
               <a:rPr lang="fr-FR" smtClean="0"/>
-              <a:t>13/09/2024</a:t>
+              <a:t>16/09/2024</a:t>
             </a:fld>
             <a:endParaRPr lang="fr-FR"/>
           </a:p>
@@ -3854,7 +3870,7 @@
           <a:p>
             <a:fld id="{7ECB9D5A-E5E4-41FE-AF39-634902D6D5D2}" type="datetimeFigureOut">
               <a:rPr lang="fr-FR" smtClean="0"/>
-              <a:t>13/09/2024</a:t>
+              <a:t>16/09/2024</a:t>
             </a:fld>
             <a:endParaRPr lang="fr-FR"/>
           </a:p>
@@ -4052,7 +4068,7 @@
           <a:p>
             <a:fld id="{7ECB9D5A-E5E4-41FE-AF39-634902D6D5D2}" type="datetimeFigureOut">
               <a:rPr lang="fr-FR" smtClean="0"/>
-              <a:t>13/09/2024</a:t>
+              <a:t>16/09/2024</a:t>
             </a:fld>
             <a:endParaRPr lang="fr-FR"/>
           </a:p>
@@ -4260,7 +4276,7 @@
           <a:p>
             <a:fld id="{7ECB9D5A-E5E4-41FE-AF39-634902D6D5D2}" type="datetimeFigureOut">
               <a:rPr lang="fr-FR" smtClean="0"/>
-              <a:t>13/09/2024</a:t>
+              <a:t>16/09/2024</a:t>
             </a:fld>
             <a:endParaRPr lang="fr-FR"/>
           </a:p>
@@ -4458,7 +4474,7 @@
           <a:p>
             <a:fld id="{7ECB9D5A-E5E4-41FE-AF39-634902D6D5D2}" type="datetimeFigureOut">
               <a:rPr lang="fr-FR" smtClean="0"/>
-              <a:t>13/09/2024</a:t>
+              <a:t>16/09/2024</a:t>
             </a:fld>
             <a:endParaRPr lang="fr-FR"/>
           </a:p>
@@ -4733,7 +4749,7 @@
           <a:p>
             <a:fld id="{7ECB9D5A-E5E4-41FE-AF39-634902D6D5D2}" type="datetimeFigureOut">
               <a:rPr lang="fr-FR" smtClean="0"/>
-              <a:t>13/09/2024</a:t>
+              <a:t>16/09/2024</a:t>
             </a:fld>
             <a:endParaRPr lang="fr-FR"/>
           </a:p>
@@ -4998,7 +5014,7 @@
           <a:p>
             <a:fld id="{7ECB9D5A-E5E4-41FE-AF39-634902D6D5D2}" type="datetimeFigureOut">
               <a:rPr lang="fr-FR" smtClean="0"/>
-              <a:t>13/09/2024</a:t>
+              <a:t>16/09/2024</a:t>
             </a:fld>
             <a:endParaRPr lang="fr-FR"/>
           </a:p>
@@ -5410,7 +5426,7 @@
           <a:p>
             <a:fld id="{7ECB9D5A-E5E4-41FE-AF39-634902D6D5D2}" type="datetimeFigureOut">
               <a:rPr lang="fr-FR" smtClean="0"/>
-              <a:t>13/09/2024</a:t>
+              <a:t>16/09/2024</a:t>
             </a:fld>
             <a:endParaRPr lang="fr-FR"/>
           </a:p>
@@ -5551,7 +5567,7 @@
           <a:p>
             <a:fld id="{7ECB9D5A-E5E4-41FE-AF39-634902D6D5D2}" type="datetimeFigureOut">
               <a:rPr lang="fr-FR" smtClean="0"/>
-              <a:t>13/09/2024</a:t>
+              <a:t>16/09/2024</a:t>
             </a:fld>
             <a:endParaRPr lang="fr-FR"/>
           </a:p>
@@ -5664,7 +5680,7 @@
           <a:p>
             <a:fld id="{7ECB9D5A-E5E4-41FE-AF39-634902D6D5D2}" type="datetimeFigureOut">
               <a:rPr lang="fr-FR" smtClean="0"/>
-              <a:t>13/09/2024</a:t>
+              <a:t>16/09/2024</a:t>
             </a:fld>
             <a:endParaRPr lang="fr-FR"/>
           </a:p>
@@ -5975,7 +5991,7 @@
           <a:p>
             <a:fld id="{7ECB9D5A-E5E4-41FE-AF39-634902D6D5D2}" type="datetimeFigureOut">
               <a:rPr lang="fr-FR" smtClean="0"/>
-              <a:t>13/09/2024</a:t>
+              <a:t>16/09/2024</a:t>
             </a:fld>
             <a:endParaRPr lang="fr-FR"/>
           </a:p>
@@ -6266,7 +6282,7 @@
           <a:p>
             <a:fld id="{7ECB9D5A-E5E4-41FE-AF39-634902D6D5D2}" type="datetimeFigureOut">
               <a:rPr lang="fr-FR" smtClean="0"/>
-              <a:t>13/09/2024</a:t>
+              <a:t>16/09/2024</a:t>
             </a:fld>
             <a:endParaRPr lang="fr-FR"/>
           </a:p>
@@ -6507,7 +6523,7 @@
           <a:p>
             <a:fld id="{7ECB9D5A-E5E4-41FE-AF39-634902D6D5D2}" type="datetimeFigureOut">
               <a:rPr lang="fr-FR" smtClean="0"/>
-              <a:t>13/09/2024</a:t>
+              <a:t>16/09/2024</a:t>
             </a:fld>
             <a:endParaRPr lang="fr-FR"/>
           </a:p>
@@ -8856,107 +8872,21 @@
           </a:p>
         </p:txBody>
       </p:sp>
-      <p:pic>
-        <p:nvPicPr>
-          <p:cNvPr id="4" name="Image 3" descr="Une image contenant texte, capture d’écran, Caractère coloré, Rectangle&#10;&#10;Description générée automatiquement">
-            <a:extLst>
-              <a:ext uri="{FF2B5EF4-FFF2-40B4-BE49-F238E27FC236}">
-                <a16:creationId xmlns:a16="http://schemas.microsoft.com/office/drawing/2014/main" id="{39288974-209F-32A6-3D30-6870C498E5D7}"/>
-              </a:ext>
-            </a:extLst>
-          </p:cNvPr>
-          <p:cNvPicPr>
-            <a:picLocks noChangeAspect="1"/>
-          </p:cNvPicPr>
+      <p:sp>
+        <p:nvSpPr>
+          <p:cNvPr id="17" name="ZoneTexte 16">
+            <a:extLst>
+              <a:ext uri="{FF2B5EF4-FFF2-40B4-BE49-F238E27FC236}">
+                <a16:creationId xmlns:a16="http://schemas.microsoft.com/office/drawing/2014/main" id="{3053E7A8-B72C-E8FD-CA87-54B853B912FF}"/>
+              </a:ext>
+            </a:extLst>
+          </p:cNvPr>
+          <p:cNvSpPr txBox="1"/>
           <p:nvPr/>
-        </p:nvPicPr>
-        <p:blipFill>
-          <a:blip r:embed="rId2">
-            <a:extLst>
-              <a:ext uri="{28A0092B-C50C-407E-A947-70E740481C1C}">
-                <a14:useLocalDpi xmlns:a14="http://schemas.microsoft.com/office/drawing/2010/main" val="0"/>
-              </a:ext>
-            </a:extLst>
-          </a:blip>
-          <a:stretch>
-            <a:fillRect/>
-          </a:stretch>
-        </p:blipFill>
+        </p:nvSpPr>
         <p:spPr>
           <a:xfrm>
-            <a:off x="1451294" y="1135380"/>
-            <a:ext cx="3955409" cy="3955409"/>
-          </a:xfrm>
-          <a:prstGeom prst="rect">
-            <a:avLst/>
-          </a:prstGeom>
-          <a:effectLst>
-            <a:outerShdw blurRad="50800" dist="38100" dir="2700000" algn="tl" rotWithShape="0">
-              <a:prstClr val="black">
-                <a:alpha val="40000"/>
-              </a:prstClr>
-            </a:outerShdw>
-          </a:effectLst>
-        </p:spPr>
-      </p:pic>
-      <p:pic>
-        <p:nvPicPr>
-          <p:cNvPr id="6" name="Image 5" descr="Une image contenant texte, capture d’écran, Caractère coloré, Rectangle&#10;&#10;Description générée automatiquement">
-            <a:extLst>
-              <a:ext uri="{FF2B5EF4-FFF2-40B4-BE49-F238E27FC236}">
-                <a16:creationId xmlns:a16="http://schemas.microsoft.com/office/drawing/2014/main" id="{16CA6C83-D939-8456-F725-6E9598F87D90}"/>
-              </a:ext>
-            </a:extLst>
-          </p:cNvPr>
-          <p:cNvPicPr>
-            <a:picLocks noChangeAspect="1"/>
-          </p:cNvPicPr>
-          <p:nvPr/>
-        </p:nvPicPr>
-        <p:blipFill>
-          <a:blip r:embed="rId3">
-            <a:extLst>
-              <a:ext uri="{28A0092B-C50C-407E-A947-70E740481C1C}">
-                <a14:useLocalDpi xmlns:a14="http://schemas.microsoft.com/office/drawing/2010/main" val="0"/>
-              </a:ext>
-            </a:extLst>
-          </a:blip>
-          <a:stretch>
-            <a:fillRect/>
-          </a:stretch>
-        </p:blipFill>
-        <p:spPr>
-          <a:xfrm>
-            <a:off x="6785294" y="1135380"/>
-            <a:ext cx="3955409" cy="3955409"/>
-          </a:xfrm>
-          <a:prstGeom prst="rect">
-            <a:avLst/>
-          </a:prstGeom>
-          <a:effectLst>
-            <a:outerShdw blurRad="50800" dist="38100" dir="2700000" algn="tl" rotWithShape="0">
-              <a:prstClr val="black">
-                <a:alpha val="40000"/>
-              </a:prstClr>
-            </a:outerShdw>
-          </a:effectLst>
-        </p:spPr>
-      </p:pic>
-      <p:sp>
-        <p:nvSpPr>
-          <p:cNvPr id="17" name="ZoneTexte 16">
-            <a:extLst>
-              <a:ext uri="{FF2B5EF4-FFF2-40B4-BE49-F238E27FC236}">
-                <a16:creationId xmlns:a16="http://schemas.microsoft.com/office/drawing/2014/main" id="{3053E7A8-B72C-E8FD-CA87-54B853B912FF}"/>
-              </a:ext>
-            </a:extLst>
-          </p:cNvPr>
-          <p:cNvSpPr txBox="1"/>
-          <p:nvPr/>
-        </p:nvSpPr>
-        <p:spPr>
-          <a:xfrm>
-            <a:off x="2531141" y="5280331"/>
+            <a:off x="2531141" y="5388849"/>
             <a:ext cx="2390398" cy="923330"/>
           </a:xfrm>
           <a:prstGeom prst="rect">
@@ -9031,15 +8961,101 @@
           <p:nvPr/>
         </p:nvPicPr>
         <p:blipFill>
-          <a:blip r:embed="rId4"/>
+          <a:blip r:embed="rId2"/>
           <a:stretch>
             <a:fillRect/>
           </a:stretch>
         </p:blipFill>
         <p:spPr>
           <a:xfrm>
-            <a:off x="5141743" y="5260832"/>
-            <a:ext cx="5259364" cy="1460643"/>
+            <a:off x="5791199" y="5388849"/>
+            <a:ext cx="4609907" cy="1280274"/>
+          </a:xfrm>
+          <a:prstGeom prst="rect">
+            <a:avLst/>
+          </a:prstGeom>
+          <a:effectLst>
+            <a:outerShdw blurRad="50800" dist="38100" dir="2700000" algn="tl" rotWithShape="0">
+              <a:prstClr val="black">
+                <a:alpha val="40000"/>
+              </a:prstClr>
+            </a:outerShdw>
+          </a:effectLst>
+        </p:spPr>
+      </p:pic>
+      <p:pic>
+        <p:nvPicPr>
+          <p:cNvPr id="5" name="Image 4" descr="Une image contenant capture d’écran, texte, Caractère coloré&#10;&#10;Description générée automatiquement">
+            <a:extLst>
+              <a:ext uri="{FF2B5EF4-FFF2-40B4-BE49-F238E27FC236}">
+                <a16:creationId xmlns:a16="http://schemas.microsoft.com/office/drawing/2014/main" id="{FD2E9C7F-2FA1-E98A-E665-71910E0F0742}"/>
+              </a:ext>
+            </a:extLst>
+          </p:cNvPr>
+          <p:cNvPicPr>
+            <a:picLocks noChangeAspect="1"/>
+          </p:cNvPicPr>
+          <p:nvPr/>
+        </p:nvPicPr>
+        <p:blipFill>
+          <a:blip r:embed="rId3">
+            <a:extLst>
+              <a:ext uri="{28A0092B-C50C-407E-A947-70E740481C1C}">
+                <a14:useLocalDpi xmlns:a14="http://schemas.microsoft.com/office/drawing/2010/main" val="0"/>
+              </a:ext>
+            </a:extLst>
+          </a:blip>
+          <a:stretch>
+            <a:fillRect/>
+          </a:stretch>
+        </p:blipFill>
+        <p:spPr>
+          <a:xfrm>
+            <a:off x="518822" y="829757"/>
+            <a:ext cx="4413432" cy="4413432"/>
+          </a:xfrm>
+          <a:prstGeom prst="rect">
+            <a:avLst/>
+          </a:prstGeom>
+          <a:effectLst>
+            <a:outerShdw blurRad="50800" dist="38100" dir="2700000" algn="tl" rotWithShape="0">
+              <a:prstClr val="black">
+                <a:alpha val="40000"/>
+              </a:prstClr>
+            </a:outerShdw>
+          </a:effectLst>
+        </p:spPr>
+      </p:pic>
+      <p:pic>
+        <p:nvPicPr>
+          <p:cNvPr id="8" name="Image 7" descr="Une image contenant texte, capture d’écran, Caractère coloré, Rectangle&#10;&#10;Description générée automatiquement">
+            <a:extLst>
+              <a:ext uri="{FF2B5EF4-FFF2-40B4-BE49-F238E27FC236}">
+                <a16:creationId xmlns:a16="http://schemas.microsoft.com/office/drawing/2014/main" id="{0BE888AE-4D34-5A6A-D08B-C5957BDAC0BE}"/>
+              </a:ext>
+            </a:extLst>
+          </p:cNvPr>
+          <p:cNvPicPr>
+            <a:picLocks noChangeAspect="1"/>
+          </p:cNvPicPr>
+          <p:nvPr/>
+        </p:nvPicPr>
+        <p:blipFill>
+          <a:blip r:embed="rId4">
+            <a:extLst>
+              <a:ext uri="{28A0092B-C50C-407E-A947-70E740481C1C}">
+                <a14:useLocalDpi xmlns:a14="http://schemas.microsoft.com/office/drawing/2010/main" val="0"/>
+              </a:ext>
+            </a:extLst>
+          </a:blip>
+          <a:stretch>
+            <a:fillRect/>
+          </a:stretch>
+        </p:blipFill>
+        <p:spPr>
+          <a:xfrm>
+            <a:off x="5974152" y="829756"/>
+            <a:ext cx="4413432" cy="4413432"/>
           </a:xfrm>
           <a:prstGeom prst="rect">
             <a:avLst/>

</xml_diff>